<commit_message>
Migliorata la ricerca, pulizia codice...
- Tolte cartelle di supporto
- Migliorata la ricerca (viene fatto un check sui nodi predecessori tramite AskPredecessor).
-  Utilizzo di un'unica funzione di aggiornamento dei nodi predecessori e successori in caso di leave (sia crash o controllato).
</commit_message>
<xml_diff>
--- a/Documentazione/Presentazione/Presentazione_Chord_Festa_0320408.pptx
+++ b/Documentazione/Presentazione/Presentazione_Chord_Festa_0320408.pptx
@@ -10410,7 +10410,7 @@
           <p:nvPr/>
         </p:nvSpPr>
         <p:spPr bwMode="auto">
-          <a:xfrm rot="20764057" flipH="0" flipV="0">
+          <a:xfrm rot="20764056" flipH="0" flipV="0">
             <a:off x="2438303" y="3484443"/>
             <a:ext cx="3125192" cy="228958"/>
           </a:xfrm>
@@ -11654,7 +11654,7 @@
           <p:nvPr/>
         </p:nvSpPr>
         <p:spPr bwMode="auto">
-          <a:xfrm rot="20764057" flipH="0" flipV="0">
+          <a:xfrm rot="20764056" flipH="0" flipV="0">
             <a:off x="2438303" y="3484443"/>
             <a:ext cx="3125192" cy="228958"/>
           </a:xfrm>
@@ -12192,8 +12192,8 @@
         </p:nvSpPr>
         <p:spPr bwMode="auto">
           <a:xfrm flipH="0" flipV="0">
-            <a:off x="18039" y="684108"/>
-            <a:ext cx="7090628" cy="945239"/>
+            <a:off x="18038" y="684108"/>
+            <a:ext cx="7091347" cy="518519"/>
           </a:xfrm>
           <a:prstGeom prst="rect">
             <a:avLst/>
@@ -12241,39 +12241,6 @@
                 </a:solidFill>
               </a:rPr>
               <a:t> </a:t>
-            </a:r>
-            <a:endParaRPr b="0">
-              <a:solidFill>
-                <a:schemeClr val="tx1"/>
-              </a:solidFill>
-            </a:endParaRPr>
-          </a:p>
-          <a:p>
-            <a:pPr algn="l">
-              <a:defRPr/>
-            </a:pPr>
-            <a:endParaRPr b="0">
-              <a:solidFill>
-                <a:schemeClr val="tx1"/>
-              </a:solidFill>
-            </a:endParaRPr>
-          </a:p>
-          <a:p>
-            <a:pPr marL="239820" indent="-239820" algn="l">
-              <a:buFont typeface="Arial"/>
-              <a:buChar char="•"/>
-              <a:defRPr/>
-            </a:pPr>
-            <a:r>
-              <a:rPr lang="it-IT" sz="1400" b="0" i="0" u="none" strike="noStrike" cap="none" spc="0">
-                <a:solidFill>
-                  <a:schemeClr val="tx1"/>
-                </a:solidFill>
-                <a:latin typeface="Arial"/>
-                <a:ea typeface="Arial"/>
-                <a:cs typeface="Arial"/>
-              </a:rPr>
-              <a:t>Esempio: rimozione del nodo “1”.</a:t>
             </a:r>
             <a:endParaRPr b="0">
               <a:solidFill>
@@ -12336,59 +12303,13 @@
       </p:sp>
       <p:sp>
         <p:nvSpPr>
-          <p:cNvPr id="1111067290" name=""/>
-          <p:cNvSpPr txBox="1"/>
-          <p:nvPr/>
-        </p:nvSpPr>
-        <p:spPr bwMode="auto">
-          <a:xfrm flipH="0" flipV="0">
-            <a:off x="1319595" y="2010548"/>
-            <a:ext cx="1263956" cy="396599"/>
-          </a:xfrm>
-          <a:prstGeom prst="rect">
-            <a:avLst/>
-          </a:prstGeom>
-          <a:noFill/>
-        </p:spPr>
-        <p:txBody>
-          <a:bodyPr vertOverflow="overflow" horzOverflow="overflow" vert="horz" wrap="square" lIns="91440" tIns="45720" rIns="91440" bIns="45720" numCol="1" spcCol="0" rtlCol="0" fromWordArt="0" anchor="t" anchorCtr="0" forceAA="0" upright="0" compatLnSpc="0">
-            <a:spAutoFit/>
-          </a:bodyPr>
-          <a:p>
-            <a:pPr algn="ctr">
-              <a:defRPr/>
-            </a:pPr>
-            <a:r>
-              <a:rPr sz="1000"/>
-              <a:t>“2” è il tuo</a:t>
-            </a:r>
-            <a:endParaRPr sz="1000"/>
-          </a:p>
-          <a:p>
-            <a:pPr>
-              <a:defRPr/>
-            </a:pPr>
-            <a:r>
-              <a:rPr sz="1000"/>
-              <a:t>nuovo </a:t>
-            </a:r>
-            <a:r>
-              <a:rPr sz="1000"/>
-              <a:t>successore</a:t>
-            </a:r>
-            <a:endParaRPr sz="1000"/>
-          </a:p>
-        </p:txBody>
-      </p:sp>
-      <p:sp>
-        <p:nvSpPr>
           <p:cNvPr id="2085067319" name=""/>
           <p:cNvSpPr txBox="1"/>
           <p:nvPr/>
         </p:nvSpPr>
         <p:spPr bwMode="auto">
           <a:xfrm flipH="0" flipV="0">
-            <a:off x="3181497" y="3263555"/>
+            <a:off x="3181497" y="3165229"/>
             <a:ext cx="1790289" cy="396599"/>
           </a:xfrm>
           <a:prstGeom prst="rect">
@@ -12434,7 +12355,7 @@
         </p:nvSpPr>
         <p:spPr bwMode="auto">
           <a:xfrm flipH="0" flipV="0">
-            <a:off x="2009919" y="2718288"/>
+            <a:off x="1993086" y="2687853"/>
             <a:ext cx="877637" cy="593480"/>
           </a:xfrm>
           <a:prstGeom prst="mathMultiply">
@@ -12478,54 +12399,8 @@
           <p:nvPr/>
         </p:nvCxnSpPr>
         <p:spPr bwMode="auto">
-          <a:xfrm flipH="1" flipV="1">
-            <a:off x="1319595" y="2403230"/>
-            <a:ext cx="871903" cy="388326"/>
-          </a:xfrm>
-          <a:prstGeom prst="curvedConnector3">
-            <a:avLst>
-              <a:gd name="adj1" fmla="val 24113"/>
-            </a:avLst>
-          </a:prstGeom>
-          <a:ln w="19049" cap="flat" cmpd="sng" algn="ctr">
-            <a:solidFill>
-              <a:schemeClr val="accent1">
-                <a:shade val="95000"/>
-                <a:satMod val="105000"/>
-              </a:schemeClr>
-            </a:solidFill>
-            <a:prstDash val="solid"/>
-            <a:tailEnd type="arrow" len="med"/>
-          </a:ln>
-        </p:spPr>
-        <p:style>
-          <a:lnRef idx="1">
-            <a:schemeClr val="accent1">
-              <a:shade val="50000"/>
-            </a:schemeClr>
-          </a:lnRef>
-          <a:fillRef idx="0">
-            <a:schemeClr val="accent1"/>
-          </a:fillRef>
-          <a:effectRef idx="0">
-            <a:schemeClr val="accent1"/>
-          </a:effectRef>
-          <a:fontRef idx="minor">
-            <a:schemeClr val="tx1"/>
-          </a:fontRef>
-        </p:style>
-      </p:cxnSp>
-      <p:cxnSp>
-        <p:nvCxnSpPr>
-          <p:cNvPr id="0" name=""/>
-          <p:cNvCxnSpPr>
-            <a:cxnSpLocks/>
-          </p:cNvCxnSpPr>
-          <p:nvPr/>
-        </p:nvCxnSpPr>
-        <p:spPr bwMode="auto">
           <a:xfrm flipH="0" flipV="0">
-            <a:off x="2697057" y="3015028"/>
+            <a:off x="2674982" y="3019356"/>
             <a:ext cx="380999" cy="1219932"/>
           </a:xfrm>
           <a:prstGeom prst="curvedConnector3">
@@ -12569,7 +12444,7 @@
         </p:nvSpPr>
         <p:spPr bwMode="auto">
           <a:xfrm flipH="0" flipV="0">
-            <a:off x="3181497" y="4234961"/>
+            <a:off x="3257042" y="4172387"/>
             <a:ext cx="1807208" cy="396599"/>
           </a:xfrm>
           <a:prstGeom prst="rect">
@@ -12593,6 +12468,143 @@
           </a:p>
         </p:txBody>
       </p:sp>
+      <p:sp>
+        <p:nvSpPr>
+          <p:cNvPr id="1685238051" name=""/>
+          <p:cNvSpPr txBox="1"/>
+          <p:nvPr/>
+        </p:nvSpPr>
+        <p:spPr bwMode="auto">
+          <a:xfrm flipH="0" flipV="0">
+            <a:off x="23945" y="1306941"/>
+            <a:ext cx="3032035" cy="304799"/>
+          </a:xfrm>
+          <a:prstGeom prst="rect">
+            <a:avLst/>
+          </a:prstGeom>
+          <a:noFill/>
+        </p:spPr>
+        <p:txBody>
+          <a:bodyPr vertOverflow="overflow" horzOverflow="overflow" vert="horz" wrap="square" lIns="91440" tIns="45720" rIns="91440" bIns="45720" numCol="1" spcCol="0" rtlCol="0" fromWordArt="0" anchor="t" anchorCtr="0" forceAA="0" upright="0" compatLnSpc="0">
+            <a:spAutoFit/>
+          </a:bodyPr>
+          <a:p>
+            <a:pPr marL="239819" indent="-239819" algn="l">
+              <a:buFont typeface="Arial"/>
+              <a:buChar char="•"/>
+              <a:defRPr/>
+            </a:pPr>
+            <a:r>
+              <a:rPr lang="it-IT" b="0" i="0" u="none" strike="noStrike" cap="none" spc="0">
+                <a:solidFill>
+                  <a:schemeClr val="tx1"/>
+                </a:solidFill>
+                <a:latin typeface="Arial"/>
+                <a:ea typeface="Arial"/>
+                <a:cs typeface="Arial"/>
+              </a:rPr>
+              <a:t>Esempio: rimozione del nodo “1”.</a:t>
+            </a:r>
+            <a:endParaRPr b="0">
+              <a:solidFill>
+                <a:schemeClr val="tx1"/>
+              </a:solidFill>
+            </a:endParaRPr>
+          </a:p>
+        </p:txBody>
+      </p:sp>
+      <p:sp>
+        <p:nvSpPr>
+          <p:cNvPr id="864579268" name=""/>
+          <p:cNvSpPr txBox="1"/>
+          <p:nvPr/>
+        </p:nvSpPr>
+        <p:spPr bwMode="auto">
+          <a:xfrm flipH="0" flipV="0">
+            <a:off x="1993086" y="2157085"/>
+            <a:ext cx="1263955" cy="396598"/>
+          </a:xfrm>
+          <a:prstGeom prst="rect">
+            <a:avLst/>
+          </a:prstGeom>
+          <a:noFill/>
+        </p:spPr>
+        <p:txBody>
+          <a:bodyPr vertOverflow="overflow" horzOverflow="overflow" vert="horz" wrap="square" lIns="91440" tIns="45720" rIns="91440" bIns="45720" numCol="1" spcCol="0" rtlCol="0" fromWordArt="0" anchor="t" anchorCtr="0" forceAA="0" upright="0" compatLnSpc="0">
+            <a:spAutoFit/>
+          </a:bodyPr>
+          <a:p>
+            <a:pPr algn="ctr">
+              <a:defRPr/>
+            </a:pPr>
+            <a:r>
+              <a:rPr sz="1000"/>
+              <a:t>“2” è il tuo</a:t>
+            </a:r>
+            <a:endParaRPr sz="1000"/>
+          </a:p>
+          <a:p>
+            <a:pPr>
+              <a:defRPr/>
+            </a:pPr>
+            <a:r>
+              <a:rPr sz="1000"/>
+              <a:t>nuovo </a:t>
+            </a:r>
+            <a:r>
+              <a:rPr sz="1000"/>
+              <a:t>successore</a:t>
+            </a:r>
+            <a:endParaRPr sz="1000"/>
+          </a:p>
+        </p:txBody>
+      </p:sp>
+      <p:cxnSp>
+        <p:nvCxnSpPr>
+          <p:cNvPr id="457313239" name=""/>
+          <p:cNvCxnSpPr>
+            <a:cxnSpLocks/>
+          </p:cNvCxnSpPr>
+          <p:nvPr/>
+        </p:nvCxnSpPr>
+        <p:spPr bwMode="auto">
+          <a:xfrm flipH="1" flipV="1">
+            <a:off x="1400190" y="2377586"/>
+            <a:ext cx="871902" cy="388325"/>
+          </a:xfrm>
+          <a:prstGeom prst="curvedConnector3">
+            <a:avLst>
+              <a:gd name="adj1" fmla="val 24113"/>
+            </a:avLst>
+          </a:prstGeom>
+          <a:ln w="19049" cap="flat" cmpd="sng" algn="ctr">
+            <a:solidFill>
+              <a:schemeClr val="accent1">
+                <a:shade val="95000"/>
+                <a:satMod val="105000"/>
+              </a:schemeClr>
+            </a:solidFill>
+            <a:prstDash val="solid"/>
+            <a:tailEnd type="arrow" len="med"/>
+          </a:ln>
+        </p:spPr>
+        <p:style>
+          <a:lnRef idx="1">
+            <a:schemeClr val="accent1">
+              <a:shade val="50000"/>
+            </a:schemeClr>
+          </a:lnRef>
+          <a:fillRef idx="0">
+            <a:schemeClr val="accent1"/>
+          </a:fillRef>
+          <a:effectRef idx="0">
+            <a:schemeClr val="accent1"/>
+          </a:effectRef>
+          <a:fontRef idx="minor">
+            <a:schemeClr val="tx1"/>
+          </a:fontRef>
+        </p:style>
+      </p:cxnSp>
     </p:spTree>
   </p:cSld>
   <p:clrMapOvr>
@@ -12615,26 +12627,26 @@
               <p:cTn id="2" dur="indefinite" nodeType="mainSeq">
                 <p:childTnLst>
                   <p:par>
-                    <p:cTn id="11" fill="hold">
+                    <p:cTn id="31" fill="hold">
                       <p:stCondLst>
                         <p:cond delay="indefinite"/>
                       </p:stCondLst>
                       <p:childTnLst>
                         <p:par>
-                          <p:cTn id="12" fill="hold">
+                          <p:cTn id="32" fill="hold">
                             <p:stCondLst>
                               <p:cond delay="0"/>
                             </p:stCondLst>
                             <p:childTnLst>
                               <p:par>
-                                <p:cTn id="17" presetID="1" presetClass="entr" presetSubtype="0" fill="hold" grpId="0" nodeType="clickEffect">
+                                <p:cTn id="33" presetID="1" presetClass="entr" presetSubtype="0" fill="hold" grpId="0" nodeType="clickEffect">
                                   <p:stCondLst>
                                     <p:cond delay="0"/>
                                   </p:stCondLst>
                                   <p:childTnLst>
                                     <p:set>
                                       <p:cBhvr>
-                                        <p:cTn id="18" dur="1" fill="hold">
+                                        <p:cTn id="34" dur="1" fill="hold">
                                           <p:stCondLst>
                                             <p:cond delay="0"/>
                                           </p:stCondLst>
@@ -12653,8 +12665,188 @@
                                   </p:childTnLst>
                                 </p:cTn>
                               </p:par>
+                            </p:childTnLst>
+                          </p:cTn>
+                        </p:par>
+                      </p:childTnLst>
+                    </p:cTn>
+                  </p:par>
+                  <p:par>
+                    <p:cTn id="27" fill="hold">
+                      <p:stCondLst>
+                        <p:cond delay="indefinite"/>
+                      </p:stCondLst>
+                      <p:childTnLst>
+                        <p:par>
+                          <p:cTn id="28" fill="hold">
+                            <p:stCondLst>
+                              <p:cond delay="0"/>
+                            </p:stCondLst>
+                            <p:childTnLst>
                               <p:par>
-                                <p:cTn id="15" presetID="1" presetClass="entr" presetSubtype="0" fill="hold" grpId="0" nodeType="withEffect">
+                                <p:cTn id="29" presetID="1" presetClass="entr" presetSubtype="0" fill="hold" grpId="0" nodeType="clickEffect">
+                                  <p:stCondLst>
+                                    <p:cond delay="0"/>
+                                  </p:stCondLst>
+                                  <p:childTnLst>
+                                    <p:set>
+                                      <p:cBhvr>
+                                        <p:cTn id="30" dur="1" fill="hold">
+                                          <p:stCondLst>
+                                            <p:cond delay="0"/>
+                                          </p:stCondLst>
+                                        </p:cTn>
+                                        <p:tgtEl>
+                                          <p:spTgt spid="1685238051"/>
+                                        </p:tgtEl>
+                                        <p:attrNameLst>
+                                          <p:attrName>style.visibility</p:attrName>
+                                        </p:attrNameLst>
+                                      </p:cBhvr>
+                                      <p:to>
+                                        <p:strVal val="visible"/>
+                                      </p:to>
+                                    </p:set>
+                                  </p:childTnLst>
+                                </p:cTn>
+                              </p:par>
+                            </p:childTnLst>
+                          </p:cTn>
+                        </p:par>
+                      </p:childTnLst>
+                    </p:cTn>
+                  </p:par>
+                  <p:par>
+                    <p:cTn id="23" fill="hold">
+                      <p:stCondLst>
+                        <p:cond delay="indefinite"/>
+                      </p:stCondLst>
+                      <p:childTnLst>
+                        <p:par>
+                          <p:cTn id="24" fill="hold">
+                            <p:stCondLst>
+                              <p:cond delay="0"/>
+                            </p:stCondLst>
+                            <p:childTnLst>
+                              <p:par>
+                                <p:cTn id="25" presetID="1" presetClass="entr" presetSubtype="0" fill="hold" grpId="0" nodeType="clickEffect">
+                                  <p:stCondLst>
+                                    <p:cond delay="0"/>
+                                  </p:stCondLst>
+                                  <p:childTnLst>
+                                    <p:set>
+                                      <p:cBhvr>
+                                        <p:cTn id="26" dur="1" fill="hold">
+                                          <p:stCondLst>
+                                            <p:cond delay="0"/>
+                                          </p:stCondLst>
+                                        </p:cTn>
+                                        <p:tgtEl>
+                                          <p:spTgt spid="1196949948"/>
+                                        </p:tgtEl>
+                                        <p:attrNameLst>
+                                          <p:attrName>style.visibility</p:attrName>
+                                        </p:attrNameLst>
+                                      </p:cBhvr>
+                                      <p:to>
+                                        <p:strVal val="visible"/>
+                                      </p:to>
+                                    </p:set>
+                                  </p:childTnLst>
+                                </p:cTn>
+                              </p:par>
+                            </p:childTnLst>
+                          </p:cTn>
+                        </p:par>
+                      </p:childTnLst>
+                    </p:cTn>
+                  </p:par>
+                  <p:par>
+                    <p:cTn id="17" fill="hold">
+                      <p:stCondLst>
+                        <p:cond delay="indefinite"/>
+                      </p:stCondLst>
+                      <p:childTnLst>
+                        <p:par>
+                          <p:cTn id="18" fill="hold">
+                            <p:stCondLst>
+                              <p:cond delay="0"/>
+                            </p:stCondLst>
+                            <p:childTnLst>
+                              <p:par>
+                                <p:cTn id="21" presetID="1" presetClass="entr" presetSubtype="0" fill="hold" grpId="0" nodeType="clickEffect">
+                                  <p:stCondLst>
+                                    <p:cond delay="0"/>
+                                  </p:stCondLst>
+                                  <p:childTnLst>
+                                    <p:set>
+                                      <p:cBhvr>
+                                        <p:cTn id="22" dur="1" fill="hold">
+                                          <p:stCondLst>
+                                            <p:cond delay="0"/>
+                                          </p:stCondLst>
+                                        </p:cTn>
+                                        <p:tgtEl>
+                                          <p:spTgt spid="864579268"/>
+                                        </p:tgtEl>
+                                        <p:attrNameLst>
+                                          <p:attrName>style.visibility</p:attrName>
+                                        </p:attrNameLst>
+                                      </p:cBhvr>
+                                      <p:to>
+                                        <p:strVal val="visible"/>
+                                      </p:to>
+                                    </p:set>
+                                  </p:childTnLst>
+                                </p:cTn>
+                              </p:par>
+                              <p:par>
+                                <p:cTn id="19" presetID="1" presetClass="entr" presetSubtype="0" fill="hold" grpId="0" nodeType="withEffect">
+                                  <p:stCondLst>
+                                    <p:cond delay="0"/>
+                                  </p:stCondLst>
+                                  <p:childTnLst>
+                                    <p:set>
+                                      <p:cBhvr>
+                                        <p:cTn id="20" dur="1" fill="hold">
+                                          <p:stCondLst>
+                                            <p:cond delay="0"/>
+                                          </p:stCondLst>
+                                        </p:cTn>
+                                        <p:tgtEl>
+                                          <p:spTgt spid="457313239"/>
+                                        </p:tgtEl>
+                                        <p:attrNameLst>
+                                          <p:attrName>style.visibility</p:attrName>
+                                        </p:attrNameLst>
+                                      </p:cBhvr>
+                                      <p:to>
+                                        <p:strVal val="visible"/>
+                                      </p:to>
+                                    </p:set>
+                                  </p:childTnLst>
+                                </p:cTn>
+                              </p:par>
+                            </p:childTnLst>
+                          </p:cTn>
+                        </p:par>
+                      </p:childTnLst>
+                    </p:cTn>
+                  </p:par>
+                  <p:par>
+                    <p:cTn id="11" fill="hold">
+                      <p:stCondLst>
+                        <p:cond delay="indefinite"/>
+                      </p:stCondLst>
+                      <p:childTnLst>
+                        <p:par>
+                          <p:cTn id="12" fill="hold">
+                            <p:stCondLst>
+                              <p:cond delay="0"/>
+                            </p:stCondLst>
+                            <p:childTnLst>
+                              <p:par>
+                                <p:cTn id="15" presetID="1" presetClass="entr" presetSubtype="0" fill="hold" grpId="0" nodeType="clickEffect">
                                   <p:stCondLst>
                                     <p:cond delay="0"/>
                                   </p:stCondLst>
@@ -12667,7 +12859,7 @@
                                           </p:stCondLst>
                                         </p:cTn>
                                         <p:tgtEl>
-                                          <p:spTgt spid="1111067290"/>
+                                          <p:spTgt spid="0"/>
                                         </p:tgtEl>
                                         <p:attrNameLst>
                                           <p:attrName>style.visibility</p:attrName>
@@ -18279,8 +18471,8 @@
         </p:nvSpPr>
         <p:spPr bwMode="auto">
           <a:xfrm flipH="0" flipV="0">
-            <a:off x="-10293" y="2154915"/>
-            <a:ext cx="4594311" cy="731879"/>
+            <a:off x="-10292" y="2154915"/>
+            <a:ext cx="4595391" cy="731879"/>
           </a:xfrm>
           <a:prstGeom prst="rect">
             <a:avLst/>
@@ -18311,7 +18503,7 @@
                   <a:schemeClr val="tx1"/>
                 </a:solidFill>
               </a:rPr>
-              <a:t> nodi adiacenti, con cui instaurare la connessione.</a:t>
+              <a:t>nodi adiacenti, con cui instaurare la connessione.</a:t>
             </a:r>
             <a:endParaRPr b="1" i="0">
               <a:solidFill>

</xml_diff>

<commit_message>
ottimizzazione codice + rivista documentazione
</commit_message>
<xml_diff>
--- a/Documentazione/Presentazione/Presentazione_Chord_Festa_0320408.pptx
+++ b/Documentazione/Presentazione/Presentazione_Chord_Festa_0320408.pptx
@@ -8009,8 +8009,8 @@
         </p:nvSpPr>
         <p:spPr bwMode="auto">
           <a:xfrm flipH="0" flipV="0">
-            <a:off x="4049115" y="2753975"/>
-            <a:ext cx="1013816" cy="396599"/>
+            <a:off x="3969456" y="2753974"/>
+            <a:ext cx="1094914" cy="396599"/>
           </a:xfrm>
           <a:prstGeom prst="rect">
             <a:avLst/>
@@ -8041,7 +8041,7 @@
             </a:r>
             <a:r>
               <a:rPr sz="1000" i="1"/>
-              <a:t>“ciao”</a:t>
+              <a:t>“4:ciao”</a:t>
             </a:r>
             <a:endParaRPr sz="1000" i="1"/>
           </a:p>
@@ -8054,9 +8054,9 @@
           <p:nvPr/>
         </p:nvSpPr>
         <p:spPr bwMode="auto">
-          <a:xfrm rot="20901053" flipH="0" flipV="0">
-            <a:off x="1750973" y="2514931"/>
-            <a:ext cx="2809327" cy="244199"/>
+          <a:xfrm rot="20869666" flipH="0" flipV="0">
+            <a:off x="1546691" y="2482507"/>
+            <a:ext cx="3222569" cy="244199"/>
           </a:xfrm>
           <a:prstGeom prst="rect">
             <a:avLst/>
@@ -8073,7 +8073,7 @@
             </a:pPr>
             <a:r>
               <a:rPr sz="1000"/>
-              <a:t>Contatto il nodo ‘x’ per cercare la risorsa “ciao”</a:t>
+              <a:t>Contatto il nodo ‘x’ per cercare la risorsa avente id = 4</a:t>
             </a:r>
             <a:endParaRPr sz="1000"/>
           </a:p>
@@ -8087,8 +8087,8 @@
         </p:nvSpPr>
         <p:spPr bwMode="auto">
           <a:xfrm flipH="0" flipV="0">
-            <a:off x="7374179" y="1316320"/>
-            <a:ext cx="744798" cy="244198"/>
+            <a:off x="7512222" y="1316319"/>
+            <a:ext cx="497808" cy="244199"/>
           </a:xfrm>
           <a:prstGeom prst="rect">
             <a:avLst/>
@@ -8105,7 +8105,7 @@
             </a:pPr>
             <a:r>
               <a:rPr sz="1000"/>
-              <a:t>id(ciao)=4</a:t>
+              <a:t>id = 4</a:t>
             </a:r>
             <a:endParaRPr sz="1000"/>
           </a:p>
@@ -8209,8 +8209,8 @@
         </p:nvSpPr>
         <p:spPr bwMode="auto">
           <a:xfrm flipH="0" flipV="0">
-            <a:off x="4087228" y="3104676"/>
-            <a:ext cx="1018856" cy="396599"/>
+            <a:off x="3969456" y="3104676"/>
+            <a:ext cx="1138067" cy="396599"/>
           </a:xfrm>
           <a:prstGeom prst="rect">
             <a:avLst/>
@@ -8257,7 +8257,7 @@
                   <a:srgbClr val="C00000"/>
                 </a:solidFill>
               </a:rPr>
-              <a:t>“ciao”</a:t>
+              <a:t>“4:ciao”</a:t>
             </a:r>
             <a:endParaRPr sz="1000" i="1">
               <a:solidFill>
@@ -12476,7 +12476,7 @@
         </p:nvSpPr>
         <p:spPr bwMode="auto">
           <a:xfrm flipH="0" flipV="0">
-            <a:off x="23945" y="1306941"/>
+            <a:off x="23944" y="1306941"/>
             <a:ext cx="3032035" cy="304799"/>
           </a:xfrm>
           <a:prstGeom prst="rect">
@@ -15195,7 +15195,7 @@
         </p:nvSpPr>
         <p:spPr bwMode="auto">
           <a:xfrm rot="0" flipH="0" flipV="0">
-            <a:off x="8019" y="2172456"/>
+            <a:off x="216595" y="2172456"/>
             <a:ext cx="1355392" cy="399805"/>
           </a:xfrm>
           <a:prstGeom prst="chevron">
@@ -15278,7 +15278,7 @@
         </p:nvSpPr>
         <p:spPr bwMode="auto">
           <a:xfrm rot="0" flipH="0" flipV="0">
-            <a:off x="1450200" y="2172456"/>
+            <a:off x="1658776" y="2172456"/>
             <a:ext cx="1355392" cy="399805"/>
           </a:xfrm>
           <a:prstGeom prst="chevron">
@@ -15344,7 +15344,7 @@
         </p:nvSpPr>
         <p:spPr bwMode="auto">
           <a:xfrm rot="0" flipH="0" flipV="0">
-            <a:off x="2859737" y="2172456"/>
+            <a:off x="3068313" y="2172456"/>
             <a:ext cx="1355392" cy="399805"/>
           </a:xfrm>
           <a:prstGeom prst="chevron">
@@ -15479,7 +15479,7 @@
         </p:nvSpPr>
         <p:spPr bwMode="auto">
           <a:xfrm rot="0" flipH="0" flipV="0">
-            <a:off x="4283170" y="2168748"/>
+            <a:off x="4491746" y="2168748"/>
             <a:ext cx="1411103" cy="406709"/>
           </a:xfrm>
           <a:prstGeom prst="chevron">
@@ -15591,7 +15591,7 @@
         </p:nvSpPr>
         <p:spPr bwMode="auto">
           <a:xfrm rot="0" flipH="0" flipV="0">
-            <a:off x="5769558" y="2168748"/>
+            <a:off x="5978134" y="2168748"/>
             <a:ext cx="1411103" cy="406709"/>
           </a:xfrm>
           <a:prstGeom prst="chevron">
@@ -15734,7 +15734,7 @@
         </p:nvSpPr>
         <p:spPr bwMode="auto">
           <a:xfrm rot="0" flipH="0" flipV="0">
-            <a:off x="7284658" y="2172456"/>
+            <a:off x="7493234" y="2172456"/>
             <a:ext cx="1411102" cy="406708"/>
           </a:xfrm>
           <a:prstGeom prst="chevron">
@@ -18406,8 +18406,8 @@
         </p:nvSpPr>
         <p:spPr bwMode="auto">
           <a:xfrm flipH="0" flipV="0">
-            <a:off x="10397" y="975387"/>
-            <a:ext cx="5513881" cy="518519"/>
+            <a:off x="10396" y="975386"/>
+            <a:ext cx="5514240" cy="518519"/>
           </a:xfrm>
           <a:prstGeom prst="rect">
             <a:avLst/>
@@ -18430,7 +18430,23 @@
                   <a:schemeClr val="tx1"/>
                 </a:solidFill>
               </a:rPr>
-              <a:t>Permette ad un client esterno di interagire col sistema.</a:t>
+              <a:t>Permette ad un </a:t>
+            </a:r>
+            <a:r>
+              <a:rPr i="1">
+                <a:solidFill>
+                  <a:schemeClr val="tx1"/>
+                </a:solidFill>
+              </a:rPr>
+              <a:t>client esterno</a:t>
+            </a:r>
+            <a:r>
+              <a:rPr>
+                <a:solidFill>
+                  <a:schemeClr val="tx1"/>
+                </a:solidFill>
+              </a:rPr>
+              <a:t> di interagire col sistema.</a:t>
             </a:r>
             <a:r>
               <a:rPr>
@@ -18471,8 +18487,8 @@
         </p:nvSpPr>
         <p:spPr bwMode="auto">
           <a:xfrm flipH="0" flipV="0">
-            <a:off x="-10292" y="2154915"/>
-            <a:ext cx="4595391" cy="731879"/>
+            <a:off x="-10291" y="2154915"/>
+            <a:ext cx="4614831" cy="731879"/>
           </a:xfrm>
           <a:prstGeom prst="rect">
             <a:avLst/>
@@ -18495,7 +18511,15 @@
                   <a:schemeClr val="tx1"/>
                 </a:solidFill>
               </a:rPr>
-              <a:t>Fornisce ad un nuovo nodo un punto di accesso nel sistema, oltre alla conoscenza dei suoi </a:t>
+              <a:t>Fornisce ad un </a:t>
+            </a:r>
+            <a:r>
+              <a:rPr i="1">
+                <a:solidFill>
+                  <a:schemeClr val="tx1"/>
+                </a:solidFill>
+              </a:rPr>
+              <a:t>nuovo</a:t>
             </a:r>
             <a:r>
               <a:rPr>
@@ -18503,7 +18527,15 @@
                   <a:schemeClr val="tx1"/>
                 </a:solidFill>
               </a:rPr>
-              <a:t>nodi adiacenti, con cui instaurare la connessione.</a:t>
+              <a:t> nodo un punto di accesso nel sistema, fornendogli</a:t>
+            </a:r>
+            <a:r>
+              <a:rPr>
+                <a:solidFill>
+                  <a:schemeClr val="tx1"/>
+                </a:solidFill>
+              </a:rPr>
+              <a:t> il contatto dei nodi adiacenti con cui instaurare la connessione.</a:t>
             </a:r>
             <a:endParaRPr b="1" i="0">
               <a:solidFill>

</xml_diff>

<commit_message>
piccole correzioni nella presentazione
</commit_message>
<xml_diff>
--- a/Documentazione/Presentazione/Presentazione_Chord_Festa_0320408.pptx
+++ b/Documentazione/Presentazione/Presentazione_Chord_Festa_0320408.pptx
@@ -5159,8 +5159,8 @@
         </p:nvSpPr>
         <p:spPr bwMode="auto">
           <a:xfrm flipH="0" flipV="0">
-            <a:off x="1757045" y="373045"/>
-            <a:ext cx="7039696" cy="1920599"/>
+            <a:off x="1446842" y="790198"/>
+            <a:ext cx="7424823" cy="1310999"/>
           </a:xfrm>
           <a:prstGeom prst="rect">
             <a:avLst/>
@@ -5202,7 +5202,7 @@
                   <a:lin ang="0" scaled="1"/>
                 </a:gradFill>
               </a:rPr>
-              <a:t>Implementazione del protocollo di Chord in una rete peer2peer </a:t>
+              <a:t>Implementazione del protocollo/algoritmo di Chord  </a:t>
             </a:r>
             <a:endParaRPr sz="4000" b="1">
               <a:ln>
@@ -5269,7 +5269,7 @@
         </p:nvSpPr>
         <p:spPr bwMode="auto">
           <a:xfrm>
-            <a:off x="2722152" y="2427735"/>
+            <a:off x="2826440" y="2427734"/>
             <a:ext cx="3769220" cy="427079"/>
           </a:xfrm>
           <a:prstGeom prst="rect">
@@ -5903,8 +5903,8 @@
         </p:nvSpPr>
         <p:spPr bwMode="auto">
           <a:xfrm flipH="0" flipV="0">
-            <a:off x="1531" y="1438420"/>
-            <a:ext cx="4821422" cy="945239"/>
+            <a:off x="1530" y="1438418"/>
+            <a:ext cx="4839780" cy="305159"/>
           </a:xfrm>
           <a:prstGeom prst="rect">
             <a:avLst/>
@@ -5935,23 +5935,7 @@
                   <a:schemeClr val="tx1"/>
                 </a:solidFill>
               </a:rPr>
-              <a:t>: fornita una stringa, il Registry</a:t>
-            </a:r>
-            <a:r>
-              <a:rPr b="0">
-                <a:solidFill>
-                  <a:schemeClr val="tx1"/>
-                </a:solidFill>
-              </a:rPr>
-              <a:t> seleziona un nodo tramite scheduling Round Robin, il quale troverà, tramite FT in modo iterativo, </a:t>
-            </a:r>
-            <a:r>
-              <a:rPr b="0">
-                <a:solidFill>
-                  <a:schemeClr val="tx1"/>
-                </a:solidFill>
-              </a:rPr>
-              <a:t>il nodo che dovrà gestire tale risorsa.</a:t>
+              <a:t>: </a:t>
             </a:r>
             <a:endParaRPr b="0">
               <a:solidFill>
@@ -6264,8 +6248,8 @@
         </p:nvSpPr>
         <p:spPr bwMode="auto">
           <a:xfrm rot="1080071" flipH="0" flipV="0">
-            <a:off x="1446329" y="3834775"/>
-            <a:ext cx="1418010" cy="244199"/>
+            <a:off x="1446328" y="3835134"/>
+            <a:ext cx="1418729" cy="244199"/>
           </a:xfrm>
           <a:prstGeom prst="rect">
             <a:avLst/>
@@ -6289,7 +6273,7 @@
                 <a:ea typeface="Arial"/>
                 <a:cs typeface="Arial"/>
               </a:rPr>
-              <a:t>Nodo da contattare: x</a:t>
+              <a:t>Nodo da contattare: 1</a:t>
             </a:r>
             <a:endParaRPr sz="1000"/>
           </a:p>
@@ -6345,8 +6329,8 @@
         </p:nvSpPr>
         <p:spPr bwMode="auto">
           <a:xfrm rot="20901053" flipH="0" flipV="0">
-            <a:off x="1593419" y="2512592"/>
-            <a:ext cx="3119757" cy="244199"/>
+            <a:off x="1590212" y="2512951"/>
+            <a:ext cx="3126889" cy="244199"/>
           </a:xfrm>
           <a:prstGeom prst="rect">
             <a:avLst/>
@@ -6363,7 +6347,7 @@
             </a:pPr>
             <a:r>
               <a:rPr sz="1000"/>
-              <a:t>Contatto il nodo ‘x’ per memorizzare la risorsa “ciao”</a:t>
+              <a:t>Contatto il nodo ‘1’ per memorizzare la risorsa “ciao”</a:t>
             </a:r>
             <a:endParaRPr sz="1000"/>
           </a:p>
@@ -7970,8 +7954,8 @@
         </p:nvSpPr>
         <p:spPr bwMode="auto">
           <a:xfrm rot="1080071" flipH="0" flipV="0">
-            <a:off x="1446329" y="3834774"/>
-            <a:ext cx="1418010" cy="244198"/>
+            <a:off x="1446328" y="3835132"/>
+            <a:ext cx="1418729" cy="244199"/>
           </a:xfrm>
           <a:prstGeom prst="rect">
             <a:avLst/>
@@ -7995,7 +7979,7 @@
                 <a:ea typeface="Arial"/>
                 <a:cs typeface="Arial"/>
               </a:rPr>
-              <a:t>Nodo da contattare: x</a:t>
+              <a:t>Nodo da contattare: 1</a:t>
             </a:r>
             <a:endParaRPr sz="1000"/>
           </a:p>
@@ -8055,8 +8039,8 @@
         </p:nvSpPr>
         <p:spPr bwMode="auto">
           <a:xfrm rot="20869666" flipH="0" flipV="0">
-            <a:off x="1546691" y="2482507"/>
-            <a:ext cx="3222569" cy="244199"/>
+            <a:off x="1543484" y="2482866"/>
+            <a:ext cx="3229702" cy="244199"/>
           </a:xfrm>
           <a:prstGeom prst="rect">
             <a:avLst/>
@@ -8073,7 +8057,7 @@
             </a:pPr>
             <a:r>
               <a:rPr sz="1000"/>
-              <a:t>Contatto il nodo ‘x’ per cercare la risorsa avente id = 4</a:t>
+              <a:t>Contatto il nodo ‘1’ per cercare la risorsa avente id = 4</a:t>
             </a:r>
             <a:endParaRPr sz="1000"/>
           </a:p>
@@ -9887,8 +9871,8 @@
         </p:nvSpPr>
         <p:spPr bwMode="auto">
           <a:xfrm flipH="0" flipV="0">
-            <a:off x="18039" y="823320"/>
-            <a:ext cx="5634478" cy="731878"/>
+            <a:off x="18038" y="823320"/>
+            <a:ext cx="5653197" cy="731879"/>
           </a:xfrm>
           <a:prstGeom prst="rect">
             <a:avLst/>
@@ -9927,7 +9911,7 @@
                   <a:schemeClr val="tx1"/>
                 </a:solidFill>
               </a:rPr>
-              <a:t>, il nodo entrante comunica col Registry per conoscere i suoi vicini. Li contatterà per inserirsi correttamente,</a:t>
+              <a:t>, il nodo entrante comunica col Registry per conoscere i suoi vicini. Li contatterà per inserirsi nel sistema,</a:t>
             </a:r>
             <a:br>
               <a:rPr b="0">
@@ -11131,8 +11115,8 @@
         </p:nvSpPr>
         <p:spPr bwMode="auto">
           <a:xfrm flipH="0" flipV="0">
-            <a:off x="18039" y="823320"/>
-            <a:ext cx="5634478" cy="731878"/>
+            <a:off x="18038" y="823320"/>
+            <a:ext cx="5638437" cy="731879"/>
           </a:xfrm>
           <a:prstGeom prst="rect">
             <a:avLst/>
@@ -11171,7 +11155,7 @@
                   <a:schemeClr val="tx1"/>
                 </a:solidFill>
               </a:rPr>
-              <a:t>, il nodo entrante comunica col Registry per conoscere i suoi vicini. Li contatterà per inserirsi correttamente,</a:t>
+              <a:t>, il nodo entrante comunica col Registry per conoscere i suoi vicini. Li contatterà per inserirsi nel sistema,</a:t>
             </a:r>
             <a:br>
               <a:rPr b="0">
@@ -12192,8 +12176,8 @@
         </p:nvSpPr>
         <p:spPr bwMode="auto">
           <a:xfrm flipH="0" flipV="0">
-            <a:off x="18038" y="684108"/>
-            <a:ext cx="7091347" cy="518519"/>
+            <a:off x="18036" y="684108"/>
+            <a:ext cx="7096385" cy="518519"/>
           </a:xfrm>
           <a:prstGeom prst="rect">
             <a:avLst/>
@@ -12232,7 +12216,7 @@
                   <a:schemeClr val="tx1"/>
                 </a:solidFill>
               </a:rPr>
-              <a:t> (controllata), i nodi adiacenti al nodo da rimuovere verranno contattati per aggiornare la loro conoscenza sui nodi precedenti e successori.</a:t>
+              <a:t> (controllata), i nodi adiacenti al nodo da rimuovere verranno contattati per aggiornare la loro conoscenza sui nodi predecessori e successori.</a:t>
             </a:r>
             <a:r>
               <a:rPr b="0">
@@ -12626,51 +12610,6 @@
             <p:seq concurrent="1" nextAc="seek">
               <p:cTn id="2" dur="indefinite" nodeType="mainSeq">
                 <p:childTnLst>
-                  <p:par>
-                    <p:cTn id="31" fill="hold">
-                      <p:stCondLst>
-                        <p:cond delay="indefinite"/>
-                      </p:stCondLst>
-                      <p:childTnLst>
-                        <p:par>
-                          <p:cTn id="32" fill="hold">
-                            <p:stCondLst>
-                              <p:cond delay="0"/>
-                            </p:stCondLst>
-                            <p:childTnLst>
-                              <p:par>
-                                <p:cTn id="33" presetID="1" presetClass="entr" presetSubtype="0" fill="hold" grpId="0" nodeType="clickEffect">
-                                  <p:stCondLst>
-                                    <p:cond delay="0"/>
-                                  </p:stCondLst>
-                                  <p:childTnLst>
-                                    <p:set>
-                                      <p:cBhvr>
-                                        <p:cTn id="34" dur="1" fill="hold">
-                                          <p:stCondLst>
-                                            <p:cond delay="0"/>
-                                          </p:stCondLst>
-                                        </p:cTn>
-                                        <p:tgtEl>
-                                          <p:spTgt spid="960484034"/>
-                                        </p:tgtEl>
-                                        <p:attrNameLst>
-                                          <p:attrName>style.visibility</p:attrName>
-                                        </p:attrNameLst>
-                                      </p:cBhvr>
-                                      <p:to>
-                                        <p:strVal val="visible"/>
-                                      </p:to>
-                                    </p:set>
-                                  </p:childTnLst>
-                                </p:cTn>
-                              </p:par>
-                            </p:childTnLst>
-                          </p:cTn>
-                        </p:par>
-                      </p:childTnLst>
-                    </p:cTn>
-                  </p:par>
                   <p:par>
                     <p:cTn id="27" fill="hold">
                       <p:stCondLst>
@@ -14077,8 +14016,8 @@
         </p:nvSpPr>
         <p:spPr bwMode="auto">
           <a:xfrm flipH="0" flipV="0">
-            <a:off x="-30557" y="1662206"/>
-            <a:ext cx="5747517" cy="731879"/>
+            <a:off x="-30556" y="1662205"/>
+            <a:ext cx="5777036" cy="731879"/>
           </a:xfrm>
           <a:prstGeom prst="rect">
             <a:avLst/>
@@ -14109,7 +14048,7 @@
                   <a:schemeClr val="tx1"/>
                 </a:solidFill>
               </a:rPr>
-              <a:t>: un suo guasto impedirebbe </a:t>
+              <a:t>: </a:t>
             </a:r>
             <a:br>
               <a:rPr>
@@ -14124,7 +14063,7 @@
                   <a:schemeClr val="tx1"/>
                 </a:solidFill>
               </a:rPr>
-              <a:t>il corretto svolgimento di operazioni di inserimento e </a:t>
+              <a:t>un suo guasto limiterebbe alcune funzionalità </a:t>
             </a:r>
             <a:br>
               <a:rPr>
@@ -14139,7 +14078,11 @@
                   <a:schemeClr val="tx1"/>
                 </a:solidFill>
               </a:rPr>
-              <a:t>posizionamento dei nodi.</a:t>
+              <a:t>per la gestione del sistema</a:t>
+            </a:r>
+            <a:r>
+              <a:rPr/>
+              <a:t>.</a:t>
             </a:r>
             <a:endParaRPr>
               <a:solidFill>
@@ -15947,8 +15890,8 @@
         </p:nvSpPr>
         <p:spPr bwMode="auto">
           <a:xfrm flipH="0" flipV="0">
-            <a:off x="33752" y="902104"/>
-            <a:ext cx="5617134" cy="518519"/>
+            <a:off x="33750" y="902102"/>
+            <a:ext cx="5621452" cy="518519"/>
           </a:xfrm>
           <a:prstGeom prst="rect">
             <a:avLst/>
@@ -15971,7 +15914,7 @@
                   <a:schemeClr val="tx1"/>
                 </a:solidFill>
               </a:rPr>
-              <a:t>Lo scopo del progetto è implementare, in un contesto di </a:t>
+              <a:t>Lo scopo del progetto è implementare </a:t>
             </a:r>
             <a:br>
               <a:rPr sz="1400">
@@ -15981,12 +15924,23 @@
               </a:rPr>
             </a:br>
             <a:r>
-              <a:rPr sz="1400" i="1">
+              <a:rPr sz="1400">
                 <a:solidFill>
                   <a:schemeClr val="tx1"/>
                 </a:solidFill>
               </a:rPr>
-              <a:t>overlay network strutturata</a:t>
+              <a:t>il protocollo/</a:t>
+            </a:r>
+            <a:r>
+              <a:rPr lang="it-IT" sz="1400" b="0" i="0" u="none" strike="noStrike" cap="none" spc="0">
+                <a:solidFill>
+                  <a:schemeClr val="tx1"/>
+                </a:solidFill>
+                <a:latin typeface="Arial"/>
+                <a:ea typeface="Arial"/>
+                <a:cs typeface="Arial"/>
+              </a:rPr>
+              <a:t>algoritmo</a:t>
             </a:r>
             <a:r>
               <a:rPr sz="1400">
@@ -15994,15 +15948,7 @@
                   <a:schemeClr val="tx1"/>
                 </a:solidFill>
               </a:rPr>
-              <a:t>, </a:t>
-            </a:r>
-            <a:r>
-              <a:rPr sz="1400">
-                <a:solidFill>
-                  <a:schemeClr val="tx1"/>
-                </a:solidFill>
-              </a:rPr>
-              <a:t>l’algoritmo/protocollo di </a:t>
+              <a:t> di </a:t>
             </a:r>
             <a:r>
               <a:rPr sz="1400" b="1">
@@ -16081,8 +16027,8 @@
         </p:nvSpPr>
         <p:spPr bwMode="auto">
           <a:xfrm flipH="0" flipV="0">
-            <a:off x="33752" y="1624232"/>
-            <a:ext cx="5031340" cy="1371960"/>
+            <a:off x="33750" y="3059122"/>
+            <a:ext cx="4267486" cy="945239"/>
           </a:xfrm>
           <a:prstGeom prst="rect">
             <a:avLst/>
@@ -16106,22 +16052,13 @@
             </a:endParaRPr>
           </a:p>
           <a:p>
-            <a:pPr marL="201269" indent="-201269" algn="l" defTabSz="914400">
-              <a:lnSpc>
-                <a:spcPct val="100000"/>
-              </a:lnSpc>
-              <a:spcBef>
-                <a:spcPts val="0"/>
-              </a:spcBef>
-              <a:spcAft>
-                <a:spcPts val="0"/>
-              </a:spcAft>
+            <a:pPr marL="239820" indent="-239820" algn="l">
               <a:buFont typeface="Arial"/>
               <a:buChar char="•"/>
               <a:defRPr/>
             </a:pPr>
             <a:r>
-              <a:rPr b="0" i="0" u="none">
+              <a:rPr lang="it-IT" sz="1400" b="0" i="0" u="none" strike="noStrike" cap="none" spc="0">
                 <a:solidFill>
                   <a:schemeClr val="tx1"/>
                 </a:solidFill>
@@ -16129,10 +16066,10 @@
                 <a:ea typeface="Arial"/>
                 <a:cs typeface="Arial"/>
               </a:rPr>
-              <a:t>I nodi nell’anello sono in grado di </a:t>
-            </a:r>
-            <a:r>
-              <a:rPr b="1" i="0" u="none">
+              <a:t>Disposizione ad </a:t>
+            </a:r>
+            <a:r>
+              <a:rPr lang="it-IT" sz="1400" b="0" i="1" u="none" strike="noStrike" cap="none" spc="0">
                 <a:solidFill>
                   <a:schemeClr val="tx1"/>
                 </a:solidFill>
@@ -16140,10 +16077,21 @@
                 <a:ea typeface="Arial"/>
                 <a:cs typeface="Arial"/>
               </a:rPr>
-              <a:t>memorizzare </a:t>
+              <a:t>anello</a:t>
+            </a:r>
+            <a:r>
+              <a:rPr lang="it-IT" sz="1400" b="0" i="0" u="none" strike="noStrike" cap="none" spc="0">
+                <a:solidFill>
+                  <a:schemeClr val="tx1"/>
+                </a:solidFill>
+                <a:latin typeface="Arial"/>
+                <a:ea typeface="Arial"/>
+                <a:cs typeface="Arial"/>
+              </a:rPr>
+              <a:t> a </a:t>
             </a:r>
             <a:br>
-              <a:rPr b="0" i="0" u="none">
+              <a:rPr lang="it-IT" sz="1400" b="0" i="0" u="none" strike="noStrike" cap="none" spc="0">
                 <a:solidFill>
                   <a:schemeClr val="tx1"/>
                 </a:solidFill>
@@ -16153,7 +16101,7 @@
               </a:rPr>
             </a:br>
             <a:r>
-              <a:rPr b="0" i="0" u="none">
+              <a:rPr lang="it-IT" sz="1400" b="0" i="0" u="none" strike="noStrike" cap="none" spc="0">
                 <a:solidFill>
                   <a:schemeClr val="tx1"/>
                 </a:solidFill>
@@ -16161,10 +16109,10 @@
                 <a:ea typeface="Arial"/>
                 <a:cs typeface="Arial"/>
               </a:rPr>
-              <a:t>delle </a:t>
-            </a:r>
-            <a:r>
-              <a:rPr b="0" i="1" u="none">
+              <a:t>livello </a:t>
+            </a:r>
+            <a:r>
+              <a:rPr lang="it-IT" sz="1400" b="0" i="1" u="none" strike="noStrike" cap="none" spc="0">
                 <a:solidFill>
                   <a:schemeClr val="tx1"/>
                 </a:solidFill>
@@ -16172,10 +16120,10 @@
                 <a:ea typeface="Arial"/>
                 <a:cs typeface="Arial"/>
               </a:rPr>
-              <a:t>risorse</a:t>
-            </a:r>
-            <a:r>
-              <a:rPr b="0" i="0" u="none">
+              <a:t>overlay</a:t>
+            </a:r>
+            <a:r>
+              <a:rPr lang="it-IT" sz="1400" b="0" i="1" u="none" strike="noStrike" cap="none" spc="0">
                 <a:solidFill>
                   <a:schemeClr val="tx1"/>
                 </a:solidFill>
@@ -16183,10 +16131,21 @@
                 <a:ea typeface="Arial"/>
                 <a:cs typeface="Arial"/>
               </a:rPr>
-              <a:t>. </a:t>
+              <a:t> network strutturato</a:t>
+            </a:r>
+            <a:r>
+              <a:rPr lang="it-IT" sz="1400" b="0" i="0" u="none" strike="noStrike" cap="none" spc="0">
+                <a:solidFill>
+                  <a:schemeClr val="tx1"/>
+                </a:solidFill>
+                <a:latin typeface="Arial"/>
+                <a:ea typeface="Arial"/>
+                <a:cs typeface="Arial"/>
+              </a:rPr>
+              <a:t>.</a:t>
             </a:r>
             <a:br>
-              <a:rPr b="0" i="0" u="none">
+              <a:rPr b="0" i="1" u="none">
                 <a:solidFill>
                   <a:schemeClr val="tx1"/>
                 </a:solidFill>
@@ -16195,67 +16154,10 @@
                 <a:cs typeface="Arial"/>
               </a:rPr>
             </a:br>
-            <a:r>
-              <a:rPr b="0" i="0" u="none">
-                <a:solidFill>
-                  <a:schemeClr val="tx1"/>
-                </a:solidFill>
-                <a:latin typeface="Arial"/>
-                <a:ea typeface="Arial"/>
-                <a:cs typeface="Arial"/>
-              </a:rPr>
-              <a:t>Particolare attenzione è data al </a:t>
-            </a:r>
-            <a:r>
-              <a:rPr b="1" i="0" u="none">
-                <a:solidFill>
-                  <a:schemeClr val="tx1"/>
-                </a:solidFill>
-                <a:latin typeface="Arial"/>
-                <a:ea typeface="Arial"/>
-                <a:cs typeface="Arial"/>
-              </a:rPr>
-              <a:t>come</a:t>
-            </a:r>
-            <a:r>
-              <a:rPr b="0" i="0" u="none">
-                <a:solidFill>
-                  <a:schemeClr val="tx1"/>
-                </a:solidFill>
-                <a:latin typeface="Arial"/>
-                <a:ea typeface="Arial"/>
-                <a:cs typeface="Arial"/>
-              </a:rPr>
-              <a:t> queste risorse vengono gestite e affidate.</a:t>
-            </a:r>
-            <a:br>
-              <a:rPr b="0" i="0" u="none">
-                <a:solidFill>
-                  <a:schemeClr val="tx1"/>
-                </a:solidFill>
-                <a:latin typeface="Arial"/>
-                <a:ea typeface="Arial"/>
-                <a:cs typeface="Arial"/>
-              </a:rPr>
-            </a:br>
-            <a:r>
-              <a:rPr b="0" i="1" u="none">
-                <a:solidFill>
-                  <a:schemeClr val="tx1"/>
-                </a:solidFill>
-                <a:latin typeface="Arial"/>
-                <a:ea typeface="Arial"/>
-                <a:cs typeface="Arial"/>
-              </a:rPr>
-              <a:t>- Chord ha l’obiettivo di definire queste modalità.</a:t>
-            </a:r>
-            <a:endParaRPr sz="1400" b="0" i="0" u="none">
+            <a:endParaRPr sz="1400">
               <a:solidFill>
                 <a:schemeClr val="tx1"/>
               </a:solidFill>
-              <a:latin typeface="Arial"/>
-              <a:ea typeface="Arial"/>
-              <a:cs typeface="Arial"/>
             </a:endParaRPr>
           </a:p>
         </p:txBody>
@@ -16268,8 +16170,8 @@
         </p:nvSpPr>
         <p:spPr bwMode="auto">
           <a:xfrm flipH="0" flipV="0">
-            <a:off x="63527" y="3198348"/>
-            <a:ext cx="4458407" cy="701399"/>
+            <a:off x="24467" y="1988602"/>
+            <a:ext cx="4478925" cy="701399"/>
           </a:xfrm>
           <a:prstGeom prst="rect">
             <a:avLst/>
@@ -16281,9 +16183,7 @@
             <a:spAutoFit/>
           </a:bodyPr>
           <a:p>
-            <a:pPr marL="261848" indent="-261848" algn="l">
-              <a:buFont typeface="Arial"/>
-              <a:buChar char="•"/>
+            <a:pPr algn="l">
               <a:defRPr/>
             </a:pPr>
             <a:endParaRPr sz="1200" i="1">
@@ -16304,7 +16204,7 @@
                   <a:schemeClr val="tx1"/>
                 </a:solidFill>
               </a:rPr>
-              <a:t>Di seguito, viene proposta una rappresentazione di una rete ad anello:</a:t>
+              <a:t>Di seguito, viene proposta una rappresentazione del sistema su cui Chord si basa:</a:t>
             </a:r>
             <a:endParaRPr sz="1400" i="0">
               <a:solidFill>
@@ -16314,6 +16214,28 @@
           </a:p>
         </p:txBody>
       </p:sp>
+      <p:pic>
+        <p:nvPicPr>
+          <p:cNvPr id="422699341" name=""/>
+          <p:cNvPicPr>
+            <a:picLocks noChangeAspect="1"/>
+          </p:cNvPicPr>
+          <p:nvPr/>
+        </p:nvPicPr>
+        <p:blipFill>
+          <a:blip r:embed="rId2"/>
+          <a:stretch/>
+        </p:blipFill>
+        <p:spPr bwMode="auto">
+          <a:xfrm flipH="0" flipV="0">
+            <a:off x="4579353" y="472568"/>
+            <a:ext cx="4408727" cy="4119807"/>
+          </a:xfrm>
+          <a:prstGeom prst="rect">
+            <a:avLst/>
+          </a:prstGeom>
+        </p:spPr>
+      </p:pic>
     </p:spTree>
   </p:cSld>
   <p:clrMapOvr>
@@ -16335,6 +16257,51 @@
             <p:seq concurrent="1" nextAc="seek">
               <p:cTn id="2" dur="indefinite" nodeType="mainSeq">
                 <p:childTnLst>
+                  <p:par>
+                    <p:cTn id="15" fill="hold">
+                      <p:stCondLst>
+                        <p:cond delay="indefinite"/>
+                      </p:stCondLst>
+                      <p:childTnLst>
+                        <p:par>
+                          <p:cTn id="16" fill="hold">
+                            <p:stCondLst>
+                              <p:cond delay="0"/>
+                            </p:stCondLst>
+                            <p:childTnLst>
+                              <p:par>
+                                <p:cTn id="17" presetID="1" presetClass="entr" presetSubtype="0" fill="hold" grpId="0" nodeType="clickEffect">
+                                  <p:stCondLst>
+                                    <p:cond delay="0"/>
+                                  </p:stCondLst>
+                                  <p:childTnLst>
+                                    <p:set>
+                                      <p:cBhvr>
+                                        <p:cTn id="18" dur="1" fill="hold">
+                                          <p:stCondLst>
+                                            <p:cond delay="0"/>
+                                          </p:stCondLst>
+                                        </p:cTn>
+                                        <p:tgtEl>
+                                          <p:spTgt spid="1867664274"/>
+                                        </p:tgtEl>
+                                        <p:attrNameLst>
+                                          <p:attrName>style.visibility</p:attrName>
+                                        </p:attrNameLst>
+                                      </p:cBhvr>
+                                      <p:to>
+                                        <p:strVal val="visible"/>
+                                      </p:to>
+                                    </p:set>
+                                  </p:childTnLst>
+                                </p:cTn>
+                              </p:par>
+                            </p:childTnLst>
+                          </p:cTn>
+                        </p:par>
+                      </p:childTnLst>
+                    </p:cTn>
+                  </p:par>
                   <p:par>
                     <p:cTn id="11" fill="hold">
                       <p:stCondLst>
@@ -16361,7 +16328,7 @@
                                           </p:stCondLst>
                                         </p:cTn>
                                         <p:tgtEl>
-                                          <p:spTgt spid="1867664274"/>
+                                          <p:spTgt spid="1344995324"/>
                                         </p:tgtEl>
                                         <p:attrNameLst>
                                           <p:attrName>style.visibility</p:attrName>
@@ -16406,7 +16373,7 @@
                                           </p:stCondLst>
                                         </p:cTn>
                                         <p:tgtEl>
-                                          <p:spTgt spid="844664368"/>
+                                          <p:spTgt spid="422699341"/>
                                         </p:tgtEl>
                                         <p:attrNameLst>
                                           <p:attrName>style.visibility</p:attrName>
@@ -16451,7 +16418,7 @@
                                           </p:stCondLst>
                                         </p:cTn>
                                         <p:tgtEl>
-                                          <p:spTgt spid="1344995324"/>
+                                          <p:spTgt spid="844664368"/>
                                         </p:tgtEl>
                                         <p:attrNameLst>
                                           <p:attrName>style.visibility</p:attrName>
@@ -16652,7 +16619,7 @@
         </p:blipFill>
         <p:spPr bwMode="auto">
           <a:xfrm flipH="0" flipV="0">
-            <a:off x="4579354" y="472569"/>
+            <a:off x="4591075" y="472568"/>
             <a:ext cx="4408728" cy="4119808"/>
           </a:xfrm>
           <a:prstGeom prst="rect">
@@ -16668,7 +16635,7 @@
         </p:nvSpPr>
         <p:spPr bwMode="auto">
           <a:xfrm flipH="0" flipV="0">
-            <a:off x="10397" y="3227467"/>
+            <a:off x="10396" y="1802193"/>
             <a:ext cx="4423868" cy="305159"/>
           </a:xfrm>
           <a:prstGeom prst="rect">
@@ -16706,7 +16673,7 @@
         </p:nvSpPr>
         <p:spPr bwMode="auto">
           <a:xfrm flipH="0" flipV="0">
-            <a:off x="10397" y="3828665"/>
+            <a:off x="10396" y="2403390"/>
             <a:ext cx="4131649" cy="305159"/>
           </a:xfrm>
           <a:prstGeom prst="rect">
@@ -16785,7 +16752,7 @@
         </p:nvSpPr>
         <p:spPr bwMode="auto">
           <a:xfrm flipH="0" flipV="0">
-            <a:off x="10397" y="4379353"/>
+            <a:off x="10396" y="2954079"/>
             <a:ext cx="3692312" cy="305159"/>
           </a:xfrm>
           <a:prstGeom prst="rect">
@@ -16864,8 +16831,8 @@
         </p:nvSpPr>
         <p:spPr bwMode="auto">
           <a:xfrm flipH="0" flipV="0">
-            <a:off x="10397" y="627759"/>
-            <a:ext cx="5338562" cy="1585319"/>
+            <a:off x="10395" y="1010148"/>
+            <a:ext cx="5351880" cy="305159"/>
           </a:xfrm>
           <a:prstGeom prst="rect">
             <a:avLst/>
@@ -16877,185 +16844,10 @@
             <a:spAutoFit/>
           </a:bodyPr>
           <a:p>
-            <a:pPr marL="239821" indent="-239821" algn="l">
-              <a:buFont typeface="Arial"/>
-              <a:buChar char="•"/>
-              <a:defRPr/>
-            </a:pPr>
-            <a:r>
-              <a:rPr>
-                <a:solidFill>
-                  <a:schemeClr val="tx1"/>
-                </a:solidFill>
-              </a:rPr>
-              <a:t>Disposizione ad </a:t>
-            </a:r>
-            <a:r>
-              <a:rPr i="1">
-                <a:solidFill>
-                  <a:schemeClr val="tx1"/>
-                </a:solidFill>
-              </a:rPr>
-              <a:t>anello</a:t>
-            </a:r>
-            <a:r>
-              <a:rPr>
-                <a:solidFill>
-                  <a:schemeClr val="tx1"/>
-                </a:solidFill>
-              </a:rPr>
-              <a:t> a livello </a:t>
-            </a:r>
-            <a:r>
-              <a:rPr i="1">
-                <a:solidFill>
-                  <a:schemeClr val="tx1"/>
-                </a:solidFill>
-              </a:rPr>
-              <a:t>overlay</a:t>
-            </a:r>
-            <a:r>
-              <a:rPr>
-                <a:solidFill>
-                  <a:schemeClr val="tx1"/>
-                </a:solidFill>
-              </a:rPr>
-              <a:t>, non fisico.</a:t>
-            </a:r>
-            <a:br>
-              <a:rPr>
-                <a:solidFill>
-                  <a:schemeClr val="tx1"/>
-                </a:solidFill>
-              </a:rPr>
-            </a:br>
-            <a:endParaRPr>
-              <a:solidFill>
-                <a:schemeClr val="tx1"/>
-              </a:solidFill>
-            </a:endParaRPr>
-          </a:p>
-          <a:p>
-            <a:pPr marL="239821" indent="-239821" algn="l">
-              <a:buFont typeface="Arial"/>
-              <a:buChar char="•"/>
-              <a:defRPr/>
-            </a:pPr>
-            <a:r>
-              <a:rPr>
-                <a:solidFill>
-                  <a:schemeClr val="tx1"/>
-                </a:solidFill>
-              </a:rPr>
-              <a:t>Nodi e Risorse vengono mappate nello stesso</a:t>
-            </a:r>
-            <a:r>
-              <a:rPr i="1">
-                <a:solidFill>
-                  <a:schemeClr val="tx1"/>
-                </a:solidFill>
-              </a:rPr>
-              <a:t> </a:t>
-            </a:r>
-            <a:br>
-              <a:rPr i="1">
-                <a:solidFill>
-                  <a:schemeClr val="tx1"/>
-                </a:solidFill>
-              </a:rPr>
-            </a:br>
-            <a:r>
-              <a:rPr i="1">
-                <a:solidFill>
-                  <a:schemeClr val="tx1"/>
-                </a:solidFill>
-              </a:rPr>
-              <a:t>spazio contiguo </a:t>
-            </a:r>
-            <a:r>
-              <a:rPr b="1" i="0">
-                <a:solidFill>
-                  <a:schemeClr val="tx1"/>
-                </a:solidFill>
-              </a:rPr>
-              <a:t>(consistent hashing)</a:t>
-            </a:r>
-            <a:endParaRPr b="1" i="0">
-              <a:solidFill>
-                <a:schemeClr val="tx1"/>
-              </a:solidFill>
-            </a:endParaRPr>
-          </a:p>
-          <a:p>
-            <a:pPr marL="239821" indent="-239821" algn="l">
-              <a:buFont typeface="Arial"/>
-              <a:buChar char="•"/>
-              <a:defRPr/>
-            </a:pPr>
-            <a:endParaRPr b="1" i="0"/>
-          </a:p>
-          <a:p>
-            <a:pPr marL="239821" indent="-239821" algn="l">
-              <a:buFont typeface="Arial"/>
-              <a:buChar char="•"/>
-              <a:defRPr/>
-            </a:pPr>
-            <a:r>
-              <a:rPr b="0" i="0">
-                <a:solidFill>
-                  <a:schemeClr val="tx1"/>
-                </a:solidFill>
-              </a:rPr>
-              <a:t>Ogni nodo conosce </a:t>
-            </a:r>
-            <a:r>
-              <a:rPr b="0" i="1">
-                <a:solidFill>
-                  <a:schemeClr val="tx1"/>
-                </a:solidFill>
-              </a:rPr>
-              <a:t>m</a:t>
-            </a:r>
-            <a:r>
-              <a:rPr b="0" i="0">
-                <a:solidFill>
-                  <a:schemeClr val="tx1"/>
-                </a:solidFill>
-              </a:rPr>
-              <a:t> vicini, dove </a:t>
-            </a:r>
-            <a:r>
-              <a:rPr b="0" i="1">
-                <a:solidFill>
-                  <a:schemeClr val="tx1"/>
-                </a:solidFill>
-              </a:rPr>
-              <a:t>m</a:t>
-            </a:r>
-            <a:r>
-              <a:rPr b="0" i="0">
-                <a:solidFill>
-                  <a:schemeClr val="tx1"/>
-                </a:solidFill>
-              </a:rPr>
-              <a:t> è il numero di bits</a:t>
-            </a:r>
-            <a:br>
-              <a:rPr b="0" i="0">
-                <a:solidFill>
-                  <a:schemeClr val="tx1"/>
-                </a:solidFill>
-              </a:rPr>
-            </a:br>
-            <a:r>
-              <a:rPr b="0" i="0">
-                <a:solidFill>
-                  <a:schemeClr val="tx1"/>
-                </a:solidFill>
-              </a:rPr>
-              <a:t>usati per identificare univocamente un elemento.</a:t>
-            </a:r>
-            <a:endParaRPr b="0" i="0"/>
+            <a:pPr>
+              <a:defRPr/>
+            </a:pPr>
+            <a:endParaRPr/>
           </a:p>
         </p:txBody>
       </p:sp>
@@ -17087,6 +16879,141 @@
               <a:t>Introduzione</a:t>
             </a:r>
             <a:endParaRPr/>
+          </a:p>
+        </p:txBody>
+      </p:sp>
+      <p:sp>
+        <p:nvSpPr>
+          <p:cNvPr id="589932920" name=""/>
+          <p:cNvSpPr txBox="1"/>
+          <p:nvPr/>
+        </p:nvSpPr>
+        <p:spPr bwMode="auto">
+          <a:xfrm flipH="0" flipV="0">
+            <a:off x="10396" y="1010148"/>
+            <a:ext cx="4742461" cy="518519"/>
+          </a:xfrm>
+          <a:prstGeom prst="rect">
+            <a:avLst/>
+          </a:prstGeom>
+          <a:noFill/>
+        </p:spPr>
+        <p:txBody>
+          <a:bodyPr vertOverflow="overflow" horzOverflow="overflow" vert="horz" wrap="square" lIns="91440" tIns="45720" rIns="91440" bIns="45720" numCol="1" spcCol="0" rtlCol="0" fromWordArt="0" anchor="t" anchorCtr="0" forceAA="0" upright="0" compatLnSpc="0">
+            <a:spAutoFit/>
+          </a:bodyPr>
+          <a:p>
+            <a:pPr marL="239821" indent="-239821" algn="l">
+              <a:buFont typeface="Arial"/>
+              <a:buChar char="•"/>
+              <a:defRPr/>
+            </a:pPr>
+            <a:r>
+              <a:rPr lang="it-IT" sz="1400" b="0" u="none" strike="noStrike" cap="none" spc="0">
+                <a:solidFill>
+                  <a:schemeClr val="tx1"/>
+                </a:solidFill>
+                <a:latin typeface="Arial"/>
+                <a:ea typeface="Arial"/>
+                <a:cs typeface="Arial"/>
+              </a:rPr>
+              <a:t>Nodi e Risorse vengono mappati nello stesso</a:t>
+            </a:r>
+            <a:br>
+              <a:rPr lang="it-IT" sz="1400" b="0" u="none" strike="noStrike" cap="none" spc="0">
+                <a:solidFill>
+                  <a:schemeClr val="tx1"/>
+                </a:solidFill>
+                <a:latin typeface="Arial"/>
+                <a:ea typeface="Arial"/>
+                <a:cs typeface="Arial"/>
+              </a:rPr>
+            </a:br>
+            <a:r>
+              <a:rPr lang="it-IT" sz="1400" b="0" u="none" strike="noStrike" cap="none" spc="0">
+                <a:solidFill>
+                  <a:schemeClr val="tx1"/>
+                </a:solidFill>
+                <a:latin typeface="Arial"/>
+                <a:ea typeface="Arial"/>
+                <a:cs typeface="Arial"/>
+              </a:rPr>
+              <a:t>spazio contiguo (</a:t>
+            </a:r>
+            <a:r>
+              <a:rPr lang="it-IT" sz="1400" b="1" u="none" strike="noStrike" cap="none" spc="0">
+                <a:solidFill>
+                  <a:schemeClr val="tx1"/>
+                </a:solidFill>
+                <a:latin typeface="Arial"/>
+                <a:ea typeface="Arial"/>
+                <a:cs typeface="Arial"/>
+              </a:rPr>
+              <a:t>consistent hashing</a:t>
+            </a:r>
+            <a:r>
+              <a:rPr lang="it-IT" sz="1400" b="0" u="none" strike="noStrike" cap="none" spc="0">
+                <a:solidFill>
+                  <a:schemeClr val="tx1"/>
+                </a:solidFill>
+                <a:latin typeface="Arial"/>
+                <a:ea typeface="Arial"/>
+                <a:cs typeface="Arial"/>
+              </a:rPr>
+              <a:t>)</a:t>
+            </a:r>
+            <a:endParaRPr lang="it-IT" sz="1400" b="0" u="none" strike="noStrike" cap="none" spc="0">
+              <a:solidFill>
+                <a:schemeClr val="tx1"/>
+              </a:solidFill>
+              <a:latin typeface="Arial"/>
+              <a:cs typeface="Arial"/>
+            </a:endParaRPr>
+          </a:p>
+        </p:txBody>
+      </p:sp>
+      <p:sp>
+        <p:nvSpPr>
+          <p:cNvPr id="2014347862" name=""/>
+          <p:cNvSpPr txBox="1"/>
+          <p:nvPr/>
+        </p:nvSpPr>
+        <p:spPr bwMode="auto">
+          <a:xfrm flipH="0" flipV="0">
+            <a:off x="244050" y="3997718"/>
+            <a:ext cx="3573470" cy="518519"/>
+          </a:xfrm>
+          <a:prstGeom prst="rect">
+            <a:avLst/>
+          </a:prstGeom>
+          <a:noFill/>
+        </p:spPr>
+        <p:txBody>
+          <a:bodyPr vertOverflow="overflow" horzOverflow="overflow" vert="horz" wrap="none" lIns="91440" tIns="45720" rIns="91440" bIns="45720" numCol="1" spcCol="0" rtlCol="0" fromWordArt="0" anchor="t" anchorCtr="0" forceAA="0" upright="0" compatLnSpc="0">
+            <a:spAutoFit/>
+          </a:bodyPr>
+          <a:p>
+            <a:pPr>
+              <a:defRPr/>
+            </a:pPr>
+            <a:r>
+              <a:rPr lang="it-IT" sz="1400" b="0" i="1" u="none" strike="noStrike" cap="none" spc="0">
+                <a:solidFill>
+                  <a:schemeClr val="tx1"/>
+                </a:solidFill>
+                <a:latin typeface="Arial"/>
+                <a:ea typeface="Arial"/>
+                <a:cs typeface="Arial"/>
+              </a:rPr>
+              <a:t>Chord ha l’obiettivo di definire tali modalità! </a:t>
+            </a:r>
+            <a:endParaRPr sz="1400"/>
+          </a:p>
+          <a:p>
+            <a:pPr>
+              <a:defRPr/>
+            </a:pPr>
+            <a:endParaRPr b="1"/>
           </a:p>
         </p:txBody>
       </p:sp>
@@ -17124,20 +17051,20 @@
                             </p:stCondLst>
                             <p:childTnLst>
                               <p:par>
-                                <p:cTn id="21" presetID="53" presetClass="entr" presetSubtype="16" fill="hold" grpId="0" nodeType="clickEffect">
+                                <p:cTn id="21" presetID="1" presetClass="entr" presetSubtype="0" fill="hold" grpId="0" nodeType="clickEffect">
                                   <p:stCondLst>
                                     <p:cond delay="0"/>
                                   </p:stCondLst>
                                   <p:childTnLst>
                                     <p:set>
                                       <p:cBhvr>
-                                        <p:cTn id="25" dur="1" fill="hold">
+                                        <p:cTn id="22" dur="1" fill="hold">
                                           <p:stCondLst>
                                             <p:cond delay="0"/>
                                           </p:stCondLst>
                                         </p:cTn>
                                         <p:tgtEl>
-                                          <p:spTgt spid="993482801"/>
+                                          <p:spTgt spid="589932920"/>
                                         </p:tgtEl>
                                         <p:attrNameLst>
                                           <p:attrName>style.visibility</p:attrName>
@@ -17147,60 +17074,6 @@
                                         <p:strVal val="visible"/>
                                       </p:to>
                                     </p:set>
-                                    <p:anim calcmode="lin" valueType="num">
-                                      <p:cBhvr>
-                                        <p:cTn id="24" dur="500" fill="hold"/>
-                                        <p:tgtEl>
-                                          <p:spTgt spid="993482801"/>
-                                        </p:tgtEl>
-                                        <p:attrNameLst>
-                                          <p:attrName>ppt_w</p:attrName>
-                                        </p:attrNameLst>
-                                      </p:cBhvr>
-                                      <p:tavLst>
-                                        <p:tav tm="0">
-                                          <p:val>
-                                            <p:fltVal val="0"/>
-                                          </p:val>
-                                        </p:tav>
-                                        <p:tav tm="100000">
-                                          <p:val>
-                                            <p:strVal val="#ppt_w"/>
-                                          </p:val>
-                                        </p:tav>
-                                      </p:tavLst>
-                                    </p:anim>
-                                    <p:anim calcmode="lin" valueType="num">
-                                      <p:cBhvr>
-                                        <p:cTn id="23" dur="500" fill="hold"/>
-                                        <p:tgtEl>
-                                          <p:spTgt spid="993482801"/>
-                                        </p:tgtEl>
-                                        <p:attrNameLst>
-                                          <p:attrName>ppt_h</p:attrName>
-                                        </p:attrNameLst>
-                                      </p:cBhvr>
-                                      <p:tavLst>
-                                        <p:tav tm="0">
-                                          <p:val>
-                                            <p:fltVal val="0"/>
-                                          </p:val>
-                                        </p:tav>
-                                        <p:tav tm="100000">
-                                          <p:val>
-                                            <p:strVal val="#ppt_h"/>
-                                          </p:val>
-                                        </p:tav>
-                                      </p:tavLst>
-                                    </p:anim>
-                                    <p:animEffect transition="in" filter="fade">
-                                      <p:cBhvr>
-                                        <p:cTn id="22" dur="500"/>
-                                        <p:tgtEl>
-                                          <p:spTgt spid="993482801"/>
-                                        </p:tgtEl>
-                                      </p:cBhvr>
-                                    </p:animEffect>
                                   </p:childTnLst>
                                 </p:cTn>
                               </p:par>
@@ -17236,7 +17109,7 @@
                                           </p:stCondLst>
                                         </p:cTn>
                                         <p:tgtEl>
-                                          <p:spTgt spid="403398718"/>
+                                          <p:spTgt spid="1492571123"/>
                                         </p:tgtEl>
                                         <p:attrNameLst>
                                           <p:attrName>style.visibility</p:attrName>
@@ -17281,7 +17154,7 @@
                                           </p:stCondLst>
                                         </p:cTn>
                                         <p:tgtEl>
-                                          <p:spTgt spid="1492571123"/>
+                                          <p:spTgt spid="243738834"/>
                                         </p:tgtEl>
                                         <p:attrNameLst>
                                           <p:attrName>style.visibility</p:attrName>
@@ -17326,7 +17199,7 @@
                                           </p:stCondLst>
                                         </p:cTn>
                                         <p:tgtEl>
-                                          <p:spTgt spid="243738834"/>
+                                          <p:spTgt spid="841340620"/>
                                         </p:tgtEl>
                                         <p:attrNameLst>
                                           <p:attrName>style.visibility</p:attrName>
@@ -17371,7 +17244,7 @@
                                           </p:stCondLst>
                                         </p:cTn>
                                         <p:tgtEl>
-                                          <p:spTgt spid="841340620"/>
+                                          <p:spTgt spid="2014347862"/>
                                         </p:tgtEl>
                                         <p:attrNameLst>
                                           <p:attrName>style.visibility</p:attrName>
@@ -18406,8 +18279,8 @@
         </p:nvSpPr>
         <p:spPr bwMode="auto">
           <a:xfrm flipH="0" flipV="0">
-            <a:off x="10396" y="975386"/>
-            <a:ext cx="5514240" cy="518519"/>
+            <a:off x="10395" y="975385"/>
+            <a:ext cx="5515679" cy="518519"/>
           </a:xfrm>
           <a:prstGeom prst="rect">
             <a:avLst/>
@@ -18425,6 +18298,24 @@
               <a:defRPr/>
             </a:pPr>
             <a:r>
+              <a:rPr lang="it-IT" sz="1400" b="0" i="0" u="none" strike="noStrike" cap="none" spc="0">
+                <a:solidFill>
+                  <a:schemeClr val="tx1"/>
+                </a:solidFill>
+                <a:latin typeface="Arial"/>
+                <a:ea typeface="Arial"/>
+                <a:cs typeface="Arial"/>
+              </a:rPr>
+              <a:t>IP statico e noto a tutti.</a:t>
+            </a:r>
+            <a:br>
+              <a:rPr>
+                <a:solidFill>
+                  <a:schemeClr val="tx1"/>
+                </a:solidFill>
+              </a:rPr>
+            </a:br>
+            <a:r>
               <a:rPr>
                 <a:solidFill>
                   <a:schemeClr val="tx1"/>
@@ -18455,21 +18346,6 @@
                 </a:solidFill>
               </a:rPr>
               <a:t> </a:t>
-            </a:r>
-            <a:br>
-              <a:rPr>
-                <a:solidFill>
-                  <a:schemeClr val="tx1"/>
-                </a:solidFill>
-              </a:rPr>
-            </a:br>
-            <a:r>
-              <a:rPr>
-                <a:solidFill>
-                  <a:schemeClr val="tx1"/>
-                </a:solidFill>
-              </a:rPr>
-              <a:t>IP statico e noto a tutti.</a:t>
             </a:r>
             <a:endParaRPr>
               <a:solidFill>
@@ -18487,8 +18363,8 @@
         </p:nvSpPr>
         <p:spPr bwMode="auto">
           <a:xfrm flipH="0" flipV="0">
-            <a:off x="-10291" y="2154915"/>
-            <a:ext cx="4614831" cy="731879"/>
+            <a:off x="-10290" y="2154915"/>
+            <a:ext cx="4643270" cy="518519"/>
           </a:xfrm>
           <a:prstGeom prst="rect">
             <a:avLst/>
@@ -18527,15 +18403,7 @@
                   <a:schemeClr val="tx1"/>
                 </a:solidFill>
               </a:rPr>
-              <a:t> nodo un punto di accesso nel sistema, fornendogli</a:t>
-            </a:r>
-            <a:r>
-              <a:rPr>
-                <a:solidFill>
-                  <a:schemeClr val="tx1"/>
-                </a:solidFill>
-              </a:rPr>
-              <a:t> il contatto dei nodi adiacenti con cui instaurare la connessione.</a:t>
+              <a:t> nodo un punto di accesso nel sistema, mantenendo la lista dei nodi presenti.</a:t>
             </a:r>
             <a:endParaRPr b="1" i="0">
               <a:solidFill>
@@ -18553,8 +18421,8 @@
         </p:nvSpPr>
         <p:spPr bwMode="auto">
           <a:xfrm flipH="0" flipV="0">
-            <a:off x="-10293" y="3361295"/>
-            <a:ext cx="5066092" cy="731879"/>
+            <a:off x="-10291" y="3361293"/>
+            <a:ext cx="5121530" cy="518519"/>
           </a:xfrm>
           <a:prstGeom prst="rect">
             <a:avLst/>
@@ -18583,22 +18451,15 @@
                   <a:schemeClr val="tx1"/>
                 </a:solidFill>
               </a:rPr>
-              <a:t>Se un nodo lascia involontariamente il sistema, il Registry</a:t>
-            </a:r>
-            <a:br>
+              <a:t>F</a:t>
+            </a:r>
+            <a:r>
               <a:rPr b="0" i="0">
                 <a:solidFill>
                   <a:schemeClr val="tx1"/>
                 </a:solidFill>
               </a:rPr>
-            </a:br>
-            <a:r>
-              <a:rPr b="0" i="0">
-                <a:solidFill>
-                  <a:schemeClr val="tx1"/>
-                </a:solidFill>
-              </a:rPr>
-              <a:t>fornisce supporto per la riconfigurazione dei nodi limitrofi.</a:t>
+              <a:t>ornisce supporto per il controllo di eventuali nodi caduti.</a:t>
             </a:r>
             <a:endParaRPr b="0" i="0">
               <a:solidFill>
@@ -19758,8 +19619,8 @@
         </p:nvSpPr>
         <p:spPr bwMode="auto">
           <a:xfrm flipH="0" flipV="0">
-            <a:off x="23717" y="975386"/>
-            <a:ext cx="5553120" cy="518519"/>
+            <a:off x="23715" y="732045"/>
+            <a:ext cx="5604958" cy="731879"/>
           </a:xfrm>
           <a:prstGeom prst="rect">
             <a:avLst/>
@@ -19782,7 +19643,7 @@
                   <a:schemeClr val="tx1"/>
                 </a:solidFill>
               </a:rPr>
-              <a:t>Ogni nodo possiede una propria FT. </a:t>
+              <a:t>Ogni nodo possiede una propria Finger Table. </a:t>
             </a:r>
             <a:br>
               <a:rPr>
@@ -19805,7 +19666,38 @@
                   <a:schemeClr val="tx1"/>
                 </a:solidFill>
               </a:rPr>
-              <a:t> stesso numero di righe.</a:t>
+              <a:t> stesso numero di righe, pari ad </a:t>
+            </a:r>
+            <a:br>
+              <a:rPr>
+                <a:solidFill>
+                  <a:schemeClr val="tx1"/>
+                </a:solidFill>
+              </a:rPr>
+            </a:br>
+            <a:r>
+              <a:rPr>
+                <a:solidFill>
+                  <a:schemeClr val="tx1"/>
+                </a:solidFill>
+              </a:rPr>
+              <a:t>“</a:t>
+            </a:r>
+            <a:r>
+              <a:rPr i="1">
+                <a:solidFill>
+                  <a:schemeClr val="tx1"/>
+                </a:solidFill>
+              </a:rPr>
+              <a:t>m</a:t>
+            </a:r>
+            <a:r>
+              <a:rPr>
+                <a:solidFill>
+                  <a:schemeClr val="tx1"/>
+                </a:solidFill>
+              </a:rPr>
+              <a:t>”, cioè il numero di bit usati per un identificativo.</a:t>
             </a:r>
             <a:endParaRPr>
               <a:solidFill>
@@ -20441,7 +20333,7 @@
         <p:spPr bwMode="auto">
           <a:xfrm flipH="0" flipV="0">
             <a:off x="1242342" y="2480130"/>
-            <a:ext cx="4146087" cy="396599"/>
+            <a:ext cx="4175966" cy="396599"/>
           </a:xfrm>
           <a:prstGeom prst="rect">
             <a:avLst/>
@@ -20493,7 +20385,7 @@
                   <a:schemeClr val="tx1"/>
                 </a:solidFill>
               </a:rPr>
-              <a:t>Il risultato è ottenuto ricorsivamente, interrogando i nodi successori.</a:t>
+              <a:t>Tale operazione è svolta da un nodo presente nel sistema.</a:t>
             </a:r>
             <a:endParaRPr sz="1000" i="1">
               <a:solidFill>

</xml_diff>

<commit_message>
[Fine Progetto] - Aggiornamento slide
</commit_message>
<xml_diff>
--- a/Documentazione/Presentazione/Presentazione_Chord_Festa_0320408.pptx
+++ b/Documentazione/Presentazione/Presentazione_Chord_Festa_0320408.pptx
@@ -6055,29 +6055,6 @@
           </a:fontRef>
         </p:style>
       </p:cxnSp>
-      <p:pic>
-        <p:nvPicPr>
-          <p:cNvPr id="1556528359" name=""/>
-          <p:cNvPicPr>
-            <a:picLocks noChangeAspect="1"/>
-          </p:cNvPicPr>
-          <p:nvPr/>
-        </p:nvPicPr>
-        <p:blipFill>
-          <a:blip r:embed="rId5"/>
-          <a:srcRect l="34817" t="5095" r="7766" b="9022"/>
-          <a:stretch/>
-        </p:blipFill>
-        <p:spPr bwMode="auto">
-          <a:xfrm flipH="0" flipV="0">
-            <a:off x="8118980" y="1341840"/>
-            <a:ext cx="945172" cy="836827"/>
-          </a:xfrm>
-          <a:prstGeom prst="rect">
-            <a:avLst/>
-          </a:prstGeom>
-        </p:spPr>
-      </p:pic>
       <p:cxnSp>
         <p:nvCxnSpPr>
           <p:cNvPr id="1290522748" name=""/>
@@ -6087,9 +6064,9 @@
           <p:nvPr/>
         </p:nvCxnSpPr>
         <p:spPr bwMode="auto">
-          <a:xfrm flipH="1" flipV="0">
-            <a:off x="5235985" y="1992921"/>
-            <a:ext cx="2516647" cy="761053"/>
+          <a:xfrm flipH="0" flipV="0">
+            <a:off x="7752631" y="1992920"/>
+            <a:ext cx="339118" cy="761052"/>
           </a:xfrm>
           <a:prstGeom prst="line">
             <a:avLst/>
@@ -6392,8 +6369,8 @@
           <p:nvPr/>
         </p:nvSpPr>
         <p:spPr bwMode="auto">
-          <a:xfrm rot="20626203" flipH="0" flipV="0">
-            <a:off x="5490491" y="2306173"/>
+          <a:xfrm rot="0" flipH="0" flipV="0">
+            <a:off x="5490490" y="2623672"/>
             <a:ext cx="2362779" cy="228960"/>
           </a:xfrm>
           <a:prstGeom prst="rect">
@@ -6414,6 +6391,204 @@
               <a:t>contatto il nodo che dovrà gestire la risorsa</a:t>
             </a:r>
             <a:endParaRPr sz="900"/>
+          </a:p>
+        </p:txBody>
+      </p:sp>
+      <p:pic>
+        <p:nvPicPr>
+          <p:cNvPr id="1233248786" name=""/>
+          <p:cNvPicPr>
+            <a:picLocks noChangeAspect="1"/>
+          </p:cNvPicPr>
+          <p:nvPr/>
+        </p:nvPicPr>
+        <p:blipFill>
+          <a:blip r:embed="rId5"/>
+          <a:stretch/>
+        </p:blipFill>
+        <p:spPr bwMode="auto">
+          <a:xfrm flipH="0" flipV="0">
+            <a:off x="8091750" y="1062219"/>
+            <a:ext cx="929716" cy="811029"/>
+          </a:xfrm>
+          <a:prstGeom prst="rect">
+            <a:avLst/>
+          </a:prstGeom>
+        </p:spPr>
+      </p:pic>
+      <p:pic>
+        <p:nvPicPr>
+          <p:cNvPr id="998133622" name=""/>
+          <p:cNvPicPr>
+            <a:picLocks noChangeAspect="1"/>
+          </p:cNvPicPr>
+          <p:nvPr/>
+        </p:nvPicPr>
+        <p:blipFill>
+          <a:blip r:embed="rId6"/>
+          <a:stretch/>
+        </p:blipFill>
+        <p:spPr bwMode="auto">
+          <a:xfrm flipH="0" flipV="0">
+            <a:off x="8118977" y="3070321"/>
+            <a:ext cx="902489" cy="787277"/>
+          </a:xfrm>
+          <a:prstGeom prst="rect">
+            <a:avLst/>
+          </a:prstGeom>
+        </p:spPr>
+      </p:pic>
+      <p:cxnSp>
+        <p:nvCxnSpPr>
+          <p:cNvPr id="40144750" name=""/>
+          <p:cNvCxnSpPr>
+            <a:cxnSpLocks/>
+          </p:cNvCxnSpPr>
+          <p:nvPr/>
+        </p:nvCxnSpPr>
+        <p:spPr bwMode="auto">
+          <a:xfrm flipH="1" flipV="0">
+            <a:off x="5432749" y="2906373"/>
+            <a:ext cx="2313828" cy="0"/>
+          </a:xfrm>
+          <a:prstGeom prst="line">
+            <a:avLst/>
+          </a:prstGeom>
+          <a:ln w="25399" cap="flat" cmpd="sng" algn="ctr">
+            <a:solidFill>
+              <a:schemeClr val="bg2">
+                <a:lumMod val="40000"/>
+                <a:lumOff val="60000"/>
+              </a:schemeClr>
+            </a:solidFill>
+            <a:prstDash val="solid"/>
+            <a:tailEnd type="arrow" len="med"/>
+          </a:ln>
+        </p:spPr>
+        <p:style>
+          <a:lnRef idx="1">
+            <a:schemeClr val="accent1">
+              <a:shade val="50000"/>
+            </a:schemeClr>
+          </a:lnRef>
+          <a:fillRef idx="0">
+            <a:schemeClr val="accent1"/>
+          </a:fillRef>
+          <a:effectRef idx="0">
+            <a:schemeClr val="accent1"/>
+          </a:effectRef>
+          <a:fontRef idx="minor">
+            <a:schemeClr val="tx1"/>
+          </a:fontRef>
+        </p:style>
+      </p:cxnSp>
+      <p:sp>
+        <p:nvSpPr>
+          <p:cNvPr id="2012864540" name=""/>
+          <p:cNvSpPr txBox="1"/>
+          <p:nvPr/>
+        </p:nvSpPr>
+        <p:spPr bwMode="auto">
+          <a:xfrm flipH="0" flipV="0">
+            <a:off x="6927629" y="517825"/>
+            <a:ext cx="2159857" cy="457560"/>
+          </a:xfrm>
+          <a:prstGeom prst="rect">
+            <a:avLst/>
+          </a:prstGeom>
+          <a:noFill/>
+        </p:spPr>
+        <p:txBody>
+          <a:bodyPr vertOverflow="overflow" horzOverflow="overflow" vert="horz" wrap="square" lIns="91440" tIns="45720" rIns="91440" bIns="45720" numCol="1" spcCol="0" rtlCol="0" fromWordArt="0" anchor="t" anchorCtr="0" forceAA="0" upright="0" compatLnSpc="0">
+            <a:spAutoFit/>
+          </a:bodyPr>
+          <a:p>
+            <a:pPr algn="ctr">
+              <a:defRPr/>
+            </a:pPr>
+            <a:r>
+              <a:rPr sz="1200"/>
+              <a:t>2 è il nodo più lontano</a:t>
+            </a:r>
+            <a:endParaRPr sz="1200"/>
+          </a:p>
+          <a:p>
+            <a:pPr algn="ctr">
+              <a:defRPr/>
+            </a:pPr>
+            <a:r>
+              <a:rPr sz="1200"/>
+              <a:t>che non eccede la risorsa</a:t>
+            </a:r>
+            <a:endParaRPr/>
+          </a:p>
+        </p:txBody>
+      </p:sp>
+      <p:sp>
+        <p:nvSpPr>
+          <p:cNvPr id="523682948" name=""/>
+          <p:cNvSpPr txBox="1"/>
+          <p:nvPr/>
+        </p:nvSpPr>
+        <p:spPr bwMode="auto">
+          <a:xfrm flipH="0" flipV="0">
+            <a:off x="7752631" y="3957233"/>
+            <a:ext cx="1405787" cy="640440"/>
+          </a:xfrm>
+          <a:prstGeom prst="rect">
+            <a:avLst/>
+          </a:prstGeom>
+          <a:noFill/>
+        </p:spPr>
+        <p:txBody>
+          <a:bodyPr vertOverflow="overflow" horzOverflow="overflow" vert="horz" wrap="square" lIns="91440" tIns="45720" rIns="91440" bIns="45720" numCol="1" spcCol="0" rtlCol="0" fromWordArt="0" anchor="t" anchorCtr="0" forceAA="0" upright="0" compatLnSpc="0">
+            <a:spAutoFit/>
+          </a:bodyPr>
+          <a:p>
+            <a:pPr algn="l">
+              <a:defRPr/>
+            </a:pPr>
+            <a:r>
+              <a:rPr sz="1200"/>
+              <a:t>6 è il nodo più lontano </a:t>
+            </a:r>
+            <a:r>
+              <a:rPr sz="1200"/>
+              <a:t>che non eccede la risorsa</a:t>
+            </a:r>
+            <a:endParaRPr sz="1200"/>
+          </a:p>
+        </p:txBody>
+      </p:sp>
+      <p:sp>
+        <p:nvSpPr>
+          <p:cNvPr id="1622417152" name=""/>
+          <p:cNvSpPr txBox="1"/>
+          <p:nvPr/>
+        </p:nvSpPr>
+        <p:spPr bwMode="auto">
+          <a:xfrm flipH="0" flipV="0">
+            <a:off x="-12375" y="4571999"/>
+            <a:ext cx="6172623" cy="274679"/>
+          </a:xfrm>
+          <a:prstGeom prst="rect">
+            <a:avLst/>
+          </a:prstGeom>
+          <a:noFill/>
+        </p:spPr>
+        <p:txBody>
+          <a:bodyPr vertOverflow="overflow" horzOverflow="overflow" vert="horz" wrap="none" lIns="91440" tIns="45720" rIns="91440" bIns="45720" numCol="1" spcCol="0" rtlCol="0" fromWordArt="0" anchor="t" anchorCtr="0" forceAA="0" upright="0" compatLnSpc="0">
+            <a:spAutoFit/>
+          </a:bodyPr>
+          <a:p>
+            <a:pPr>
+              <a:defRPr/>
+            </a:pPr>
+            <a:r>
+              <a:rPr sz="1200" i="1"/>
+              <a:t>NB: Il nodo fornito dal server sarà il nodo che informerà il client dell’esito dell’operazione.</a:t>
+            </a:r>
+            <a:endParaRPr sz="1200" i="1"/>
           </a:p>
         </p:txBody>
       </p:sp>
@@ -6439,32 +6614,167 @@
               <p:cTn id="2" dur="indefinite" nodeType="mainSeq">
                 <p:childTnLst>
                   <p:par>
-                    <p:cTn id="55" fill="hold">
+                    <p:cTn id="69" fill="hold">
                       <p:stCondLst>
                         <p:cond delay="indefinite"/>
                       </p:stCondLst>
                       <p:childTnLst>
                         <p:par>
-                          <p:cTn id="56" fill="hold">
+                          <p:cTn id="70" fill="hold">
                             <p:stCondLst>
                               <p:cond delay="0"/>
                             </p:stCondLst>
                             <p:childTnLst>
                               <p:par>
-                                <p:cTn id="57" presetID="1" presetClass="entr" presetSubtype="0" fill="hold" grpId="0" nodeType="clickEffect">
+                                <p:cTn id="71" presetID="1" presetClass="entr" presetSubtype="0" fill="hold" grpId="0" nodeType="clickEffect">
                                   <p:stCondLst>
                                     <p:cond delay="0"/>
                                   </p:stCondLst>
                                   <p:childTnLst>
                                     <p:set>
                                       <p:cBhvr>
-                                        <p:cTn id="58" dur="1" fill="hold">
+                                        <p:cTn id="72" dur="1" fill="hold">
                                           <p:stCondLst>
                                             <p:cond delay="0"/>
                                           </p:stCondLst>
                                         </p:cTn>
                                         <p:tgtEl>
                                           <p:spTgt spid="219797608"/>
+                                        </p:tgtEl>
+                                        <p:attrNameLst>
+                                          <p:attrName>style.visibility</p:attrName>
+                                        </p:attrNameLst>
+                                      </p:cBhvr>
+                                      <p:to>
+                                        <p:strVal val="visible"/>
+                                      </p:to>
+                                    </p:set>
+                                  </p:childTnLst>
+                                </p:cTn>
+                              </p:par>
+                            </p:childTnLst>
+                          </p:cTn>
+                        </p:par>
+                      </p:childTnLst>
+                    </p:cTn>
+                  </p:par>
+                  <p:par>
+                    <p:cTn id="65" fill="hold">
+                      <p:stCondLst>
+                        <p:cond delay="indefinite"/>
+                      </p:stCondLst>
+                      <p:childTnLst>
+                        <p:par>
+                          <p:cTn id="66" fill="hold">
+                            <p:stCondLst>
+                              <p:cond delay="0"/>
+                            </p:stCondLst>
+                            <p:childTnLst>
+                              <p:par>
+                                <p:cTn id="67" presetID="1" presetClass="entr" presetSubtype="0" fill="hold" grpId="0" nodeType="clickEffect">
+                                  <p:stCondLst>
+                                    <p:cond delay="0"/>
+                                  </p:stCondLst>
+                                  <p:childTnLst>
+                                    <p:set>
+                                      <p:cBhvr>
+                                        <p:cTn id="68" dur="1" fill="hold">
+                                          <p:stCondLst>
+                                            <p:cond delay="0"/>
+                                          </p:stCondLst>
+                                        </p:cTn>
+                                        <p:tgtEl>
+                                          <p:spTgt spid="164047779"/>
+                                        </p:tgtEl>
+                                        <p:attrNameLst>
+                                          <p:attrName>style.visibility</p:attrName>
+                                        </p:attrNameLst>
+                                      </p:cBhvr>
+                                      <p:to>
+                                        <p:strVal val="visible"/>
+                                      </p:to>
+                                    </p:set>
+                                  </p:childTnLst>
+                                </p:cTn>
+                              </p:par>
+                            </p:childTnLst>
+                          </p:cTn>
+                        </p:par>
+                      </p:childTnLst>
+                    </p:cTn>
+                  </p:par>
+                  <p:par>
+                    <p:cTn id="61" fill="hold">
+                      <p:stCondLst>
+                        <p:cond delay="indefinite"/>
+                      </p:stCondLst>
+                      <p:childTnLst>
+                        <p:par>
+                          <p:cTn id="62" fill="hold">
+                            <p:stCondLst>
+                              <p:cond delay="0"/>
+                            </p:stCondLst>
+                            <p:childTnLst>
+                              <p:par>
+                                <p:cTn id="63" presetID="1" presetClass="entr" presetSubtype="0" fill="hold" grpId="0" nodeType="clickEffect">
+                                  <p:stCondLst>
+                                    <p:cond delay="0"/>
+                                  </p:stCondLst>
+                                  <p:childTnLst>
+                                    <p:set>
+                                      <p:cBhvr>
+                                        <p:cTn id="64" dur="1" fill="hold">
+                                          <p:stCondLst>
+                                            <p:cond delay="0"/>
+                                          </p:stCondLst>
+                                        </p:cTn>
+                                        <p:tgtEl>
+                                          <p:spTgt spid="2144878735"/>
+                                        </p:tgtEl>
+                                        <p:attrNameLst>
+                                          <p:attrName>style.visibility</p:attrName>
+                                        </p:attrNameLst>
+                                      </p:cBhvr>
+                                      <p:to>
+                                        <p:strVal val="visible"/>
+                                      </p:to>
+                                    </p:set>
+                                  </p:childTnLst>
+                                </p:cTn>
+                              </p:par>
+                            </p:childTnLst>
+                          </p:cTn>
+                        </p:par>
+                      </p:childTnLst>
+                    </p:cTn>
+                  </p:par>
+                  <p:par>
+                    <p:cTn id="57" fill="hold">
+                      <p:stCondLst>
+                        <p:cond delay="indefinite"/>
+                      </p:stCondLst>
+                      <p:childTnLst>
+                        <p:par>
+                          <p:cTn id="58" fill="hold">
+                            <p:stCondLst>
+                              <p:cond delay="0"/>
+                            </p:stCondLst>
+                            <p:childTnLst>
+                              <p:par>
+                                <p:cTn id="59" presetID="1" presetClass="entr" presetSubtype="0" fill="hold" grpId="0" nodeType="clickEffect">
+                                  <p:stCondLst>
+                                    <p:cond delay="0"/>
+                                  </p:stCondLst>
+                                  <p:childTnLst>
+                                    <p:set>
+                                      <p:cBhvr>
+                                        <p:cTn id="60" dur="1" fill="hold">
+                                          <p:stCondLst>
+                                            <p:cond delay="0"/>
+                                          </p:stCondLst>
+                                        </p:cTn>
+                                        <p:tgtEl>
+                                          <p:spTgt spid="1938985483"/>
                                         </p:tgtEl>
                                         <p:attrNameLst>
                                           <p:attrName>style.visibility</p:attrName>
@@ -6496,7 +6806,34 @@
                             </p:stCondLst>
                             <p:childTnLst>
                               <p:par>
-                                <p:cTn id="53" presetID="1" presetClass="entr" presetSubtype="0" fill="hold" grpId="0" nodeType="clickEffect">
+                                <p:cTn id="55" presetID="1" presetClass="entr" presetSubtype="0" fill="hold" grpId="0" nodeType="clickEffect">
+                                  <p:stCondLst>
+                                    <p:cond delay="0"/>
+                                  </p:stCondLst>
+                                  <p:childTnLst>
+                                    <p:set>
+                                      <p:cBhvr>
+                                        <p:cTn id="56" dur="1" fill="hold">
+                                          <p:stCondLst>
+                                            <p:cond delay="0"/>
+                                          </p:stCondLst>
+                                        </p:cTn>
+                                        <p:tgtEl>
+                                          <p:spTgt spid="538431100"/>
+                                        </p:tgtEl>
+                                        <p:attrNameLst>
+                                          <p:attrName>style.visibility</p:attrName>
+                                        </p:attrNameLst>
+                                      </p:cBhvr>
+                                      <p:to>
+                                        <p:strVal val="visible"/>
+                                      </p:to>
+                                    </p:set>
+                                  </p:childTnLst>
+                                </p:cTn>
+                              </p:par>
+                              <p:par>
+                                <p:cTn id="53" presetID="1" presetClass="entr" presetSubtype="0" fill="hold" grpId="0" nodeType="withEffect">
                                   <p:stCondLst>
                                     <p:cond delay="0"/>
                                   </p:stCondLst>
@@ -6509,7 +6846,7 @@
                                           </p:stCondLst>
                                         </p:cTn>
                                         <p:tgtEl>
-                                          <p:spTgt spid="164047779"/>
+                                          <p:spTgt spid="632132245"/>
                                         </p:tgtEl>
                                         <p:attrNameLst>
                                           <p:attrName>style.visibility</p:attrName>
@@ -6529,13 +6866,13 @@
                     </p:cTn>
                   </p:par>
                   <p:par>
-                    <p:cTn id="47" fill="hold">
+                    <p:cTn id="45" fill="hold">
                       <p:stCondLst>
                         <p:cond delay="indefinite"/>
                       </p:stCondLst>
                       <p:childTnLst>
                         <p:par>
-                          <p:cTn id="48" fill="hold">
+                          <p:cTn id="46" fill="hold">
                             <p:stCondLst>
                               <p:cond delay="0"/>
                             </p:stCondLst>
@@ -6554,7 +6891,7 @@
                                           </p:stCondLst>
                                         </p:cTn>
                                         <p:tgtEl>
-                                          <p:spTgt spid="2144878735"/>
+                                          <p:spTgt spid="1599826183"/>
                                         </p:tgtEl>
                                         <p:attrNameLst>
                                           <p:attrName>style.visibility</p:attrName>
@@ -6567,39 +6904,21 @@
                                   </p:childTnLst>
                                 </p:cTn>
                               </p:par>
-                            </p:childTnLst>
-                          </p:cTn>
-                        </p:par>
-                      </p:childTnLst>
-                    </p:cTn>
-                  </p:par>
-                  <p:par>
-                    <p:cTn id="43" fill="hold">
-                      <p:stCondLst>
-                        <p:cond delay="indefinite"/>
-                      </p:stCondLst>
-                      <p:childTnLst>
-                        <p:par>
-                          <p:cTn id="44" fill="hold">
-                            <p:stCondLst>
-                              <p:cond delay="0"/>
-                            </p:stCondLst>
-                            <p:childTnLst>
                               <p:par>
-                                <p:cTn id="45" presetID="1" presetClass="entr" presetSubtype="0" fill="hold" grpId="0" nodeType="clickEffect">
+                                <p:cTn id="47" presetID="1" presetClass="entr" presetSubtype="0" fill="hold" grpId="0" nodeType="withEffect">
                                   <p:stCondLst>
                                     <p:cond delay="0"/>
                                   </p:stCondLst>
                                   <p:childTnLst>
                                     <p:set>
                                       <p:cBhvr>
-                                        <p:cTn id="46" dur="1" fill="hold">
+                                        <p:cTn id="48" dur="1" fill="hold">
                                           <p:stCondLst>
                                             <p:cond delay="0"/>
                                           </p:stCondLst>
                                         </p:cTn>
                                         <p:tgtEl>
-                                          <p:spTgt spid="1938985483"/>
+                                          <p:spTgt spid="1339286680"/>
                                         </p:tgtEl>
                                         <p:attrNameLst>
                                           <p:attrName>style.visibility</p:attrName>
@@ -6631,7 +6950,34 @@
                             </p:stCondLst>
                             <p:childTnLst>
                               <p:par>
-                                <p:cTn id="41" presetID="1" presetClass="entr" presetSubtype="0" fill="hold" grpId="0" nodeType="clickEffect">
+                                <p:cTn id="43" presetID="1" presetClass="entr" presetSubtype="0" fill="hold" grpId="0" nodeType="clickEffect">
+                                  <p:stCondLst>
+                                    <p:cond delay="0"/>
+                                  </p:stCondLst>
+                                  <p:childTnLst>
+                                    <p:set>
+                                      <p:cBhvr>
+                                        <p:cTn id="44" dur="1" fill="hold">
+                                          <p:stCondLst>
+                                            <p:cond delay="0"/>
+                                          </p:stCondLst>
+                                        </p:cTn>
+                                        <p:tgtEl>
+                                          <p:spTgt spid="184983822"/>
+                                        </p:tgtEl>
+                                        <p:attrNameLst>
+                                          <p:attrName>style.visibility</p:attrName>
+                                        </p:attrNameLst>
+                                      </p:cBhvr>
+                                      <p:to>
+                                        <p:strVal val="visible"/>
+                                      </p:to>
+                                    </p:set>
+                                  </p:childTnLst>
+                                </p:cTn>
+                              </p:par>
+                              <p:par>
+                                <p:cTn id="41" presetID="1" presetClass="entr" presetSubtype="0" fill="hold" grpId="0" nodeType="withEffect">
                                   <p:stCondLst>
                                     <p:cond delay="0"/>
                                   </p:stCondLst>
@@ -6644,7 +6990,7 @@
                                           </p:stCondLst>
                                         </p:cTn>
                                         <p:tgtEl>
-                                          <p:spTgt spid="538431100"/>
+                                          <p:spTgt spid="823839044"/>
                                         </p:tgtEl>
                                         <p:attrNameLst>
                                           <p:attrName>style.visibility</p:attrName>
@@ -6671,7 +7017,7 @@
                                           </p:stCondLst>
                                         </p:cTn>
                                         <p:tgtEl>
-                                          <p:spTgt spid="632132245"/>
+                                          <p:spTgt spid="1630668728"/>
                                         </p:tgtEl>
                                         <p:attrNameLst>
                                           <p:attrName>style.visibility</p:attrName>
@@ -6691,13 +7037,13 @@
                     </p:cTn>
                   </p:par>
                   <p:par>
-                    <p:cTn id="31" fill="hold">
+                    <p:cTn id="33" fill="hold">
                       <p:stCondLst>
                         <p:cond delay="indefinite"/>
                       </p:stCondLst>
                       <p:childTnLst>
                         <p:par>
-                          <p:cTn id="32" fill="hold">
+                          <p:cTn id="34" fill="hold">
                             <p:stCondLst>
                               <p:cond delay="0"/>
                             </p:stCondLst>
@@ -6716,34 +7062,7 @@
                                           </p:stCondLst>
                                         </p:cTn>
                                         <p:tgtEl>
-                                          <p:spTgt spid="1339286680"/>
-                                        </p:tgtEl>
-                                        <p:attrNameLst>
-                                          <p:attrName>style.visibility</p:attrName>
-                                        </p:attrNameLst>
-                                      </p:cBhvr>
-                                      <p:to>
-                                        <p:strVal val="visible"/>
-                                      </p:to>
-                                    </p:set>
-                                  </p:childTnLst>
-                                </p:cTn>
-                              </p:par>
-                              <p:par>
-                                <p:cTn id="33" presetID="1" presetClass="entr" presetSubtype="0" fill="hold" grpId="0" nodeType="withEffect">
-                                  <p:stCondLst>
-                                    <p:cond delay="0"/>
-                                  </p:stCondLst>
-                                  <p:childTnLst>
-                                    <p:set>
-                                      <p:cBhvr>
-                                        <p:cTn id="34" dur="1" fill="hold">
-                                          <p:stCondLst>
-                                            <p:cond delay="0"/>
-                                          </p:stCondLst>
-                                        </p:cTn>
-                                        <p:tgtEl>
-                                          <p:spTgt spid="1599826183"/>
+                                          <p:spTgt spid="662070896"/>
                                         </p:tgtEl>
                                         <p:attrNameLst>
                                           <p:attrName>style.visibility</p:attrName>
@@ -6775,7 +7094,34 @@
                             </p:stCondLst>
                             <p:childTnLst>
                               <p:par>
-                                <p:cTn id="29" presetID="1" presetClass="entr" presetSubtype="0" fill="hold" grpId="0" nodeType="clickEffect">
+                                <p:cTn id="31" presetID="1" presetClass="entr" presetSubtype="0" fill="hold" grpId="0" nodeType="clickEffect">
+                                  <p:stCondLst>
+                                    <p:cond delay="0"/>
+                                  </p:stCondLst>
+                                  <p:childTnLst>
+                                    <p:set>
+                                      <p:cBhvr>
+                                        <p:cTn id="32" dur="1" fill="hold">
+                                          <p:stCondLst>
+                                            <p:cond delay="0"/>
+                                          </p:stCondLst>
+                                        </p:cTn>
+                                        <p:tgtEl>
+                                          <p:spTgt spid="1233248786"/>
+                                        </p:tgtEl>
+                                        <p:attrNameLst>
+                                          <p:attrName>style.visibility</p:attrName>
+                                        </p:attrNameLst>
+                                      </p:cBhvr>
+                                      <p:to>
+                                        <p:strVal val="visible"/>
+                                      </p:to>
+                                    </p:set>
+                                  </p:childTnLst>
+                                </p:cTn>
+                              </p:par>
+                              <p:par>
+                                <p:cTn id="29" presetID="1" presetClass="entr" presetSubtype="0" fill="hold" grpId="0" nodeType="withEffect">
                                   <p:stCondLst>
                                     <p:cond delay="0"/>
                                   </p:stCondLst>
@@ -6788,7 +7134,7 @@
                                           </p:stCondLst>
                                         </p:cTn>
                                         <p:tgtEl>
-                                          <p:spTgt spid="184983822"/>
+                                          <p:spTgt spid="2012864540"/>
                                         </p:tgtEl>
                                         <p:attrNameLst>
                                           <p:attrName>style.visibility</p:attrName>
@@ -6808,13 +7154,13 @@
                     </p:cTn>
                   </p:par>
                   <p:par>
-                    <p:cTn id="21" fill="hold">
+                    <p:cTn id="23" fill="hold">
                       <p:stCondLst>
                         <p:cond delay="indefinite"/>
                       </p:stCondLst>
                       <p:childTnLst>
                         <p:par>
-                          <p:cTn id="22" fill="hold">
+                          <p:cTn id="24" fill="hold">
                             <p:stCondLst>
                               <p:cond delay="0"/>
                             </p:stCondLst>
@@ -6833,34 +7179,7 @@
                                           </p:stCondLst>
                                         </p:cTn>
                                         <p:tgtEl>
-                                          <p:spTgt spid="823839044"/>
-                                        </p:tgtEl>
-                                        <p:attrNameLst>
-                                          <p:attrName>style.visibility</p:attrName>
-                                        </p:attrNameLst>
-                                      </p:cBhvr>
-                                      <p:to>
-                                        <p:strVal val="visible"/>
-                                      </p:to>
-                                    </p:set>
-                                  </p:childTnLst>
-                                </p:cTn>
-                              </p:par>
-                              <p:par>
-                                <p:cTn id="23" presetID="1" presetClass="entr" presetSubtype="0" fill="hold" grpId="0" nodeType="withEffect">
-                                  <p:stCondLst>
-                                    <p:cond delay="0"/>
-                                  </p:stCondLst>
-                                  <p:childTnLst>
-                                    <p:set>
-                                      <p:cBhvr>
-                                        <p:cTn id="24" dur="1" fill="hold">
-                                          <p:stCondLst>
-                                            <p:cond delay="0"/>
-                                          </p:stCondLst>
-                                        </p:cTn>
-                                        <p:tgtEl>
-                                          <p:spTgt spid="1630668728"/>
+                                          <p:spTgt spid="1290522748"/>
                                         </p:tgtEl>
                                         <p:attrNameLst>
                                           <p:attrName>style.visibility</p:attrName>
@@ -6892,7 +7211,34 @@
                             </p:stCondLst>
                             <p:childTnLst>
                               <p:par>
-                                <p:cTn id="19" presetID="1" presetClass="entr" presetSubtype="0" fill="hold" grpId="0" nodeType="clickEffect">
+                                <p:cTn id="21" presetID="1" presetClass="entr" presetSubtype="0" fill="hold" grpId="0" nodeType="clickEffect">
+                                  <p:stCondLst>
+                                    <p:cond delay="0"/>
+                                  </p:stCondLst>
+                                  <p:childTnLst>
+                                    <p:set>
+                                      <p:cBhvr>
+                                        <p:cTn id="22" dur="1" fill="hold">
+                                          <p:stCondLst>
+                                            <p:cond delay="0"/>
+                                          </p:stCondLst>
+                                        </p:cTn>
+                                        <p:tgtEl>
+                                          <p:spTgt spid="998133622"/>
+                                        </p:tgtEl>
+                                        <p:attrNameLst>
+                                          <p:attrName>style.visibility</p:attrName>
+                                        </p:attrNameLst>
+                                      </p:cBhvr>
+                                      <p:to>
+                                        <p:strVal val="visible"/>
+                                      </p:to>
+                                    </p:set>
+                                  </p:childTnLst>
+                                </p:cTn>
+                              </p:par>
+                              <p:par>
+                                <p:cTn id="19" presetID="1" presetClass="entr" presetSubtype="0" fill="hold" grpId="0" nodeType="withEffect">
                                   <p:stCondLst>
                                     <p:cond delay="0"/>
                                   </p:stCondLst>
@@ -6905,7 +7251,7 @@
                                           </p:stCondLst>
                                         </p:cTn>
                                         <p:tgtEl>
-                                          <p:spTgt spid="662070896"/>
+                                          <p:spTgt spid="523682948"/>
                                         </p:tgtEl>
                                         <p:attrNameLst>
                                           <p:attrName>style.visibility</p:attrName>
@@ -6925,13 +7271,13 @@
                     </p:cTn>
                   </p:par>
                   <p:par>
-                    <p:cTn id="13" fill="hold">
+                    <p:cTn id="11" fill="hold">
                       <p:stCondLst>
                         <p:cond delay="indefinite"/>
                       </p:stCondLst>
                       <p:childTnLst>
                         <p:par>
-                          <p:cTn id="14" fill="hold">
+                          <p:cTn id="12" fill="hold">
                             <p:stCondLst>
                               <p:cond delay="0"/>
                             </p:stCondLst>
@@ -6950,7 +7296,34 @@
                                           </p:stCondLst>
                                         </p:cTn>
                                         <p:tgtEl>
-                                          <p:spTgt spid="1556528359"/>
+                                          <p:spTgt spid="40144750"/>
+                                        </p:tgtEl>
+                                        <p:attrNameLst>
+                                          <p:attrName>style.visibility</p:attrName>
+                                        </p:attrNameLst>
+                                      </p:cBhvr>
+                                      <p:to>
+                                        <p:strVal val="visible"/>
+                                      </p:to>
+                                    </p:set>
+                                  </p:childTnLst>
+                                </p:cTn>
+                              </p:par>
+                              <p:par>
+                                <p:cTn id="13" presetID="1" presetClass="entr" presetSubtype="0" fill="hold" grpId="0" nodeType="withEffect">
+                                  <p:stCondLst>
+                                    <p:cond delay="0"/>
+                                  </p:stCondLst>
+                                  <p:childTnLst>
+                                    <p:set>
+                                      <p:cBhvr>
+                                        <p:cTn id="14" dur="1" fill="hold">
+                                          <p:stCondLst>
+                                            <p:cond delay="0"/>
+                                          </p:stCondLst>
+                                        </p:cTn>
+                                        <p:tgtEl>
+                                          <p:spTgt spid="1811855099"/>
                                         </p:tgtEl>
                                         <p:attrNameLst>
                                           <p:attrName>style.visibility</p:attrName>
@@ -6982,34 +7355,7 @@
                             </p:stCondLst>
                             <p:childTnLst>
                               <p:par>
-                                <p:cTn id="11" presetID="1" presetClass="entr" presetSubtype="0" fill="hold" grpId="0" nodeType="clickEffect">
-                                  <p:stCondLst>
-                                    <p:cond delay="0"/>
-                                  </p:stCondLst>
-                                  <p:childTnLst>
-                                    <p:set>
-                                      <p:cBhvr>
-                                        <p:cTn id="12" dur="1" fill="hold">
-                                          <p:stCondLst>
-                                            <p:cond delay="0"/>
-                                          </p:stCondLst>
-                                        </p:cTn>
-                                        <p:tgtEl>
-                                          <p:spTgt spid="1290522748"/>
-                                        </p:tgtEl>
-                                        <p:attrNameLst>
-                                          <p:attrName>style.visibility</p:attrName>
-                                        </p:attrNameLst>
-                                      </p:cBhvr>
-                                      <p:to>
-                                        <p:strVal val="visible"/>
-                                      </p:to>
-                                    </p:set>
-                                  </p:childTnLst>
-                                </p:cTn>
-                              </p:par>
-                              <p:par>
-                                <p:cTn id="9" presetID="1" presetClass="entr" presetSubtype="0" fill="hold" grpId="0" nodeType="withEffect">
+                                <p:cTn id="9" presetID="1" presetClass="entr" presetSubtype="0" fill="hold" grpId="0" nodeType="clickEffect">
                                   <p:stCondLst>
                                     <p:cond delay="0"/>
                                   </p:stCondLst>
@@ -7022,7 +7368,7 @@
                                           </p:stCondLst>
                                         </p:cTn>
                                         <p:tgtEl>
-                                          <p:spTgt spid="1811855099"/>
+                                          <p:spTgt spid="912059621"/>
                                         </p:tgtEl>
                                         <p:attrNameLst>
                                           <p:attrName>style.visibility</p:attrName>
@@ -7067,7 +7413,7 @@
                                           </p:stCondLst>
                                         </p:cTn>
                                         <p:tgtEl>
-                                          <p:spTgt spid="912059621"/>
+                                          <p:spTgt spid="1622417152"/>
                                         </p:tgtEl>
                                         <p:attrNameLst>
                                           <p:attrName>style.visibility</p:attrName>
@@ -7130,14 +7476,14 @@
       </p:grpSpPr>
       <p:sp>
         <p:nvSpPr>
-          <p:cNvPr id="1827700045" name="CasellaDiTesto 12"/>
+          <p:cNvPr id="542678580" name="CasellaDiTesto 12"/>
           <p:cNvSpPr txBox="1"/>
           <p:nvPr/>
         </p:nvSpPr>
         <p:spPr bwMode="auto">
           <a:xfrm flipH="0" flipV="0">
             <a:off x="4572000" y="4835718"/>
-            <a:ext cx="4584980" cy="305159"/>
+            <a:ext cx="4584979" cy="305159"/>
           </a:xfrm>
           <a:prstGeom prst="rect">
             <a:avLst/>
@@ -7167,7 +7513,7 @@
       </p:sp>
       <p:sp>
         <p:nvSpPr>
-          <p:cNvPr id="2147378453" name=""/>
+          <p:cNvPr id="239296399" name=""/>
           <p:cNvSpPr txBox="1"/>
           <p:nvPr/>
         </p:nvSpPr>
@@ -7195,7 +7541,7 @@
       </p:sp>
       <p:sp>
         <p:nvSpPr>
-          <p:cNvPr id="845062002" name="Google Shape;197;p32"/>
+          <p:cNvPr id="1229381243" name="Google Shape;197;p32"/>
           <p:cNvSpPr txBox="1">
             <a:spLocks noGrp="1"/>
           </p:cNvSpPr>
@@ -7463,14 +7809,14 @@
       </p:sp>
       <p:sp>
         <p:nvSpPr>
-          <p:cNvPr id="1225343327" name=""/>
+          <p:cNvPr id="793045214" name=""/>
           <p:cNvSpPr txBox="1"/>
           <p:nvPr/>
         </p:nvSpPr>
         <p:spPr bwMode="auto">
           <a:xfrm flipH="0" flipV="0">
-            <a:off x="-10294" y="4835718"/>
-            <a:ext cx="4606411" cy="256392"/>
+            <a:off x="-10293" y="4835718"/>
+            <a:ext cx="4614330" cy="256392"/>
           </a:xfrm>
           <a:prstGeom prst="rect">
             <a:avLst/>
@@ -7507,15 +7853,12 @@
               <a:t>Gestione delle risorse </a:t>
             </a:r>
             <a:r>
-              <a:rPr lang="it-IT" sz="1200" b="0" i="1" u="none" strike="noStrike" cap="none" spc="0">
+              <a:rPr sz="1200" b="0" i="1">
                 <a:solidFill>
                   <a:schemeClr val="bg1"/>
                 </a:solidFill>
-                <a:latin typeface="Arial"/>
-                <a:ea typeface="Arial"/>
-                <a:cs typeface="Arial"/>
               </a:rPr>
-              <a:t>- 2 di 2</a:t>
+              <a:t>- 1 di 2</a:t>
             </a:r>
             <a:endParaRPr sz="1200" b="0" i="1">
               <a:solidFill>
@@ -7527,14 +7870,14 @@
       </p:sp>
       <p:sp>
         <p:nvSpPr>
-          <p:cNvPr id="238060775" name=""/>
+          <p:cNvPr id="1107094356" name=""/>
           <p:cNvSpPr txBox="1"/>
           <p:nvPr/>
         </p:nvSpPr>
         <p:spPr bwMode="auto">
           <a:xfrm flipH="0" flipV="0">
             <a:off x="10396" y="975385"/>
-            <a:ext cx="5521078" cy="305158"/>
+            <a:ext cx="5521079" cy="305158"/>
           </a:xfrm>
           <a:prstGeom prst="rect">
             <a:avLst/>
@@ -7559,101 +7902,9 @@
           </a:p>
         </p:txBody>
       </p:sp>
-      <p:sp>
-        <p:nvSpPr>
-          <p:cNvPr id="1645090245" name=""/>
-          <p:cNvSpPr txBox="1"/>
-          <p:nvPr/>
-        </p:nvSpPr>
-        <p:spPr bwMode="auto">
-          <a:xfrm flipH="0" flipV="0">
-            <a:off x="23606" y="823320"/>
-            <a:ext cx="5568239" cy="305159"/>
-          </a:xfrm>
-          <a:prstGeom prst="rect">
-            <a:avLst/>
-          </a:prstGeom>
-          <a:noFill/>
-        </p:spPr>
-        <p:txBody>
-          <a:bodyPr vertOverflow="overflow" horzOverflow="overflow" vert="horz" wrap="square" lIns="91440" tIns="45720" rIns="91440" bIns="45720" numCol="1" spcCol="0" rtlCol="0" fromWordArt="0" anchor="t" anchorCtr="0" forceAA="0" upright="0" compatLnSpc="0">
-            <a:spAutoFit/>
-          </a:bodyPr>
-          <a:p>
-            <a:pPr marL="239820" indent="-239820" algn="l">
-              <a:buFont typeface="Arial"/>
-              <a:buChar char="•"/>
-              <a:defRPr/>
-            </a:pPr>
-            <a:r>
-              <a:rPr>
-                <a:solidFill>
-                  <a:schemeClr val="tx1"/>
-                </a:solidFill>
-              </a:rPr>
-              <a:t>La </a:t>
-            </a:r>
-            <a:r>
-              <a:rPr b="1">
-                <a:solidFill>
-                  <a:schemeClr val="tx1"/>
-                </a:solidFill>
-              </a:rPr>
-              <a:t>ricerca </a:t>
-            </a:r>
-            <a:r>
-              <a:rPr>
-                <a:solidFill>
-                  <a:schemeClr val="tx1"/>
-                </a:solidFill>
-              </a:rPr>
-              <a:t>di una risorsa è eseguita in modo simile.</a:t>
-            </a:r>
-            <a:endParaRPr>
-              <a:solidFill>
-                <a:schemeClr val="tx1"/>
-              </a:solidFill>
-            </a:endParaRPr>
-          </a:p>
-        </p:txBody>
-      </p:sp>
-      <p:sp>
-        <p:nvSpPr>
-          <p:cNvPr id="1017294142" name=""/>
-          <p:cNvSpPr txBox="1"/>
-          <p:nvPr/>
-        </p:nvSpPr>
-        <p:spPr bwMode="auto">
-          <a:xfrm flipH="0" flipV="0">
-            <a:off x="23607" y="1438420"/>
-            <a:ext cx="4807742" cy="305159"/>
-          </a:xfrm>
-          <a:prstGeom prst="rect">
-            <a:avLst/>
-          </a:prstGeom>
-          <a:noFill/>
-        </p:spPr>
-        <p:txBody>
-          <a:bodyPr vertOverflow="overflow" horzOverflow="overflow" vert="horz" wrap="square" lIns="91440" tIns="45720" rIns="91440" bIns="45720" numCol="1" spcCol="0" rtlCol="0" fromWordArt="0" anchor="t" anchorCtr="0" forceAA="0" upright="0" compatLnSpc="0">
-            <a:spAutoFit/>
-          </a:bodyPr>
-          <a:p>
-            <a:pPr marL="239820" indent="-239820" algn="l">
-              <a:buFont typeface="Arial"/>
-              <a:buChar char="•"/>
-              <a:defRPr/>
-            </a:pPr>
-            <a:endParaRPr b="0">
-              <a:solidFill>
-                <a:schemeClr val="tx1"/>
-              </a:solidFill>
-            </a:endParaRPr>
-          </a:p>
-        </p:txBody>
-      </p:sp>
       <p:pic>
         <p:nvPicPr>
-          <p:cNvPr id="1128226927" name=""/>
+          <p:cNvPr id="817080913" name=""/>
           <p:cNvPicPr>
             <a:picLocks noChangeAspect="1"/>
           </p:cNvPicPr>
@@ -7665,8 +7916,8 @@
         </p:blipFill>
         <p:spPr bwMode="auto">
           <a:xfrm flipH="0" flipV="0">
-            <a:off x="264906" y="3075474"/>
-            <a:ext cx="856860" cy="494349"/>
+            <a:off x="264906" y="3075473"/>
+            <a:ext cx="856859" cy="494348"/>
           </a:xfrm>
           <a:prstGeom prst="rect">
             <a:avLst/>
@@ -7675,7 +7926,7 @@
       </p:pic>
       <p:pic>
         <p:nvPicPr>
-          <p:cNvPr id="276741972" name=""/>
+          <p:cNvPr id="349311327" name=""/>
           <p:cNvPicPr>
             <a:picLocks noChangeAspect="1"/>
           </p:cNvPicPr>
@@ -7697,7 +7948,7 @@
       </p:pic>
       <p:pic>
         <p:nvPicPr>
-          <p:cNvPr id="774567172" name=""/>
+          <p:cNvPr id="697700608" name=""/>
           <p:cNvPicPr>
             <a:picLocks noChangeAspect="1"/>
           </p:cNvPicPr>
@@ -7710,7 +7961,7 @@
         <p:spPr bwMode="auto">
           <a:xfrm flipH="0" flipV="0">
             <a:off x="4777488" y="1082579"/>
-            <a:ext cx="3754125" cy="3508101"/>
+            <a:ext cx="3754125" cy="3508102"/>
           </a:xfrm>
           <a:prstGeom prst="rect">
             <a:avLst/>
@@ -7719,14 +7970,14 @@
       </p:pic>
       <p:cxnSp>
         <p:nvCxnSpPr>
-          <p:cNvPr id="727641971" name=""/>
+          <p:cNvPr id="1508041028" name=""/>
           <p:cNvCxnSpPr>
             <a:cxnSpLocks/>
           </p:cNvCxnSpPr>
           <p:nvPr/>
         </p:nvCxnSpPr>
         <p:spPr bwMode="auto">
-          <a:xfrm rot="16199932" flipH="0" flipV="0">
+          <a:xfrm rot="16199934" flipH="0" flipV="0">
             <a:off x="3629745" y="-767155"/>
             <a:ext cx="1390320" cy="6445144"/>
           </a:xfrm>
@@ -7738,73 +7989,6 @@
               <a:schemeClr val="bg2">
                 <a:lumMod val="60000"/>
                 <a:lumOff val="40000"/>
-              </a:schemeClr>
-            </a:solidFill>
-            <a:prstDash val="solid"/>
-            <a:tailEnd type="arrow" len="med"/>
-          </a:ln>
-        </p:spPr>
-        <p:style>
-          <a:lnRef idx="1">
-            <a:schemeClr val="accent1">
-              <a:shade val="50000"/>
-            </a:schemeClr>
-          </a:lnRef>
-          <a:fillRef idx="0">
-            <a:schemeClr val="accent1"/>
-          </a:fillRef>
-          <a:effectRef idx="0">
-            <a:schemeClr val="accent1"/>
-          </a:effectRef>
-          <a:fontRef idx="minor">
-            <a:schemeClr val="tx1"/>
-          </a:fontRef>
-        </p:style>
-      </p:cxnSp>
-      <p:pic>
-        <p:nvPicPr>
-          <p:cNvPr id="814555568" name=""/>
-          <p:cNvPicPr>
-            <a:picLocks noChangeAspect="1"/>
-          </p:cNvPicPr>
-          <p:nvPr/>
-        </p:nvPicPr>
-        <p:blipFill>
-          <a:blip r:embed="rId5"/>
-          <a:srcRect l="34817" t="5095" r="7766" b="9022"/>
-          <a:stretch/>
-        </p:blipFill>
-        <p:spPr bwMode="auto">
-          <a:xfrm flipH="0" flipV="0">
-            <a:off x="8118979" y="1341839"/>
-            <a:ext cx="945171" cy="836826"/>
-          </a:xfrm>
-          <a:prstGeom prst="rect">
-            <a:avLst/>
-          </a:prstGeom>
-        </p:spPr>
-      </p:pic>
-      <p:cxnSp>
-        <p:nvCxnSpPr>
-          <p:cNvPr id="432480142" name=""/>
-          <p:cNvCxnSpPr>
-            <a:cxnSpLocks/>
-          </p:cNvCxnSpPr>
-          <p:nvPr/>
-        </p:nvCxnSpPr>
-        <p:spPr bwMode="auto">
-          <a:xfrm flipH="1" flipV="0">
-            <a:off x="5235984" y="1992921"/>
-            <a:ext cx="2516646" cy="761053"/>
-          </a:xfrm>
-          <a:prstGeom prst="line">
-            <a:avLst/>
-          </a:prstGeom>
-          <a:ln w="25399" cap="flat" cmpd="sng" algn="ctr">
-            <a:solidFill>
-              <a:schemeClr val="bg2">
-                <a:lumMod val="40000"/>
-                <a:lumOff val="60000"/>
               </a:schemeClr>
             </a:solidFill>
             <a:prstDash val="solid"/>
@@ -7830,24 +8014,26 @@
       </p:cxnSp>
       <p:cxnSp>
         <p:nvCxnSpPr>
-          <p:cNvPr id="1609520515" name=""/>
+          <p:cNvPr id="444474331" name=""/>
           <p:cNvCxnSpPr>
             <a:cxnSpLocks/>
-            <a:endCxn id="276741972" idx="1"/>
           </p:cNvCxnSpPr>
           <p:nvPr/>
         </p:nvCxnSpPr>
         <p:spPr bwMode="auto">
-          <a:xfrm rot="0" flipH="0" flipV="0">
-            <a:off x="1145562" y="3322650"/>
-            <a:ext cx="2322285" cy="754290"/>
+          <a:xfrm flipH="0" flipV="0">
+            <a:off x="7752631" y="1992920"/>
+            <a:ext cx="339117" cy="761052"/>
           </a:xfrm>
           <a:prstGeom prst="line">
             <a:avLst/>
           </a:prstGeom>
           <a:ln w="25399" cap="flat" cmpd="sng" algn="ctr">
             <a:solidFill>
-              <a:schemeClr val="accent5"/>
+              <a:schemeClr val="bg2">
+                <a:lumMod val="40000"/>
+                <a:lumOff val="60000"/>
+              </a:schemeClr>
             </a:solidFill>
             <a:prstDash val="solid"/>
             <a:tailEnd type="arrow" len="med"/>
@@ -7872,7 +8058,49 @@
       </p:cxnSp>
       <p:cxnSp>
         <p:nvCxnSpPr>
-          <p:cNvPr id="1039912795" name=""/>
+          <p:cNvPr id="1823868030" name=""/>
+          <p:cNvCxnSpPr>
+            <a:cxnSpLocks/>
+            <a:endCxn id="349311327" idx="1"/>
+          </p:cNvCxnSpPr>
+          <p:nvPr/>
+        </p:nvCxnSpPr>
+        <p:spPr bwMode="auto">
+          <a:xfrm rot="0" flipH="0" flipV="0">
+            <a:off x="1145562" y="3322650"/>
+            <a:ext cx="2322285" cy="754290"/>
+          </a:xfrm>
+          <a:prstGeom prst="line">
+            <a:avLst/>
+          </a:prstGeom>
+          <a:ln w="25399" cap="flat" cmpd="sng" algn="ctr">
+            <a:solidFill>
+              <a:schemeClr val="accent5"/>
+            </a:solidFill>
+            <a:prstDash val="solid"/>
+            <a:tailEnd type="arrow" len="med"/>
+          </a:ln>
+        </p:spPr>
+        <p:style>
+          <a:lnRef idx="1">
+            <a:schemeClr val="accent1">
+              <a:shade val="50000"/>
+            </a:schemeClr>
+          </a:lnRef>
+          <a:fillRef idx="0">
+            <a:schemeClr val="accent1"/>
+          </a:fillRef>
+          <a:effectRef idx="0">
+            <a:schemeClr val="accent1"/>
+          </a:effectRef>
+          <a:fontRef idx="minor">
+            <a:schemeClr val="tx1"/>
+          </a:fontRef>
+        </p:style>
+      </p:cxnSp>
+      <p:cxnSp>
+        <p:nvCxnSpPr>
+          <p:cNvPr id="907750069" name=""/>
           <p:cNvCxnSpPr>
             <a:cxnSpLocks/>
           </p:cNvCxnSpPr>
@@ -7916,12 +8144,12 @@
       </p:cxnSp>
       <p:sp>
         <p:nvSpPr>
-          <p:cNvPr id="721567312" name=""/>
+          <p:cNvPr id="542255467" name=""/>
           <p:cNvSpPr txBox="1"/>
           <p:nvPr/>
         </p:nvSpPr>
         <p:spPr bwMode="auto">
-          <a:xfrm rot="1096846" flipH="0" flipV="0">
+          <a:xfrm rot="1096813" flipH="0" flipV="0">
             <a:off x="1317151" y="3490227"/>
             <a:ext cx="2245667" cy="244198"/>
           </a:xfrm>
@@ -7948,14 +8176,14 @@
       </p:sp>
       <p:sp>
         <p:nvSpPr>
-          <p:cNvPr id="1026255177" name=""/>
+          <p:cNvPr id="1064374882" name=""/>
           <p:cNvSpPr txBox="1"/>
           <p:nvPr/>
         </p:nvSpPr>
         <p:spPr bwMode="auto">
-          <a:xfrm rot="1080071" flipH="0" flipV="0">
-            <a:off x="1446328" y="3835132"/>
-            <a:ext cx="1418729" cy="244199"/>
+          <a:xfrm rot="1080036" flipH="0" flipV="0">
+            <a:off x="1446327" y="3835134"/>
+            <a:ext cx="1418728" cy="244198"/>
           </a:xfrm>
           <a:prstGeom prst="rect">
             <a:avLst/>
@@ -7987,14 +8215,166 @@
       </p:sp>
       <p:sp>
         <p:nvSpPr>
-          <p:cNvPr id="385029357" name=""/>
+          <p:cNvPr id="1856460509" name=""/>
           <p:cNvSpPr txBox="1"/>
           <p:nvPr/>
         </p:nvSpPr>
         <p:spPr bwMode="auto">
           <a:xfrm flipH="0" flipV="0">
-            <a:off x="3969456" y="2753974"/>
-            <a:ext cx="1094914" cy="396599"/>
+            <a:off x="7374179" y="1316320"/>
+            <a:ext cx="744797" cy="244198"/>
+          </a:xfrm>
+          <a:prstGeom prst="rect">
+            <a:avLst/>
+          </a:prstGeom>
+          <a:noFill/>
+        </p:spPr>
+        <p:txBody>
+          <a:bodyPr vertOverflow="overflow" horzOverflow="overflow" vert="horz" wrap="none" lIns="91440" tIns="45720" rIns="91440" bIns="45720" numCol="1" spcCol="0" rtlCol="0" fromWordArt="0" anchor="t" anchorCtr="0" forceAA="0" upright="0" compatLnSpc="0">
+            <a:spAutoFit/>
+          </a:bodyPr>
+          <a:p>
+            <a:pPr>
+              <a:defRPr/>
+            </a:pPr>
+            <a:r>
+              <a:rPr sz="1000"/>
+              <a:t>id(ciao)=4</a:t>
+            </a:r>
+            <a:endParaRPr sz="1000"/>
+          </a:p>
+        </p:txBody>
+      </p:sp>
+      <p:sp>
+        <p:nvSpPr>
+          <p:cNvPr id="1179276056" name=""/>
+          <p:cNvSpPr txBox="1"/>
+          <p:nvPr/>
+        </p:nvSpPr>
+        <p:spPr bwMode="auto">
+          <a:xfrm rot="0" flipH="0" flipV="0">
+            <a:off x="5490490" y="2623672"/>
+            <a:ext cx="2362779" cy="228960"/>
+          </a:xfrm>
+          <a:prstGeom prst="rect">
+            <a:avLst/>
+          </a:prstGeom>
+          <a:noFill/>
+        </p:spPr>
+        <p:txBody>
+          <a:bodyPr vertOverflow="overflow" horzOverflow="overflow" vert="horz" wrap="none" lIns="91440" tIns="45720" rIns="91440" bIns="45720" numCol="1" spcCol="0" rtlCol="0" fromWordArt="0" anchor="t" anchorCtr="0" forceAA="0" upright="0" compatLnSpc="0">
+            <a:spAutoFit/>
+          </a:bodyPr>
+          <a:p>
+            <a:pPr>
+              <a:defRPr/>
+            </a:pPr>
+            <a:r>
+              <a:rPr sz="900"/>
+              <a:t>contatto il nodo che dovrà gestire la risorsa</a:t>
+            </a:r>
+            <a:endParaRPr sz="900"/>
+          </a:p>
+        </p:txBody>
+      </p:sp>
+      <p:pic>
+        <p:nvPicPr>
+          <p:cNvPr id="685930156" name=""/>
+          <p:cNvPicPr>
+            <a:picLocks noChangeAspect="1"/>
+          </p:cNvPicPr>
+          <p:nvPr/>
+        </p:nvPicPr>
+        <p:blipFill>
+          <a:blip r:embed="rId5"/>
+          <a:stretch/>
+        </p:blipFill>
+        <p:spPr bwMode="auto">
+          <a:xfrm flipH="0" flipV="0">
+            <a:off x="8091749" y="1062219"/>
+            <a:ext cx="929715" cy="811028"/>
+          </a:xfrm>
+          <a:prstGeom prst="rect">
+            <a:avLst/>
+          </a:prstGeom>
+        </p:spPr>
+      </p:pic>
+      <p:pic>
+        <p:nvPicPr>
+          <p:cNvPr id="1324435496" name=""/>
+          <p:cNvPicPr>
+            <a:picLocks noChangeAspect="1"/>
+          </p:cNvPicPr>
+          <p:nvPr/>
+        </p:nvPicPr>
+        <p:blipFill>
+          <a:blip r:embed="rId6"/>
+          <a:stretch/>
+        </p:blipFill>
+        <p:spPr bwMode="auto">
+          <a:xfrm flipH="0" flipV="0">
+            <a:off x="8118977" y="3070320"/>
+            <a:ext cx="902488" cy="787277"/>
+          </a:xfrm>
+          <a:prstGeom prst="rect">
+            <a:avLst/>
+          </a:prstGeom>
+        </p:spPr>
+      </p:pic>
+      <p:cxnSp>
+        <p:nvCxnSpPr>
+          <p:cNvPr id="1688569128" name=""/>
+          <p:cNvCxnSpPr>
+            <a:cxnSpLocks/>
+          </p:cNvCxnSpPr>
+          <p:nvPr/>
+        </p:nvCxnSpPr>
+        <p:spPr bwMode="auto">
+          <a:xfrm flipH="1" flipV="0">
+            <a:off x="5432749" y="2906373"/>
+            <a:ext cx="2313828" cy="0"/>
+          </a:xfrm>
+          <a:prstGeom prst="line">
+            <a:avLst/>
+          </a:prstGeom>
+          <a:ln w="25399" cap="flat" cmpd="sng" algn="ctr">
+            <a:solidFill>
+              <a:schemeClr val="bg2">
+                <a:lumMod val="40000"/>
+                <a:lumOff val="60000"/>
+              </a:schemeClr>
+            </a:solidFill>
+            <a:prstDash val="solid"/>
+            <a:tailEnd type="arrow" len="med"/>
+          </a:ln>
+        </p:spPr>
+        <p:style>
+          <a:lnRef idx="1">
+            <a:schemeClr val="accent1">
+              <a:shade val="50000"/>
+            </a:schemeClr>
+          </a:lnRef>
+          <a:fillRef idx="0">
+            <a:schemeClr val="accent1"/>
+          </a:fillRef>
+          <a:effectRef idx="0">
+            <a:schemeClr val="accent1"/>
+          </a:effectRef>
+          <a:fontRef idx="minor">
+            <a:schemeClr val="tx1"/>
+          </a:fontRef>
+        </p:style>
+      </p:cxnSp>
+      <p:sp>
+        <p:nvSpPr>
+          <p:cNvPr id="1929924682" name=""/>
+          <p:cNvSpPr txBox="1"/>
+          <p:nvPr/>
+        </p:nvSpPr>
+        <p:spPr bwMode="auto">
+          <a:xfrm flipH="0" flipV="0">
+            <a:off x="6927629" y="517825"/>
+            <a:ext cx="2159856" cy="457558"/>
           </a:xfrm>
           <a:prstGeom prst="rect">
             <a:avLst/>
@@ -8006,41 +8386,37 @@
             <a:spAutoFit/>
           </a:bodyPr>
           <a:p>
-            <a:pPr>
-              <a:defRPr/>
-            </a:pPr>
-            <a:r>
-              <a:rPr sz="1000" i="1"/>
-              <a:t>Gestisco la </a:t>
-            </a:r>
-            <a:endParaRPr sz="1000" i="1"/>
-          </a:p>
-          <a:p>
-            <a:pPr>
-              <a:defRPr/>
-            </a:pPr>
-            <a:r>
-              <a:rPr sz="1000" i="1"/>
-              <a:t>risorsa </a:t>
-            </a:r>
-            <a:r>
-              <a:rPr sz="1000" i="1"/>
-              <a:t>“4:ciao”</a:t>
-            </a:r>
-            <a:endParaRPr sz="1000" i="1"/>
+            <a:pPr algn="ctr">
+              <a:defRPr/>
+            </a:pPr>
+            <a:r>
+              <a:rPr sz="1200"/>
+              <a:t>2 è il nodo più lontano</a:t>
+            </a:r>
+            <a:endParaRPr sz="1200"/>
+          </a:p>
+          <a:p>
+            <a:pPr algn="ctr">
+              <a:defRPr/>
+            </a:pPr>
+            <a:r>
+              <a:rPr sz="1200"/>
+              <a:t>che non eccede la risorsa</a:t>
+            </a:r>
+            <a:endParaRPr/>
           </a:p>
         </p:txBody>
       </p:sp>
       <p:sp>
         <p:nvSpPr>
-          <p:cNvPr id="887920528" name=""/>
+          <p:cNvPr id="1761818255" name=""/>
           <p:cNvSpPr txBox="1"/>
           <p:nvPr/>
         </p:nvSpPr>
         <p:spPr bwMode="auto">
-          <a:xfrm rot="20869666" flipH="0" flipV="0">
-            <a:off x="1543484" y="2482866"/>
-            <a:ext cx="3229702" cy="244199"/>
+          <a:xfrm flipH="0" flipV="0">
+            <a:off x="7752631" y="3957232"/>
+            <a:ext cx="1405787" cy="640440"/>
           </a:xfrm>
           <a:prstGeom prst="rect">
             <a:avLst/>
@@ -8048,95 +8424,35 @@
           <a:noFill/>
         </p:spPr>
         <p:txBody>
-          <a:bodyPr vertOverflow="overflow" horzOverflow="overflow" vert="horz" wrap="none" lIns="91440" tIns="45720" rIns="91440" bIns="45720" numCol="1" spcCol="0" rtlCol="0" fromWordArt="0" anchor="t" anchorCtr="0" forceAA="0" upright="0" compatLnSpc="0">
+          <a:bodyPr vertOverflow="overflow" horzOverflow="overflow" vert="horz" wrap="square" lIns="91440" tIns="45720" rIns="91440" bIns="45720" numCol="1" spcCol="0" rtlCol="0" fromWordArt="0" anchor="t" anchorCtr="0" forceAA="0" upright="0" compatLnSpc="0">
             <a:spAutoFit/>
           </a:bodyPr>
           <a:p>
-            <a:pPr>
-              <a:defRPr/>
-            </a:pPr>
-            <a:r>
-              <a:rPr sz="1000"/>
-              <a:t>Contatto il nodo ‘1’ per cercare la risorsa avente id = 4</a:t>
-            </a:r>
-            <a:endParaRPr sz="1000"/>
+            <a:pPr algn="l">
+              <a:defRPr/>
+            </a:pPr>
+            <a:r>
+              <a:rPr sz="1200"/>
+              <a:t>6 è il nodo più lontano </a:t>
+            </a:r>
+            <a:r>
+              <a:rPr sz="1200"/>
+              <a:t>che non eccede la risorsa</a:t>
+            </a:r>
+            <a:endParaRPr sz="1200"/>
           </a:p>
         </p:txBody>
       </p:sp>
       <p:sp>
         <p:nvSpPr>
-          <p:cNvPr id="598316243" name=""/>
+          <p:cNvPr id="402020654" name=""/>
           <p:cNvSpPr txBox="1"/>
           <p:nvPr/>
         </p:nvSpPr>
         <p:spPr bwMode="auto">
           <a:xfrm flipH="0" flipV="0">
-            <a:off x="7512222" y="1316319"/>
-            <a:ext cx="497808" cy="244199"/>
-          </a:xfrm>
-          <a:prstGeom prst="rect">
-            <a:avLst/>
-          </a:prstGeom>
-          <a:noFill/>
-        </p:spPr>
-        <p:txBody>
-          <a:bodyPr vertOverflow="overflow" horzOverflow="overflow" vert="horz" wrap="none" lIns="91440" tIns="45720" rIns="91440" bIns="45720" numCol="1" spcCol="0" rtlCol="0" fromWordArt="0" anchor="t" anchorCtr="0" forceAA="0" upright="0" compatLnSpc="0">
-            <a:spAutoFit/>
-          </a:bodyPr>
-          <a:p>
-            <a:pPr>
-              <a:defRPr/>
-            </a:pPr>
-            <a:r>
-              <a:rPr sz="1000"/>
-              <a:t>id = 4</a:t>
-            </a:r>
-            <a:endParaRPr sz="1000"/>
-          </a:p>
-        </p:txBody>
-      </p:sp>
-      <p:sp>
-        <p:nvSpPr>
-          <p:cNvPr id="292603333" name=""/>
-          <p:cNvSpPr txBox="1"/>
-          <p:nvPr/>
-        </p:nvSpPr>
-        <p:spPr bwMode="auto">
-          <a:xfrm rot="20626203" flipH="0" flipV="0">
-            <a:off x="5238284" y="2339518"/>
-            <a:ext cx="2756850" cy="228960"/>
-          </a:xfrm>
-          <a:prstGeom prst="rect">
-            <a:avLst/>
-          </a:prstGeom>
-          <a:noFill/>
-        </p:spPr>
-        <p:txBody>
-          <a:bodyPr vertOverflow="overflow" horzOverflow="overflow" vert="horz" wrap="none" lIns="91440" tIns="45720" rIns="91440" bIns="45720" numCol="1" spcCol="0" rtlCol="0" fromWordArt="0" anchor="t" anchorCtr="0" forceAA="0" upright="0" compatLnSpc="0">
-            <a:spAutoFit/>
-          </a:bodyPr>
-          <a:p>
-            <a:pPr>
-              <a:defRPr/>
-            </a:pPr>
-            <a:r>
-              <a:rPr sz="900"/>
-              <a:t>contatto il nodo che dovrebbe mantenere la risorsa</a:t>
-            </a:r>
-            <a:endParaRPr sz="900"/>
-          </a:p>
-        </p:txBody>
-      </p:sp>
-      <p:sp>
-        <p:nvSpPr>
-          <p:cNvPr id="651814908" name=""/>
-          <p:cNvSpPr txBox="1"/>
-          <p:nvPr/>
-        </p:nvSpPr>
-        <p:spPr bwMode="auto">
-          <a:xfrm flipH="0" flipV="0">
-            <a:off x="23606" y="1255359"/>
-            <a:ext cx="4386464" cy="518519"/>
+            <a:off x="23605" y="823320"/>
+            <a:ext cx="5568598" cy="305159"/>
           </a:xfrm>
           <a:prstGeom prst="rect">
             <a:avLst/>
@@ -8148,7 +8464,7 @@
             <a:spAutoFit/>
           </a:bodyPr>
           <a:p>
-            <a:pPr marL="239820" indent="-239820" algn="l">
+            <a:pPr marL="239819" indent="-239819" algn="l">
               <a:buFont typeface="Arial"/>
               <a:buChar char="•"/>
               <a:defRPr/>
@@ -8167,7 +8483,7 @@
                   <a:schemeClr val="tx1"/>
                 </a:solidFill>
               </a:rPr>
-              <a:t>cancellazione </a:t>
+              <a:t>ricerca </a:t>
             </a:r>
             <a:r>
               <a:rPr>
@@ -8175,7 +8491,7 @@
                   <a:schemeClr val="tx1"/>
                 </a:solidFill>
               </a:rPr>
-              <a:t>sfrutta la stessa logica, eliminando la risorsa dal nodo che la gestisce.</a:t>
+              <a:t>di una risorsa è eseguita in modo simile.</a:t>
             </a:r>
             <a:endParaRPr>
               <a:solidFill>
@@ -8187,14 +8503,118 @@
       </p:sp>
       <p:sp>
         <p:nvSpPr>
-          <p:cNvPr id="1823976816" name=""/>
+          <p:cNvPr id="608427004" name=""/>
           <p:cNvSpPr txBox="1"/>
           <p:nvPr/>
         </p:nvSpPr>
         <p:spPr bwMode="auto">
           <a:xfrm flipH="0" flipV="0">
-            <a:off x="3969456" y="3104676"/>
-            <a:ext cx="1138067" cy="396599"/>
+            <a:off x="23605" y="1255358"/>
+            <a:ext cx="4386823" cy="518519"/>
+          </a:xfrm>
+          <a:prstGeom prst="rect">
+            <a:avLst/>
+          </a:prstGeom>
+          <a:noFill/>
+        </p:spPr>
+        <p:txBody>
+          <a:bodyPr vertOverflow="overflow" horzOverflow="overflow" vert="horz" wrap="square" lIns="91440" tIns="45720" rIns="91440" bIns="45720" numCol="1" spcCol="0" rtlCol="0" fromWordArt="0" anchor="t" anchorCtr="0" forceAA="0" upright="0" compatLnSpc="0">
+            <a:spAutoFit/>
+          </a:bodyPr>
+          <a:p>
+            <a:pPr marL="239819" indent="-239819" algn="l">
+              <a:buFont typeface="Arial"/>
+              <a:buChar char="•"/>
+              <a:defRPr/>
+            </a:pPr>
+            <a:r>
+              <a:rPr>
+                <a:solidFill>
+                  <a:schemeClr val="tx1"/>
+                </a:solidFill>
+              </a:rPr>
+              <a:t>La </a:t>
+            </a:r>
+            <a:r>
+              <a:rPr b="1">
+                <a:solidFill>
+                  <a:schemeClr val="tx1"/>
+                </a:solidFill>
+              </a:rPr>
+              <a:t>cancellazione </a:t>
+            </a:r>
+            <a:r>
+              <a:rPr>
+                <a:solidFill>
+                  <a:schemeClr val="tx1"/>
+                </a:solidFill>
+              </a:rPr>
+              <a:t>sfrutta la stessa logica, eliminando la risorsa dal nodo che la gestisce.</a:t>
+            </a:r>
+            <a:endParaRPr>
+              <a:solidFill>
+                <a:schemeClr val="tx1"/>
+              </a:solidFill>
+            </a:endParaRPr>
+          </a:p>
+        </p:txBody>
+      </p:sp>
+      <p:sp>
+        <p:nvSpPr>
+          <p:cNvPr id="1377409693" name=""/>
+          <p:cNvSpPr txBox="1"/>
+          <p:nvPr/>
+        </p:nvSpPr>
+        <p:spPr bwMode="auto">
+          <a:xfrm flipH="0" flipV="0">
+            <a:off x="3969455" y="2753973"/>
+            <a:ext cx="1095273" cy="396599"/>
+          </a:xfrm>
+          <a:prstGeom prst="rect">
+            <a:avLst/>
+          </a:prstGeom>
+          <a:noFill/>
+        </p:spPr>
+        <p:txBody>
+          <a:bodyPr vertOverflow="overflow" horzOverflow="overflow" vert="horz" wrap="square" lIns="91440" tIns="45720" rIns="91440" bIns="45720" numCol="1" spcCol="0" rtlCol="0" fromWordArt="0" anchor="t" anchorCtr="0" forceAA="0" upright="0" compatLnSpc="0">
+            <a:spAutoFit/>
+          </a:bodyPr>
+          <a:p>
+            <a:pPr>
+              <a:defRPr/>
+            </a:pPr>
+            <a:r>
+              <a:rPr sz="1000" i="1"/>
+              <a:t>Gestisco la </a:t>
+            </a:r>
+            <a:endParaRPr sz="1000" i="1"/>
+          </a:p>
+          <a:p>
+            <a:pPr>
+              <a:defRPr/>
+            </a:pPr>
+            <a:r>
+              <a:rPr sz="1000" i="1"/>
+              <a:t>risorsa </a:t>
+            </a:r>
+            <a:r>
+              <a:rPr sz="1000" i="1"/>
+              <a:t>“4:ciao”</a:t>
+            </a:r>
+            <a:endParaRPr sz="1000" i="1"/>
+          </a:p>
+        </p:txBody>
+      </p:sp>
+      <p:sp>
+        <p:nvSpPr>
+          <p:cNvPr id="1220466478" name=""/>
+          <p:cNvSpPr txBox="1"/>
+          <p:nvPr/>
+        </p:nvSpPr>
+        <p:spPr bwMode="auto">
+          <a:xfrm flipH="0" flipV="0">
+            <a:off x="3969455" y="3104676"/>
+            <a:ext cx="1138426" cy="396599"/>
           </a:xfrm>
           <a:prstGeom prst="rect">
             <a:avLst/>
@@ -8248,6 +8668,78 @@
                 <a:srgbClr val="C00000"/>
               </a:solidFill>
             </a:endParaRPr>
+          </a:p>
+        </p:txBody>
+      </p:sp>
+      <p:sp>
+        <p:nvSpPr>
+          <p:cNvPr id="2132050382" name=""/>
+          <p:cNvSpPr txBox="1"/>
+          <p:nvPr/>
+        </p:nvSpPr>
+        <p:spPr bwMode="auto">
+          <a:xfrm rot="20869632" flipH="0" flipV="0">
+            <a:off x="1543663" y="2483045"/>
+            <a:ext cx="3229702" cy="244199"/>
+          </a:xfrm>
+          <a:prstGeom prst="rect">
+            <a:avLst/>
+          </a:prstGeom>
+          <a:noFill/>
+        </p:spPr>
+        <p:txBody>
+          <a:bodyPr vertOverflow="overflow" horzOverflow="overflow" vert="horz" wrap="none" lIns="91440" tIns="45720" rIns="91440" bIns="45720" numCol="1" spcCol="0" rtlCol="0" fromWordArt="0" anchor="t" anchorCtr="0" forceAA="0" upright="0" compatLnSpc="0">
+            <a:spAutoFit/>
+          </a:bodyPr>
+          <a:p>
+            <a:pPr>
+              <a:defRPr/>
+            </a:pPr>
+            <a:r>
+              <a:rPr sz="1000"/>
+              <a:t>Contatto il nodo ‘1’ per cercare la risorsa avente id = 4</a:t>
+            </a:r>
+            <a:endParaRPr sz="1000"/>
+          </a:p>
+        </p:txBody>
+      </p:sp>
+      <p:sp>
+        <p:nvSpPr>
+          <p:cNvPr id="1325718777" name=""/>
+          <p:cNvSpPr txBox="1"/>
+          <p:nvPr/>
+        </p:nvSpPr>
+        <p:spPr bwMode="auto">
+          <a:xfrm flipH="0" flipV="0">
+            <a:off x="-12375" y="4571998"/>
+            <a:ext cx="6172623" cy="274679"/>
+          </a:xfrm>
+          <a:prstGeom prst="rect">
+            <a:avLst/>
+          </a:prstGeom>
+          <a:noFill/>
+        </p:spPr>
+        <p:txBody>
+          <a:bodyPr vertOverflow="overflow" horzOverflow="overflow" vert="horz" wrap="none" lIns="91440" tIns="45720" rIns="91440" bIns="45720" numCol="1" spcCol="0" rtlCol="0" fromWordArt="0" anchor="t" anchorCtr="0" forceAA="0" upright="0" compatLnSpc="0">
+            <a:spAutoFit/>
+          </a:bodyPr>
+          <a:p>
+            <a:pPr>
+              <a:defRPr/>
+            </a:pPr>
+            <a:r>
+              <a:rPr sz="1200" i="1"/>
+              <a:t>NB: Il nodo fornito dal </a:t>
+            </a:r>
+            <a:r>
+              <a:rPr sz="1200" i="1"/>
+              <a:t>server </a:t>
+            </a:r>
+            <a:r>
+              <a:rPr sz="1200" i="1"/>
+              <a:t>sarà il nodo che informerà il client dell’esito dell’operazione.</a:t>
+            </a:r>
+            <a:endParaRPr sz="1200" i="1"/>
           </a:p>
         </p:txBody>
       </p:sp>
@@ -8273,32 +8765,32 @@
               <p:cTn id="2" dur="indefinite" nodeType="mainSeq">
                 <p:childTnLst>
                   <p:par>
-                    <p:cTn id="63" fill="hold">
+                    <p:cTn id="73" fill="hold">
                       <p:stCondLst>
                         <p:cond delay="indefinite"/>
                       </p:stCondLst>
                       <p:childTnLst>
                         <p:par>
-                          <p:cTn id="64" fill="hold">
+                          <p:cTn id="74" fill="hold">
                             <p:stCondLst>
                               <p:cond delay="0"/>
                             </p:stCondLst>
                             <p:childTnLst>
                               <p:par>
-                                <p:cTn id="65" presetID="1" presetClass="entr" presetSubtype="0" fill="hold" grpId="0" nodeType="clickEffect">
+                                <p:cTn id="75" presetID="1" presetClass="entr" presetSubtype="0" fill="hold" grpId="0" nodeType="clickEffect">
                                   <p:stCondLst>
                                     <p:cond delay="0"/>
                                   </p:stCondLst>
                                   <p:childTnLst>
                                     <p:set>
                                       <p:cBhvr>
-                                        <p:cTn id="66" dur="1" fill="hold">
+                                        <p:cTn id="76" dur="1" fill="hold">
                                           <p:stCondLst>
                                             <p:cond delay="0"/>
                                           </p:stCondLst>
                                         </p:cTn>
                                         <p:tgtEl>
-                                          <p:spTgt spid="1645090245"/>
+                                          <p:spTgt spid="402020654"/>
                                         </p:tgtEl>
                                         <p:attrNameLst>
                                           <p:attrName>style.visibility</p:attrName>
@@ -8318,32 +8810,131 @@
                     </p:cTn>
                   </p:par>
                   <p:par>
-                    <p:cTn id="59" fill="hold">
+                    <p:cTn id="67" fill="hold">
                       <p:stCondLst>
                         <p:cond delay="indefinite"/>
                       </p:stCondLst>
                       <p:childTnLst>
                         <p:par>
-                          <p:cTn id="60" fill="hold">
+                          <p:cTn id="68" fill="hold">
                             <p:stCondLst>
                               <p:cond delay="0"/>
                             </p:stCondLst>
                             <p:childTnLst>
                               <p:par>
-                                <p:cTn id="61" presetID="1" presetClass="entr" presetSubtype="0" fill="hold" grpId="0" nodeType="clickEffect">
+                                <p:cTn id="71" presetID="1" presetClass="entr" presetSubtype="0" fill="hold" grpId="0" nodeType="clickEffect">
                                   <p:stCondLst>
                                     <p:cond delay="0"/>
                                   </p:stCondLst>
                                   <p:childTnLst>
                                     <p:set>
                                       <p:cBhvr>
-                                        <p:cTn id="62" dur="1" fill="hold">
+                                        <p:cTn id="72" dur="1" fill="hold">
                                           <p:stCondLst>
                                             <p:cond delay="0"/>
                                           </p:stCondLst>
                                         </p:cTn>
                                         <p:tgtEl>
-                                          <p:spTgt spid="1017294142"/>
+                                          <p:spTgt spid="817080913"/>
+                                        </p:tgtEl>
+                                        <p:attrNameLst>
+                                          <p:attrName>style.visibility</p:attrName>
+                                        </p:attrNameLst>
+                                      </p:cBhvr>
+                                      <p:to>
+                                        <p:strVal val="visible"/>
+                                      </p:to>
+                                    </p:set>
+                                  </p:childTnLst>
+                                </p:cTn>
+                              </p:par>
+                              <p:par>
+                                <p:cTn id="69" presetID="1" presetClass="entr" presetSubtype="0" fill="hold" grpId="0" nodeType="withEffect">
+                                  <p:stCondLst>
+                                    <p:cond delay="0"/>
+                                  </p:stCondLst>
+                                  <p:childTnLst>
+                                    <p:set>
+                                      <p:cBhvr>
+                                        <p:cTn id="70" dur="1" fill="hold">
+                                          <p:stCondLst>
+                                            <p:cond delay="0"/>
+                                          </p:stCondLst>
+                                        </p:cTn>
+                                        <p:tgtEl>
+                                          <p:spTgt spid="349311327"/>
+                                        </p:tgtEl>
+                                        <p:attrNameLst>
+                                          <p:attrName>style.visibility</p:attrName>
+                                        </p:attrNameLst>
+                                      </p:cBhvr>
+                                      <p:to>
+                                        <p:strVal val="visible"/>
+                                      </p:to>
+                                    </p:set>
+                                  </p:childTnLst>
+                                </p:cTn>
+                              </p:par>
+                            </p:childTnLst>
+                          </p:cTn>
+                        </p:par>
+                      </p:childTnLst>
+                    </p:cTn>
+                  </p:par>
+                  <p:par>
+                    <p:cTn id="61" fill="hold">
+                      <p:stCondLst>
+                        <p:cond delay="indefinite"/>
+                      </p:stCondLst>
+                      <p:childTnLst>
+                        <p:par>
+                          <p:cTn id="62" fill="hold">
+                            <p:stCondLst>
+                              <p:cond delay="0"/>
+                            </p:stCondLst>
+                            <p:childTnLst>
+                              <p:par>
+                                <p:cTn id="65" presetID="1" presetClass="entr" presetSubtype="0" fill="hold" grpId="0" nodeType="clickEffect">
+                                  <p:stCondLst>
+                                    <p:cond delay="0"/>
+                                  </p:stCondLst>
+                                  <p:childTnLst>
+                                    <p:set>
+                                      <p:cBhvr>
+                                        <p:cTn id="66" dur="1" fill="hold">
+                                          <p:stCondLst>
+                                            <p:cond delay="0"/>
+                                          </p:stCondLst>
+                                        </p:cTn>
+                                        <p:tgtEl>
+                                          <p:spTgt spid="542255467"/>
+                                        </p:tgtEl>
+                                        <p:attrNameLst>
+                                          <p:attrName>style.visibility</p:attrName>
+                                        </p:attrNameLst>
+                                      </p:cBhvr>
+                                      <p:to>
+                                        <p:strVal val="visible"/>
+                                      </p:to>
+                                    </p:set>
+                                  </p:childTnLst>
+                                </p:cTn>
+                              </p:par>
+                              <p:par>
+                                <p:cTn id="63" presetID="1" presetClass="entr" presetSubtype="0" fill="hold" grpId="0" nodeType="withEffect">
+                                  <p:stCondLst>
+                                    <p:cond delay="0"/>
+                                  </p:stCondLst>
+                                  <p:childTnLst>
+                                    <p:set>
+                                      <p:cBhvr>
+                                        <p:cTn id="64" dur="1" fill="hold">
+                                          <p:stCondLst>
+                                            <p:cond delay="0"/>
+                                          </p:stCondLst>
+                                        </p:cTn>
+                                        <p:tgtEl>
+                                          <p:spTgt spid="1823868030"/>
                                         </p:tgtEl>
                                         <p:attrNameLst>
                                           <p:attrName>style.visibility</p:attrName>
@@ -8375,7 +8966,34 @@
                             </p:stCondLst>
                             <p:childTnLst>
                               <p:par>
-                                <p:cTn id="57" presetID="1" presetClass="entr" presetSubtype="0" fill="hold" grpId="0" nodeType="clickEffect">
+                                <p:cTn id="59" presetID="1" presetClass="entr" presetSubtype="0" fill="hold" grpId="0" nodeType="clickEffect">
+                                  <p:stCondLst>
+                                    <p:cond delay="0"/>
+                                  </p:stCondLst>
+                                  <p:childTnLst>
+                                    <p:set>
+                                      <p:cBhvr>
+                                        <p:cTn id="60" dur="1" fill="hold">
+                                          <p:stCondLst>
+                                            <p:cond delay="0"/>
+                                          </p:stCondLst>
+                                        </p:cTn>
+                                        <p:tgtEl>
+                                          <p:spTgt spid="1064374882"/>
+                                        </p:tgtEl>
+                                        <p:attrNameLst>
+                                          <p:attrName>style.visibility</p:attrName>
+                                        </p:attrNameLst>
+                                      </p:cBhvr>
+                                      <p:to>
+                                        <p:strVal val="visible"/>
+                                      </p:to>
+                                    </p:set>
+                                  </p:childTnLst>
+                                </p:cTn>
+                              </p:par>
+                              <p:par>
+                                <p:cTn id="57" presetID="1" presetClass="entr" presetSubtype="0" fill="hold" grpId="0" nodeType="withEffect">
                                   <p:stCondLst>
                                     <p:cond delay="0"/>
                                   </p:stCondLst>
@@ -8388,7 +9006,7 @@
                                           </p:stCondLst>
                                         </p:cTn>
                                         <p:tgtEl>
-                                          <p:spTgt spid="1128226927"/>
+                                          <p:spTgt spid="907750069"/>
                                         </p:tgtEl>
                                         <p:attrNameLst>
                                           <p:attrName>style.visibility</p:attrName>
@@ -8433,7 +9051,7 @@
                                           </p:stCondLst>
                                         </p:cTn>
                                         <p:tgtEl>
-                                          <p:spTgt spid="276741972"/>
+                                          <p:spTgt spid="697700608"/>
                                         </p:tgtEl>
                                         <p:attrNameLst>
                                           <p:attrName>style.visibility</p:attrName>
@@ -8478,7 +9096,7 @@
                                           </p:stCondLst>
                                         </p:cTn>
                                         <p:tgtEl>
-                                          <p:spTgt spid="721567312"/>
+                                          <p:spTgt spid="2132050382"/>
                                         </p:tgtEl>
                                         <p:attrNameLst>
                                           <p:attrName>style.visibility</p:attrName>
@@ -8505,7 +9123,7 @@
                                           </p:stCondLst>
                                         </p:cTn>
                                         <p:tgtEl>
-                                          <p:spTgt spid="1609520515"/>
+                                          <p:spTgt spid="1508041028"/>
                                         </p:tgtEl>
                                         <p:attrNameLst>
                                           <p:attrName>style.visibility</p:attrName>
@@ -8525,13 +9143,13 @@
                     </p:cTn>
                   </p:par>
                   <p:par>
-                    <p:cTn id="39" fill="hold">
+                    <p:cTn id="41" fill="hold">
                       <p:stCondLst>
                         <p:cond delay="indefinite"/>
                       </p:stCondLst>
                       <p:childTnLst>
                         <p:par>
-                          <p:cTn id="40" fill="hold">
+                          <p:cTn id="42" fill="hold">
                             <p:stCondLst>
                               <p:cond delay="0"/>
                             </p:stCondLst>
@@ -8550,34 +9168,7 @@
                                           </p:stCondLst>
                                         </p:cTn>
                                         <p:tgtEl>
-                                          <p:spTgt spid="1026255177"/>
-                                        </p:tgtEl>
-                                        <p:attrNameLst>
-                                          <p:attrName>style.visibility</p:attrName>
-                                        </p:attrNameLst>
-                                      </p:cBhvr>
-                                      <p:to>
-                                        <p:strVal val="visible"/>
-                                      </p:to>
-                                    </p:set>
-                                  </p:childTnLst>
-                                </p:cTn>
-                              </p:par>
-                              <p:par>
-                                <p:cTn id="41" presetID="1" presetClass="entr" presetSubtype="0" fill="hold" grpId="0" nodeType="withEffect">
-                                  <p:stCondLst>
-                                    <p:cond delay="0"/>
-                                  </p:stCondLst>
-                                  <p:childTnLst>
-                                    <p:set>
-                                      <p:cBhvr>
-                                        <p:cTn id="42" dur="1" fill="hold">
-                                          <p:stCondLst>
-                                            <p:cond delay="0"/>
-                                          </p:stCondLst>
-                                        </p:cTn>
-                                        <p:tgtEl>
-                                          <p:spTgt spid="1039912795"/>
+                                          <p:spTgt spid="1856460509"/>
                                         </p:tgtEl>
                                         <p:attrNameLst>
                                           <p:attrName>style.visibility</p:attrName>
@@ -8609,7 +9200,34 @@
                             </p:stCondLst>
                             <p:childTnLst>
                               <p:par>
-                                <p:cTn id="37" presetID="1" presetClass="entr" presetSubtype="0" fill="hold" grpId="0" nodeType="clickEffect">
+                                <p:cTn id="39" presetID="1" presetClass="entr" presetSubtype="0" fill="hold" grpId="0" nodeType="clickEffect">
+                                  <p:stCondLst>
+                                    <p:cond delay="0"/>
+                                  </p:stCondLst>
+                                  <p:childTnLst>
+                                    <p:set>
+                                      <p:cBhvr>
+                                        <p:cTn id="40" dur="1" fill="hold">
+                                          <p:stCondLst>
+                                            <p:cond delay="0"/>
+                                          </p:stCondLst>
+                                        </p:cTn>
+                                        <p:tgtEl>
+                                          <p:spTgt spid="1929924682"/>
+                                        </p:tgtEl>
+                                        <p:attrNameLst>
+                                          <p:attrName>style.visibility</p:attrName>
+                                        </p:attrNameLst>
+                                      </p:cBhvr>
+                                      <p:to>
+                                        <p:strVal val="visible"/>
+                                      </p:to>
+                                    </p:set>
+                                  </p:childTnLst>
+                                </p:cTn>
+                              </p:par>
+                              <p:par>
+                                <p:cTn id="37" presetID="1" presetClass="entr" presetSubtype="0" fill="hold" grpId="0" nodeType="withEffect">
                                   <p:stCondLst>
                                     <p:cond delay="0"/>
                                   </p:stCondLst>
@@ -8622,7 +9240,7 @@
                                           </p:stCondLst>
                                         </p:cTn>
                                         <p:tgtEl>
-                                          <p:spTgt spid="774567172"/>
+                                          <p:spTgt spid="685930156"/>
                                         </p:tgtEl>
                                         <p:attrNameLst>
                                           <p:attrName>style.visibility</p:attrName>
@@ -8642,13 +9260,13 @@
                     </p:cTn>
                   </p:par>
                   <p:par>
-                    <p:cTn id="29" fill="hold">
+                    <p:cTn id="31" fill="hold">
                       <p:stCondLst>
                         <p:cond delay="indefinite"/>
                       </p:stCondLst>
                       <p:childTnLst>
                         <p:par>
-                          <p:cTn id="30" fill="hold">
+                          <p:cTn id="32" fill="hold">
                             <p:stCondLst>
                               <p:cond delay="0"/>
                             </p:stCondLst>
@@ -8667,34 +9285,7 @@
                                           </p:stCondLst>
                                         </p:cTn>
                                         <p:tgtEl>
-                                          <p:spTgt spid="887920528"/>
-                                        </p:tgtEl>
-                                        <p:attrNameLst>
-                                          <p:attrName>style.visibility</p:attrName>
-                                        </p:attrNameLst>
-                                      </p:cBhvr>
-                                      <p:to>
-                                        <p:strVal val="visible"/>
-                                      </p:to>
-                                    </p:set>
-                                  </p:childTnLst>
-                                </p:cTn>
-                              </p:par>
-                              <p:par>
-                                <p:cTn id="31" presetID="1" presetClass="entr" presetSubtype="0" fill="hold" grpId="0" nodeType="withEffect">
-                                  <p:stCondLst>
-                                    <p:cond delay="0"/>
-                                  </p:stCondLst>
-                                  <p:childTnLst>
-                                    <p:set>
-                                      <p:cBhvr>
-                                        <p:cTn id="32" dur="1" fill="hold">
-                                          <p:stCondLst>
-                                            <p:cond delay="0"/>
-                                          </p:stCondLst>
-                                        </p:cTn>
-                                        <p:tgtEl>
-                                          <p:spTgt spid="727641971"/>
+                                          <p:spTgt spid="444474331"/>
                                         </p:tgtEl>
                                         <p:attrNameLst>
                                           <p:attrName>style.visibility</p:attrName>
@@ -8726,7 +9317,34 @@
                             </p:stCondLst>
                             <p:childTnLst>
                               <p:par>
-                                <p:cTn id="27" presetID="1" presetClass="entr" presetSubtype="0" fill="hold" grpId="0" nodeType="clickEffect">
+                                <p:cTn id="29" presetID="1" presetClass="entr" presetSubtype="0" fill="hold" grpId="0" nodeType="clickEffect">
+                                  <p:stCondLst>
+                                    <p:cond delay="0"/>
+                                  </p:stCondLst>
+                                  <p:childTnLst>
+                                    <p:set>
+                                      <p:cBhvr>
+                                        <p:cTn id="30" dur="1" fill="hold">
+                                          <p:stCondLst>
+                                            <p:cond delay="0"/>
+                                          </p:stCondLst>
+                                        </p:cTn>
+                                        <p:tgtEl>
+                                          <p:spTgt spid="1324435496"/>
+                                        </p:tgtEl>
+                                        <p:attrNameLst>
+                                          <p:attrName>style.visibility</p:attrName>
+                                        </p:attrNameLst>
+                                      </p:cBhvr>
+                                      <p:to>
+                                        <p:strVal val="visible"/>
+                                      </p:to>
+                                    </p:set>
+                                  </p:childTnLst>
+                                </p:cTn>
+                              </p:par>
+                              <p:par>
+                                <p:cTn id="27" presetID="1" presetClass="entr" presetSubtype="0" fill="hold" grpId="0" nodeType="withEffect">
                                   <p:stCondLst>
                                     <p:cond delay="0"/>
                                   </p:stCondLst>
@@ -8739,7 +9357,7 @@
                                           </p:stCondLst>
                                         </p:cTn>
                                         <p:tgtEl>
-                                          <p:spTgt spid="598316243"/>
+                                          <p:spTgt spid="1761818255"/>
                                         </p:tgtEl>
                                         <p:attrNameLst>
                                           <p:attrName>style.visibility</p:attrName>
@@ -8759,13 +9377,13 @@
                     </p:cTn>
                   </p:par>
                   <p:par>
-                    <p:cTn id="21" fill="hold">
+                    <p:cTn id="19" fill="hold">
                       <p:stCondLst>
                         <p:cond delay="indefinite"/>
                       </p:stCondLst>
                       <p:childTnLst>
                         <p:par>
-                          <p:cTn id="22" fill="hold">
+                          <p:cTn id="20" fill="hold">
                             <p:stCondLst>
                               <p:cond delay="0"/>
                             </p:stCondLst>
@@ -8784,7 +9402,34 @@
                                           </p:stCondLst>
                                         </p:cTn>
                                         <p:tgtEl>
-                                          <p:spTgt spid="814555568"/>
+                                          <p:spTgt spid="1688569128"/>
+                                        </p:tgtEl>
+                                        <p:attrNameLst>
+                                          <p:attrName>style.visibility</p:attrName>
+                                        </p:attrNameLst>
+                                      </p:cBhvr>
+                                      <p:to>
+                                        <p:strVal val="visible"/>
+                                      </p:to>
+                                    </p:set>
+                                  </p:childTnLst>
+                                </p:cTn>
+                              </p:par>
+                              <p:par>
+                                <p:cTn id="21" presetID="1" presetClass="entr" presetSubtype="0" fill="hold" grpId="0" nodeType="withEffect">
+                                  <p:stCondLst>
+                                    <p:cond delay="0"/>
+                                  </p:stCondLst>
+                                  <p:childTnLst>
+                                    <p:set>
+                                      <p:cBhvr>
+                                        <p:cTn id="22" dur="1" fill="hold">
+                                          <p:stCondLst>
+                                            <p:cond delay="0"/>
+                                          </p:stCondLst>
+                                        </p:cTn>
+                                        <p:tgtEl>
+                                          <p:spTgt spid="1179276056"/>
                                         </p:tgtEl>
                                         <p:attrNameLst>
                                           <p:attrName>style.visibility</p:attrName>
@@ -8816,34 +9461,7 @@
                             </p:stCondLst>
                             <p:childTnLst>
                               <p:par>
-                                <p:cTn id="19" presetID="1" presetClass="entr" presetSubtype="0" fill="hold" grpId="0" nodeType="clickEffect">
-                                  <p:stCondLst>
-                                    <p:cond delay="0"/>
-                                  </p:stCondLst>
-                                  <p:childTnLst>
-                                    <p:set>
-                                      <p:cBhvr>
-                                        <p:cTn id="20" dur="1" fill="hold">
-                                          <p:stCondLst>
-                                            <p:cond delay="0"/>
-                                          </p:stCondLst>
-                                        </p:cTn>
-                                        <p:tgtEl>
-                                          <p:spTgt spid="432480142"/>
-                                        </p:tgtEl>
-                                        <p:attrNameLst>
-                                          <p:attrName>style.visibility</p:attrName>
-                                        </p:attrNameLst>
-                                      </p:cBhvr>
-                                      <p:to>
-                                        <p:strVal val="visible"/>
-                                      </p:to>
-                                    </p:set>
-                                  </p:childTnLst>
-                                </p:cTn>
-                              </p:par>
-                              <p:par>
-                                <p:cTn id="17" presetID="1" presetClass="entr" presetSubtype="0" fill="hold" grpId="0" nodeType="withEffect">
+                                <p:cTn id="17" presetID="1" presetClass="entr" presetSubtype="0" fill="hold" grpId="0" nodeType="clickEffect">
                                   <p:stCondLst>
                                     <p:cond delay="0"/>
                                   </p:stCondLst>
@@ -8856,7 +9474,7 @@
                                           </p:stCondLst>
                                         </p:cTn>
                                         <p:tgtEl>
-                                          <p:spTgt spid="292603333"/>
+                                          <p:spTgt spid="1377409693"/>
                                         </p:tgtEl>
                                         <p:attrNameLst>
                                           <p:attrName>style.visibility</p:attrName>
@@ -8901,7 +9519,7 @@
                                           </p:stCondLst>
                                         </p:cTn>
                                         <p:tgtEl>
-                                          <p:spTgt spid="385029357"/>
+                                          <p:spTgt spid="608427004"/>
                                         </p:tgtEl>
                                         <p:attrNameLst>
                                           <p:attrName>style.visibility</p:attrName>
@@ -8946,7 +9564,7 @@
                                           </p:stCondLst>
                                         </p:cTn>
                                         <p:tgtEl>
-                                          <p:spTgt spid="651814908"/>
+                                          <p:spTgt spid="1220466478"/>
                                         </p:tgtEl>
                                         <p:attrNameLst>
                                           <p:attrName>style.visibility</p:attrName>
@@ -8991,7 +9609,7 @@
                                           </p:stCondLst>
                                         </p:cTn>
                                         <p:tgtEl>
-                                          <p:spTgt spid="1823976816"/>
+                                          <p:spTgt spid="1325718777"/>
                                         </p:tgtEl>
                                         <p:attrNameLst>
                                           <p:attrName>style.visibility</p:attrName>
@@ -10419,6 +11037,62 @@
           </a:p>
         </p:txBody>
       </p:sp>
+      <p:sp>
+        <p:nvSpPr>
+          <p:cNvPr id="1343900050" name=""/>
+          <p:cNvSpPr txBox="1"/>
+          <p:nvPr/>
+        </p:nvSpPr>
+        <p:spPr bwMode="auto">
+          <a:xfrm flipH="0" flipV="0">
+            <a:off x="5627162" y="79374"/>
+            <a:ext cx="3481391" cy="1006200"/>
+          </a:xfrm>
+          <a:prstGeom prst="rect">
+            <a:avLst/>
+          </a:prstGeom>
+          <a:noFill/>
+        </p:spPr>
+        <p:txBody>
+          <a:bodyPr vertOverflow="overflow" horzOverflow="overflow" vert="horz" wrap="square" lIns="91440" tIns="45720" rIns="91440" bIns="45720" numCol="1" spcCol="0" rtlCol="0" fromWordArt="0" anchor="t" anchorCtr="0" forceAA="0" upright="0" compatLnSpc="0">
+            <a:spAutoFit/>
+          </a:bodyPr>
+          <a:p>
+            <a:pPr>
+              <a:defRPr/>
+            </a:pPr>
+            <a:r>
+              <a:rPr sz="1200" i="1"/>
+              <a:t>NB: una migliore implementazione </a:t>
+            </a:r>
+            <a:endParaRPr sz="1200" i="1"/>
+          </a:p>
+          <a:p>
+            <a:pPr>
+              <a:defRPr/>
+            </a:pPr>
+            <a:r>
+              <a:rPr sz="1200" i="1"/>
+              <a:t>porterebbe il server registry a NON fornire</a:t>
+            </a:r>
+            <a:endParaRPr sz="1200" i="1"/>
+          </a:p>
+          <a:p>
+            <a:pPr>
+              <a:defRPr/>
+            </a:pPr>
+            <a:r>
+              <a:rPr sz="1200" i="1"/>
+              <a:t>predecessore e successore, ma solo un nodo da contattare </a:t>
+            </a:r>
+            <a:r>
+              <a:rPr sz="1200" i="1"/>
+              <a:t>nel sistema con cui inizializzare l’operazione di posizionamento nell’anello.</a:t>
+            </a:r>
+            <a:endParaRPr sz="1200" i="1"/>
+          </a:p>
+        </p:txBody>
+      </p:sp>
     </p:spTree>
   </p:cSld>
   <p:clrMapOvr>
@@ -10441,26 +11115,26 @@
               <p:cTn id="2" dur="indefinite" nodeType="mainSeq">
                 <p:childTnLst>
                   <p:par>
-                    <p:cTn id="41" fill="hold">
+                    <p:cTn id="45" fill="hold">
                       <p:stCondLst>
                         <p:cond delay="indefinite"/>
                       </p:stCondLst>
                       <p:childTnLst>
                         <p:par>
-                          <p:cTn id="42" fill="hold">
+                          <p:cTn id="46" fill="hold">
                             <p:stCondLst>
                               <p:cond delay="0"/>
                             </p:stCondLst>
                             <p:childTnLst>
                               <p:par>
-                                <p:cTn id="43" presetID="1" presetClass="entr" presetSubtype="0" fill="hold" grpId="0" nodeType="clickEffect">
+                                <p:cTn id="47" presetID="1" presetClass="entr" presetSubtype="0" fill="hold" grpId="0" nodeType="clickEffect">
                                   <p:stCondLst>
                                     <p:cond delay="0"/>
                                   </p:stCondLst>
                                   <p:childTnLst>
                                     <p:set>
                                       <p:cBhvr>
-                                        <p:cTn id="44" dur="1" fill="hold">
+                                        <p:cTn id="48" dur="1" fill="hold">
                                           <p:stCondLst>
                                             <p:cond delay="0"/>
                                           </p:stCondLst>
@@ -10486,19 +11160,73 @@
                     </p:cTn>
                   </p:par>
                   <p:par>
-                    <p:cTn id="31" fill="hold">
+                    <p:cTn id="35" fill="hold">
                       <p:stCondLst>
                         <p:cond delay="indefinite"/>
                       </p:stCondLst>
                       <p:childTnLst>
                         <p:par>
-                          <p:cTn id="32" fill="hold">
+                          <p:cTn id="36" fill="hold">
                             <p:stCondLst>
                               <p:cond delay="0"/>
                             </p:stCondLst>
                             <p:childTnLst>
                               <p:par>
-                                <p:cTn id="39" presetID="1" presetClass="entr" presetSubtype="0" fill="hold" grpId="0" nodeType="clickEffect">
+                                <p:cTn id="43" presetID="1" presetClass="entr" presetSubtype="0" fill="hold" grpId="0" nodeType="clickEffect">
+                                  <p:stCondLst>
+                                    <p:cond delay="0"/>
+                                  </p:stCondLst>
+                                  <p:childTnLst>
+                                    <p:set>
+                                      <p:cBhvr>
+                                        <p:cTn id="44" dur="1" fill="hold">
+                                          <p:stCondLst>
+                                            <p:cond delay="0"/>
+                                          </p:stCondLst>
+                                        </p:cTn>
+                                        <p:tgtEl>
+                                          <p:spTgt spid="907139307"/>
+                                        </p:tgtEl>
+                                        <p:attrNameLst>
+                                          <p:attrName>style.visibility</p:attrName>
+                                        </p:attrNameLst>
+                                      </p:cBhvr>
+                                      <p:to>
+                                        <p:strVal val="visible"/>
+                                      </p:to>
+                                    </p:set>
+                                  </p:childTnLst>
+                                </p:cTn>
+                              </p:par>
+                              <p:par>
+                                <p:cTn id="41" presetID="1" presetClass="entr" presetSubtype="0" fill="hold" grpId="0" nodeType="withEffect">
+                                  <p:stCondLst>
+                                    <p:cond delay="0"/>
+                                  </p:stCondLst>
+                                  <p:childTnLst>
+                                    <p:set>
+                                      <p:cBhvr>
+                                        <p:cTn id="42" dur="1" fill="hold">
+                                          <p:stCondLst>
+                                            <p:cond delay="0"/>
+                                          </p:stCondLst>
+                                        </p:cTn>
+                                        <p:tgtEl>
+                                          <p:spTgt spid="176189035"/>
+                                        </p:tgtEl>
+                                        <p:attrNameLst>
+                                          <p:attrName>style.visibility</p:attrName>
+                                        </p:attrNameLst>
+                                      </p:cBhvr>
+                                      <p:to>
+                                        <p:strVal val="visible"/>
+                                      </p:to>
+                                    </p:set>
+                                  </p:childTnLst>
+                                </p:cTn>
+                              </p:par>
+                              <p:par>
+                                <p:cTn id="39" presetID="1" presetClass="entr" presetSubtype="0" fill="hold" grpId="0" nodeType="withEffect">
                                   <p:stCondLst>
                                     <p:cond delay="0"/>
                                   </p:stCondLst>
@@ -10511,7 +11239,7 @@
                                           </p:stCondLst>
                                         </p:cTn>
                                         <p:tgtEl>
-                                          <p:spTgt spid="907139307"/>
+                                          <p:spTgt spid="1242929857"/>
                                         </p:tgtEl>
                                         <p:attrNameLst>
                                           <p:attrName>style.visibility</p:attrName>
@@ -10538,7 +11266,52 @@
                                           </p:stCondLst>
                                         </p:cTn>
                                         <p:tgtEl>
-                                          <p:spTgt spid="176189035"/>
+                                          <p:spTgt spid="1237177053"/>
+                                        </p:tgtEl>
+                                        <p:attrNameLst>
+                                          <p:attrName>style.visibility</p:attrName>
+                                        </p:attrNameLst>
+                                      </p:cBhvr>
+                                      <p:to>
+                                        <p:strVal val="visible"/>
+                                      </p:to>
+                                    </p:set>
+                                  </p:childTnLst>
+                                </p:cTn>
+                              </p:par>
+                            </p:childTnLst>
+                          </p:cTn>
+                        </p:par>
+                      </p:childTnLst>
+                    </p:cTn>
+                  </p:par>
+                  <p:par>
+                    <p:cTn id="29" fill="hold">
+                      <p:stCondLst>
+                        <p:cond delay="indefinite"/>
+                      </p:stCondLst>
+                      <p:childTnLst>
+                        <p:par>
+                          <p:cTn id="30" fill="hold">
+                            <p:stCondLst>
+                              <p:cond delay="0"/>
+                            </p:stCondLst>
+                            <p:childTnLst>
+                              <p:par>
+                                <p:cTn id="33" presetID="1" presetClass="entr" presetSubtype="0" fill="hold" grpId="0" nodeType="clickEffect">
+                                  <p:stCondLst>
+                                    <p:cond delay="0"/>
+                                  </p:stCondLst>
+                                  <p:childTnLst>
+                                    <p:set>
+                                      <p:cBhvr>
+                                        <p:cTn id="34" dur="1" fill="hold">
+                                          <p:stCondLst>
+                                            <p:cond delay="0"/>
+                                          </p:stCondLst>
+                                        </p:cTn>
+                                        <p:tgtEl>
+                                          <p:spTgt spid="1726718536"/>
                                         </p:tgtEl>
                                         <p:attrNameLst>
                                           <p:attrName>style.visibility</p:attrName>
@@ -10552,47 +11325,20 @@
                                 </p:cTn>
                               </p:par>
                               <p:par>
-                                <p:cTn id="35" presetID="1" presetClass="entr" presetSubtype="0" fill="hold" grpId="0" nodeType="withEffect">
+                                <p:cTn id="31" presetID="1" presetClass="entr" presetSubtype="0" fill="hold" grpId="0" nodeType="withEffect">
                                   <p:stCondLst>
                                     <p:cond delay="0"/>
                                   </p:stCondLst>
                                   <p:childTnLst>
                                     <p:set>
                                       <p:cBhvr>
-                                        <p:cTn id="36" dur="1" fill="hold">
+                                        <p:cTn id="32" dur="1" fill="hold">
                                           <p:stCondLst>
                                             <p:cond delay="0"/>
                                           </p:stCondLst>
                                         </p:cTn>
                                         <p:tgtEl>
-                                          <p:spTgt spid="1242929857"/>
-                                        </p:tgtEl>
-                                        <p:attrNameLst>
-                                          <p:attrName>style.visibility</p:attrName>
-                                        </p:attrNameLst>
-                                      </p:cBhvr>
-                                      <p:to>
-                                        <p:strVal val="visible"/>
-                                      </p:to>
-                                    </p:set>
-                                  </p:childTnLst>
-                                </p:cTn>
-                              </p:par>
-                              <p:par>
-                                <p:cTn id="33" presetID="1" presetClass="entr" presetSubtype="0" fill="hold" grpId="0" nodeType="withEffect">
-                                  <p:stCondLst>
-                                    <p:cond delay="0"/>
-                                  </p:stCondLst>
-                                  <p:childTnLst>
-                                    <p:set>
-                                      <p:cBhvr>
-                                        <p:cTn id="34" dur="1" fill="hold">
-                                          <p:stCondLst>
-                                            <p:cond delay="0"/>
-                                          </p:stCondLst>
-                                        </p:cTn>
-                                        <p:tgtEl>
-                                          <p:spTgt spid="1237177053"/>
+                                          <p:spTgt spid="2115804559"/>
                                         </p:tgtEl>
                                         <p:attrNameLst>
                                           <p:attrName>style.visibility</p:attrName>
@@ -10624,34 +11370,7 @@
                             </p:stCondLst>
                             <p:childTnLst>
                               <p:par>
-                                <p:cTn id="29" presetID="1" presetClass="entr" presetSubtype="0" fill="hold" grpId="0" nodeType="clickEffect">
-                                  <p:stCondLst>
-                                    <p:cond delay="0"/>
-                                  </p:stCondLst>
-                                  <p:childTnLst>
-                                    <p:set>
-                                      <p:cBhvr>
-                                        <p:cTn id="30" dur="1" fill="hold">
-                                          <p:stCondLst>
-                                            <p:cond delay="0"/>
-                                          </p:stCondLst>
-                                        </p:cTn>
-                                        <p:tgtEl>
-                                          <p:spTgt spid="1726718536"/>
-                                        </p:tgtEl>
-                                        <p:attrNameLst>
-                                          <p:attrName>style.visibility</p:attrName>
-                                        </p:attrNameLst>
-                                      </p:cBhvr>
-                                      <p:to>
-                                        <p:strVal val="visible"/>
-                                      </p:to>
-                                    </p:set>
-                                  </p:childTnLst>
-                                </p:cTn>
-                              </p:par>
-                              <p:par>
-                                <p:cTn id="27" presetID="1" presetClass="entr" presetSubtype="0" fill="hold" grpId="0" nodeType="withEffect">
+                                <p:cTn id="27" presetID="1" presetClass="entr" presetSubtype="0" fill="hold" grpId="0" nodeType="clickEffect">
                                   <p:stCondLst>
                                     <p:cond delay="0"/>
                                   </p:stCondLst>
@@ -10659,51 +11378,6 @@
                                     <p:set>
                                       <p:cBhvr>
                                         <p:cTn id="28" dur="1" fill="hold">
-                                          <p:stCondLst>
-                                            <p:cond delay="0"/>
-                                          </p:stCondLst>
-                                        </p:cTn>
-                                        <p:tgtEl>
-                                          <p:spTgt spid="2115804559"/>
-                                        </p:tgtEl>
-                                        <p:attrNameLst>
-                                          <p:attrName>style.visibility</p:attrName>
-                                        </p:attrNameLst>
-                                      </p:cBhvr>
-                                      <p:to>
-                                        <p:strVal val="visible"/>
-                                      </p:to>
-                                    </p:set>
-                                  </p:childTnLst>
-                                </p:cTn>
-                              </p:par>
-                            </p:childTnLst>
-                          </p:cTn>
-                        </p:par>
-                      </p:childTnLst>
-                    </p:cTn>
-                  </p:par>
-                  <p:par>
-                    <p:cTn id="21" fill="hold">
-                      <p:stCondLst>
-                        <p:cond delay="indefinite"/>
-                      </p:stCondLst>
-                      <p:childTnLst>
-                        <p:par>
-                          <p:cTn id="22" fill="hold">
-                            <p:stCondLst>
-                              <p:cond delay="0"/>
-                            </p:stCondLst>
-                            <p:childTnLst>
-                              <p:par>
-                                <p:cTn id="23" presetID="1" presetClass="entr" presetSubtype="0" fill="hold" grpId="0" nodeType="clickEffect">
-                                  <p:stCondLst>
-                                    <p:cond delay="0"/>
-                                  </p:stCondLst>
-                                  <p:childTnLst>
-                                    <p:set>
-                                      <p:cBhvr>
-                                        <p:cTn id="24" dur="1" fill="hold">
                                           <p:stCondLst>
                                             <p:cond delay="0"/>
                                           </p:stCondLst>
@@ -10729,26 +11403,26 @@
                     </p:cTn>
                   </p:par>
                   <p:par>
-                    <p:cTn id="15" fill="hold">
+                    <p:cTn id="19" fill="hold">
                       <p:stCondLst>
                         <p:cond delay="indefinite"/>
                       </p:stCondLst>
                       <p:childTnLst>
                         <p:par>
-                          <p:cTn id="16" fill="hold">
+                          <p:cTn id="20" fill="hold">
                             <p:stCondLst>
                               <p:cond delay="0"/>
                             </p:stCondLst>
                             <p:childTnLst>
                               <p:par>
-                                <p:cTn id="19" presetID="1" presetClass="entr" presetSubtype="0" fill="hold" grpId="0" nodeType="clickEffect">
+                                <p:cTn id="23" presetID="1" presetClass="entr" presetSubtype="0" fill="hold" grpId="0" nodeType="clickEffect">
                                   <p:stCondLst>
                                     <p:cond delay="0"/>
                                   </p:stCondLst>
                                   <p:childTnLst>
                                     <p:set>
                                       <p:cBhvr>
-                                        <p:cTn id="20" dur="1" fill="hold">
+                                        <p:cTn id="24" dur="1" fill="hold">
                                           <p:stCondLst>
                                             <p:cond delay="0"/>
                                           </p:stCondLst>
@@ -10768,14 +11442,14 @@
                                 </p:cTn>
                               </p:par>
                               <p:par>
-                                <p:cTn id="17" presetID="1" presetClass="entr" presetSubtype="0" fill="hold" grpId="0" nodeType="withEffect">
+                                <p:cTn id="21" presetID="1" presetClass="entr" presetSubtype="0" fill="hold" grpId="0" nodeType="withEffect">
                                   <p:stCondLst>
                                     <p:cond delay="0"/>
                                   </p:stCondLst>
                                   <p:childTnLst>
                                     <p:set>
                                       <p:cBhvr>
-                                        <p:cTn id="18" dur="1" fill="hold">
+                                        <p:cTn id="22" dur="1" fill="hold">
                                           <p:stCondLst>
                                             <p:cond delay="0"/>
                                           </p:stCondLst>
@@ -10801,26 +11475,26 @@
                     </p:cTn>
                   </p:par>
                   <p:par>
-                    <p:cTn id="9" fill="hold">
+                    <p:cTn id="13" fill="hold">
                       <p:stCondLst>
                         <p:cond delay="indefinite"/>
                       </p:stCondLst>
                       <p:childTnLst>
                         <p:par>
-                          <p:cTn id="10" fill="hold">
+                          <p:cTn id="14" fill="hold">
                             <p:stCondLst>
                               <p:cond delay="0"/>
                             </p:stCondLst>
                             <p:childTnLst>
                               <p:par>
-                                <p:cTn id="13" presetID="1" presetClass="entr" presetSubtype="0" fill="hold" grpId="0" nodeType="clickEffect">
+                                <p:cTn id="17" presetID="1" presetClass="entr" presetSubtype="0" fill="hold" grpId="0" nodeType="clickEffect">
                                   <p:stCondLst>
                                     <p:cond delay="0"/>
                                   </p:stCondLst>
                                   <p:childTnLst>
                                     <p:set>
                                       <p:cBhvr>
-                                        <p:cTn id="14" dur="1" fill="hold">
+                                        <p:cTn id="18" dur="1" fill="hold">
                                           <p:stCondLst>
                                             <p:cond delay="0"/>
                                           </p:stCondLst>
@@ -10840,7 +11514,52 @@
                                 </p:cTn>
                               </p:par>
                               <p:par>
-                                <p:cTn id="11" presetID="1" presetClass="entr" presetSubtype="0" fill="hold" grpId="0" nodeType="withEffect">
+                                <p:cTn id="15" presetID="1" presetClass="entr" presetSubtype="0" fill="hold" grpId="0" nodeType="withEffect">
+                                  <p:stCondLst>
+                                    <p:cond delay="0"/>
+                                  </p:stCondLst>
+                                  <p:childTnLst>
+                                    <p:set>
+                                      <p:cBhvr>
+                                        <p:cTn id="16" dur="1" fill="hold">
+                                          <p:stCondLst>
+                                            <p:cond delay="0"/>
+                                          </p:stCondLst>
+                                        </p:cTn>
+                                        <p:tgtEl>
+                                          <p:spTgt spid="1630662690"/>
+                                        </p:tgtEl>
+                                        <p:attrNameLst>
+                                          <p:attrName>style.visibility</p:attrName>
+                                        </p:attrNameLst>
+                                      </p:cBhvr>
+                                      <p:to>
+                                        <p:strVal val="visible"/>
+                                      </p:to>
+                                    </p:set>
+                                  </p:childTnLst>
+                                </p:cTn>
+                              </p:par>
+                            </p:childTnLst>
+                          </p:cTn>
+                        </p:par>
+                      </p:childTnLst>
+                    </p:cTn>
+                  </p:par>
+                  <p:par>
+                    <p:cTn id="7" fill="hold">
+                      <p:stCondLst>
+                        <p:cond delay="indefinite"/>
+                      </p:stCondLst>
+                      <p:childTnLst>
+                        <p:par>
+                          <p:cTn id="8" fill="hold">
+                            <p:stCondLst>
+                              <p:cond delay="0"/>
+                            </p:stCondLst>
+                            <p:childTnLst>
+                              <p:par>
+                                <p:cTn id="11" presetID="1" presetClass="entr" presetSubtype="0" fill="hold" grpId="0" nodeType="clickEffect">
                                   <p:stCondLst>
                                     <p:cond delay="0"/>
                                   </p:stCondLst>
@@ -10853,7 +11572,34 @@
                                           </p:stCondLst>
                                         </p:cTn>
                                         <p:tgtEl>
-                                          <p:spTgt spid="1630662690"/>
+                                          <p:spTgt spid="1417163185"/>
+                                        </p:tgtEl>
+                                        <p:attrNameLst>
+                                          <p:attrName>style.visibility</p:attrName>
+                                        </p:attrNameLst>
+                                      </p:cBhvr>
+                                      <p:to>
+                                        <p:strVal val="visible"/>
+                                      </p:to>
+                                    </p:set>
+                                  </p:childTnLst>
+                                </p:cTn>
+                              </p:par>
+                              <p:par>
+                                <p:cTn id="9" presetID="1" presetClass="entr" presetSubtype="0" fill="hold" grpId="0" nodeType="withEffect">
+                                  <p:stCondLst>
+                                    <p:cond delay="0"/>
+                                  </p:stCondLst>
+                                  <p:childTnLst>
+                                    <p:set>
+                                      <p:cBhvr>
+                                        <p:cTn id="10" dur="1" fill="hold">
+                                          <p:stCondLst>
+                                            <p:cond delay="0"/>
+                                          </p:stCondLst>
+                                        </p:cTn>
+                                        <p:tgtEl>
+                                          <p:spTgt spid="1935009378"/>
                                         </p:tgtEl>
                                         <p:attrNameLst>
                                           <p:attrName>style.visibility</p:attrName>
@@ -10885,34 +11631,7 @@
                             </p:stCondLst>
                             <p:childTnLst>
                               <p:par>
-                                <p:cTn id="7" presetID="1" presetClass="entr" presetSubtype="0" fill="hold" grpId="0" nodeType="clickEffect">
-                                  <p:stCondLst>
-                                    <p:cond delay="0"/>
-                                  </p:stCondLst>
-                                  <p:childTnLst>
-                                    <p:set>
-                                      <p:cBhvr>
-                                        <p:cTn id="8" dur="1" fill="hold">
-                                          <p:stCondLst>
-                                            <p:cond delay="0"/>
-                                          </p:stCondLst>
-                                        </p:cTn>
-                                        <p:tgtEl>
-                                          <p:spTgt spid="1417163185"/>
-                                        </p:tgtEl>
-                                        <p:attrNameLst>
-                                          <p:attrName>style.visibility</p:attrName>
-                                        </p:attrNameLst>
-                                      </p:cBhvr>
-                                      <p:to>
-                                        <p:strVal val="visible"/>
-                                      </p:to>
-                                    </p:set>
-                                  </p:childTnLst>
-                                </p:cTn>
-                              </p:par>
-                              <p:par>
-                                <p:cTn id="5" presetID="1" presetClass="entr" presetSubtype="0" fill="hold" grpId="0" nodeType="withEffect">
+                                <p:cTn id="5" presetID="1" presetClass="entr" presetSubtype="0" fill="hold" grpId="0" nodeType="clickEffect">
                                   <p:stCondLst>
                                     <p:cond delay="0"/>
                                   </p:stCondLst>
@@ -10925,7 +11644,7 @@
                                           </p:stCondLst>
                                         </p:cTn>
                                         <p:tgtEl>
-                                          <p:spTgt spid="1935009378"/>
+                                          <p:spTgt spid="1343900050"/>
                                         </p:tgtEl>
                                         <p:attrNameLst>
                                           <p:attrName>style.visibility</p:attrName>
@@ -14334,6 +15053,62 @@
           </a:p>
         </p:txBody>
       </p:sp>
+      <p:sp>
+        <p:nvSpPr>
+          <p:cNvPr id="1829486564" name=""/>
+          <p:cNvSpPr txBox="1"/>
+          <p:nvPr/>
+        </p:nvSpPr>
+        <p:spPr bwMode="auto">
+          <a:xfrm flipH="0" flipV="0">
+            <a:off x="-10293" y="3483950"/>
+            <a:ext cx="3916093" cy="1371960"/>
+          </a:xfrm>
+          <a:prstGeom prst="rect">
+            <a:avLst/>
+          </a:prstGeom>
+          <a:noFill/>
+        </p:spPr>
+        <p:txBody>
+          <a:bodyPr vertOverflow="overflow" horzOverflow="overflow" vert="horz" wrap="square" lIns="91440" tIns="45720" rIns="91440" bIns="45720" numCol="1" spcCol="0" rtlCol="0" fromWordArt="0" anchor="t" anchorCtr="0" forceAA="0" upright="0" compatLnSpc="0">
+            <a:spAutoFit/>
+          </a:bodyPr>
+          <a:p>
+            <a:pPr marL="239821" indent="-239821">
+              <a:buFont typeface="Arial"/>
+              <a:buChar char="•"/>
+              <a:defRPr/>
+            </a:pPr>
+            <a:r>
+              <a:rPr b="1"/>
+              <a:t>Si può fare di meglio?</a:t>
+            </a:r>
+            <a:br>
+              <a:rPr/>
+            </a:br>
+            <a:r>
+              <a:rPr sz="1400"/>
+              <a:t>Sì, implementando una logica che permetta ai nodi di posizionarsi nel sistema </a:t>
+            </a:r>
+            <a:r>
+              <a:rPr sz="1400" i="1"/>
+              <a:t>SENZA </a:t>
+            </a:r>
+            <a:r>
+              <a:rPr sz="1400"/>
+              <a:t>ausilio del server registry.</a:t>
+            </a:r>
+            <a:br>
+              <a:rPr sz="1400"/>
+            </a:br>
+            <a:r>
+              <a:rPr sz="1400"/>
+              <a:t>Anche un algoritmo di replicazione in caso di crash sarebbe utile!</a:t>
+            </a:r>
+            <a:endParaRPr sz="1400"/>
+          </a:p>
+        </p:txBody>
+      </p:sp>
     </p:spTree>
   </p:cSld>
   <p:clrMapOvr>
@@ -14356,13 +15131,58 @@
               <p:cTn id="2" dur="indefinite" nodeType="mainSeq">
                 <p:childTnLst>
                   <p:par>
-                    <p:cTn id="35" fill="hold">
+                    <p:cTn id="39" fill="hold">
                       <p:stCondLst>
                         <p:cond delay="indefinite"/>
                       </p:stCondLst>
                       <p:childTnLst>
                         <p:par>
-                          <p:cTn id="36" fill="hold">
+                          <p:cTn id="40" fill="hold">
+                            <p:stCondLst>
+                              <p:cond delay="0"/>
+                            </p:stCondLst>
+                            <p:childTnLst>
+                              <p:par>
+                                <p:cTn id="41" presetID="1" presetClass="entr" presetSubtype="0" fill="hold" grpId="0" nodeType="clickEffect">
+                                  <p:stCondLst>
+                                    <p:cond delay="0"/>
+                                  </p:stCondLst>
+                                  <p:childTnLst>
+                                    <p:set>
+                                      <p:cBhvr>
+                                        <p:cTn id="42" dur="1" fill="hold">
+                                          <p:stCondLst>
+                                            <p:cond delay="0"/>
+                                          </p:stCondLst>
+                                        </p:cTn>
+                                        <p:tgtEl>
+                                          <p:spTgt spid="252917676"/>
+                                        </p:tgtEl>
+                                        <p:attrNameLst>
+                                          <p:attrName>style.visibility</p:attrName>
+                                        </p:attrNameLst>
+                                      </p:cBhvr>
+                                      <p:to>
+                                        <p:strVal val="visible"/>
+                                      </p:to>
+                                    </p:set>
+                                  </p:childTnLst>
+                                </p:cTn>
+                              </p:par>
+                            </p:childTnLst>
+                          </p:cTn>
+                        </p:par>
+                      </p:childTnLst>
+                    </p:cTn>
+                  </p:par>
+                  <p:par>
+                    <p:cTn id="33" fill="hold">
+                      <p:stCondLst>
+                        <p:cond delay="indefinite"/>
+                      </p:stCondLst>
+                      <p:childTnLst>
+                        <p:par>
+                          <p:cTn id="34" fill="hold">
                             <p:stCondLst>
                               <p:cond delay="0"/>
                             </p:stCondLst>
@@ -14381,7 +15201,34 @@
                                           </p:stCondLst>
                                         </p:cTn>
                                         <p:tgtEl>
-                                          <p:spTgt spid="252917676"/>
+                                          <p:spTgt spid="1643313438"/>
+                                        </p:tgtEl>
+                                        <p:attrNameLst>
+                                          <p:attrName>style.visibility</p:attrName>
+                                        </p:attrNameLst>
+                                      </p:cBhvr>
+                                      <p:to>
+                                        <p:strVal val="visible"/>
+                                      </p:to>
+                                    </p:set>
+                                  </p:childTnLst>
+                                </p:cTn>
+                              </p:par>
+                              <p:par>
+                                <p:cTn id="35" presetID="1" presetClass="entr" presetSubtype="0" fill="hold" grpId="0" nodeType="withEffect">
+                                  <p:stCondLst>
+                                    <p:cond delay="0"/>
+                                  </p:stCondLst>
+                                  <p:childTnLst>
+                                    <p:set>
+                                      <p:cBhvr>
+                                        <p:cTn id="36" dur="1" fill="hold">
+                                          <p:stCondLst>
+                                            <p:cond delay="0"/>
+                                          </p:stCondLst>
+                                        </p:cTn>
+                                        <p:tgtEl>
+                                          <p:spTgt spid="2124494284"/>
                                         </p:tgtEl>
                                         <p:attrNameLst>
                                           <p:attrName>style.visibility</p:attrName>
@@ -14413,34 +15260,7 @@
                             </p:stCondLst>
                             <p:childTnLst>
                               <p:par>
-                                <p:cTn id="33" presetID="1" presetClass="entr" presetSubtype="0" fill="hold" grpId="0" nodeType="clickEffect">
-                                  <p:stCondLst>
-                                    <p:cond delay="0"/>
-                                  </p:stCondLst>
-                                  <p:childTnLst>
-                                    <p:set>
-                                      <p:cBhvr>
-                                        <p:cTn id="34" dur="1" fill="hold">
-                                          <p:stCondLst>
-                                            <p:cond delay="0"/>
-                                          </p:stCondLst>
-                                        </p:cTn>
-                                        <p:tgtEl>
-                                          <p:spTgt spid="1643313438"/>
-                                        </p:tgtEl>
-                                        <p:attrNameLst>
-                                          <p:attrName>style.visibility</p:attrName>
-                                        </p:attrNameLst>
-                                      </p:cBhvr>
-                                      <p:to>
-                                        <p:strVal val="visible"/>
-                                      </p:to>
-                                    </p:set>
-                                  </p:childTnLst>
-                                </p:cTn>
-                              </p:par>
-                              <p:par>
-                                <p:cTn id="31" presetID="1" presetClass="entr" presetSubtype="0" fill="hold" grpId="0" nodeType="withEffect">
+                                <p:cTn id="31" presetID="1" presetClass="entr" presetSubtype="0" fill="hold" grpId="0" nodeType="clickEffect">
                                   <p:stCondLst>
                                     <p:cond delay="0"/>
                                   </p:stCondLst>
@@ -14453,7 +15273,7 @@
                                           </p:stCondLst>
                                         </p:cTn>
                                         <p:tgtEl>
-                                          <p:spTgt spid="2124494284"/>
+                                          <p:spTgt spid="2066051897"/>
                                         </p:tgtEl>
                                         <p:attrNameLst>
                                           <p:attrName>style.visibility</p:attrName>
@@ -14498,7 +15318,7 @@
                                           </p:stCondLst>
                                         </p:cTn>
                                         <p:tgtEl>
-                                          <p:spTgt spid="2066051897"/>
+                                          <p:spTgt spid="543688401"/>
                                         </p:tgtEl>
                                         <p:attrNameLst>
                                           <p:attrName>style.visibility</p:attrName>
@@ -14543,7 +15363,7 @@
                                           </p:stCondLst>
                                         </p:cTn>
                                         <p:tgtEl>
-                                          <p:spTgt spid="543688401"/>
+                                          <p:spTgt spid="293263150"/>
                                         </p:tgtEl>
                                         <p:attrNameLst>
                                           <p:attrName>style.visibility</p:attrName>
@@ -14575,7 +15395,7 @@
                             </p:stCondLst>
                             <p:childTnLst>
                               <p:par>
-                                <p:cTn id="19" presetID="1" presetClass="entr" presetSubtype="0" fill="hold" grpId="0" nodeType="clickEffect">
+                                <p:cTn id="19" presetID="1" presetClass="exit" presetSubtype="0" fill="hold" grpId="0" nodeType="clickEffect">
                                   <p:stCondLst>
                                     <p:cond delay="0"/>
                                   </p:stCondLst>
@@ -14583,51 +15403,6 @@
                                     <p:set>
                                       <p:cBhvr>
                                         <p:cTn id="20" dur="1" fill="hold">
-                                          <p:stCondLst>
-                                            <p:cond delay="0"/>
-                                          </p:stCondLst>
-                                        </p:cTn>
-                                        <p:tgtEl>
-                                          <p:spTgt spid="293263150"/>
-                                        </p:tgtEl>
-                                        <p:attrNameLst>
-                                          <p:attrName>style.visibility</p:attrName>
-                                        </p:attrNameLst>
-                                      </p:cBhvr>
-                                      <p:to>
-                                        <p:strVal val="visible"/>
-                                      </p:to>
-                                    </p:set>
-                                  </p:childTnLst>
-                                </p:cTn>
-                              </p:par>
-                            </p:childTnLst>
-                          </p:cTn>
-                        </p:par>
-                      </p:childTnLst>
-                    </p:cTn>
-                  </p:par>
-                  <p:par>
-                    <p:cTn id="13" fill="hold">
-                      <p:stCondLst>
-                        <p:cond delay="indefinite"/>
-                      </p:stCondLst>
-                      <p:childTnLst>
-                        <p:par>
-                          <p:cTn id="14" fill="hold">
-                            <p:stCondLst>
-                              <p:cond delay="0"/>
-                            </p:stCondLst>
-                            <p:childTnLst>
-                              <p:par>
-                                <p:cTn id="15" presetID="1" presetClass="exit" presetSubtype="0" fill="hold" grpId="0" nodeType="clickEffect">
-                                  <p:stCondLst>
-                                    <p:cond delay="0"/>
-                                  </p:stCondLst>
-                                  <p:childTnLst>
-                                    <p:set>
-                                      <p:cBhvr>
-                                        <p:cTn id="16" dur="1" fill="hold">
                                           <p:stCondLst>
                                             <p:cond delay="0"/>
                                           </p:stCondLst>
@@ -14653,13 +15428,58 @@
                     </p:cTn>
                   </p:par>
                   <p:par>
-                    <p:cTn id="9" fill="hold">
+                    <p:cTn id="13" fill="hold">
                       <p:stCondLst>
                         <p:cond delay="indefinite"/>
                       </p:stCondLst>
                       <p:childTnLst>
                         <p:par>
-                          <p:cTn id="10" fill="hold">
+                          <p:cTn id="14" fill="hold">
+                            <p:stCondLst>
+                              <p:cond delay="0"/>
+                            </p:stCondLst>
+                            <p:childTnLst>
+                              <p:par>
+                                <p:cTn id="15" presetID="1" presetClass="entr" presetSubtype="0" fill="hold" grpId="0" nodeType="clickEffect">
+                                  <p:stCondLst>
+                                    <p:cond delay="0"/>
+                                  </p:stCondLst>
+                                  <p:childTnLst>
+                                    <p:set>
+                                      <p:cBhvr>
+                                        <p:cTn id="16" dur="1" fill="hold">
+                                          <p:stCondLst>
+                                            <p:cond delay="0"/>
+                                          </p:stCondLst>
+                                        </p:cTn>
+                                        <p:tgtEl>
+                                          <p:spTgt spid="1851048854"/>
+                                        </p:tgtEl>
+                                        <p:attrNameLst>
+                                          <p:attrName>style.visibility</p:attrName>
+                                        </p:attrNameLst>
+                                      </p:cBhvr>
+                                      <p:to>
+                                        <p:strVal val="visible"/>
+                                      </p:to>
+                                    </p:set>
+                                  </p:childTnLst>
+                                </p:cTn>
+                              </p:par>
+                            </p:childTnLst>
+                          </p:cTn>
+                        </p:par>
+                      </p:childTnLst>
+                    </p:cTn>
+                  </p:par>
+                  <p:par>
+                    <p:cTn id="7" fill="hold">
+                      <p:stCondLst>
+                        <p:cond delay="indefinite"/>
+                      </p:stCondLst>
+                      <p:childTnLst>
+                        <p:par>
+                          <p:cTn id="8" fill="hold">
                             <p:stCondLst>
                               <p:cond delay="0"/>
                             </p:stCondLst>
@@ -14678,7 +15498,34 @@
                                           </p:stCondLst>
                                         </p:cTn>
                                         <p:tgtEl>
-                                          <p:spTgt spid="1851048854"/>
+                                          <p:spTgt spid="1568102241"/>
+                                        </p:tgtEl>
+                                        <p:attrNameLst>
+                                          <p:attrName>style.visibility</p:attrName>
+                                        </p:attrNameLst>
+                                      </p:cBhvr>
+                                      <p:to>
+                                        <p:strVal val="visible"/>
+                                      </p:to>
+                                    </p:set>
+                                  </p:childTnLst>
+                                </p:cTn>
+                              </p:par>
+                              <p:par>
+                                <p:cTn id="9" presetID="1" presetClass="entr" presetSubtype="0" fill="hold" grpId="0" nodeType="withEffect">
+                                  <p:stCondLst>
+                                    <p:cond delay="0"/>
+                                  </p:stCondLst>
+                                  <p:childTnLst>
+                                    <p:set>
+                                      <p:cBhvr>
+                                        <p:cTn id="10" dur="1" fill="hold">
+                                          <p:stCondLst>
+                                            <p:cond delay="0"/>
+                                          </p:stCondLst>
+                                        </p:cTn>
+                                        <p:tgtEl>
+                                          <p:spTgt spid="201485175"/>
                                         </p:tgtEl>
                                         <p:attrNameLst>
                                           <p:attrName>style.visibility</p:attrName>
@@ -14710,34 +15557,7 @@
                             </p:stCondLst>
                             <p:childTnLst>
                               <p:par>
-                                <p:cTn id="7" presetID="1" presetClass="entr" presetSubtype="0" fill="hold" grpId="0" nodeType="clickEffect">
-                                  <p:stCondLst>
-                                    <p:cond delay="0"/>
-                                  </p:stCondLst>
-                                  <p:childTnLst>
-                                    <p:set>
-                                      <p:cBhvr>
-                                        <p:cTn id="8" dur="1" fill="hold">
-                                          <p:stCondLst>
-                                            <p:cond delay="0"/>
-                                          </p:stCondLst>
-                                        </p:cTn>
-                                        <p:tgtEl>
-                                          <p:spTgt spid="1568102241"/>
-                                        </p:tgtEl>
-                                        <p:attrNameLst>
-                                          <p:attrName>style.visibility</p:attrName>
-                                        </p:attrNameLst>
-                                      </p:cBhvr>
-                                      <p:to>
-                                        <p:strVal val="visible"/>
-                                      </p:to>
-                                    </p:set>
-                                  </p:childTnLst>
-                                </p:cTn>
-                              </p:par>
-                              <p:par>
-                                <p:cTn id="5" presetID="1" presetClass="entr" presetSubtype="0" fill="hold" grpId="0" nodeType="withEffect">
+                                <p:cTn id="5" presetID="1" presetClass="entr" presetSubtype="0" fill="hold" grpId="0" nodeType="clickEffect">
                                   <p:stCondLst>
                                     <p:cond delay="0"/>
                                   </p:stCondLst>
@@ -14750,7 +15570,7 @@
                                           </p:stCondLst>
                                         </p:cTn>
                                         <p:tgtEl>
-                                          <p:spTgt spid="201485175"/>
+                                          <p:spTgt spid="1829486564"/>
                                         </p:tgtEl>
                                         <p:attrNameLst>
                                           <p:attrName>style.visibility</p:attrName>
@@ -16831,7 +17651,7 @@
         </p:nvSpPr>
         <p:spPr bwMode="auto">
           <a:xfrm flipH="0" flipV="0">
-            <a:off x="10395" y="1010148"/>
+            <a:off x="10395" y="1010147"/>
             <a:ext cx="5351880" cy="305159"/>
           </a:xfrm>
           <a:prstGeom prst="rect">
@@ -16890,7 +17710,7 @@
         </p:nvSpPr>
         <p:spPr bwMode="auto">
           <a:xfrm flipH="0" flipV="0">
-            <a:off x="10396" y="1010148"/>
+            <a:off x="10396" y="1010147"/>
             <a:ext cx="4742461" cy="518519"/>
           </a:xfrm>
           <a:prstGeom prst="rect">
@@ -19619,7 +20439,7 @@
         </p:nvSpPr>
         <p:spPr bwMode="auto">
           <a:xfrm flipH="0" flipV="0">
-            <a:off x="23715" y="732045"/>
+            <a:off x="23714" y="732045"/>
             <a:ext cx="5604958" cy="731879"/>
           </a:xfrm>
           <a:prstGeom prst="rect">

</xml_diff>